<commit_message>
vault backup: 2024-04-22 21:47:01
</commit_message>
<xml_diff>
--- a/06-ppt/RTS-Turin-Class/0423.pptx
+++ b/06-ppt/RTS-Turin-Class/0423.pptx
@@ -212,7 +212,7 @@
           <a:p>
             <a:fld id="{BFB3BCA0-073B-4AA3-93D1-1E422E4EF703}" type="datetimeFigureOut">
               <a:rPr lang="zh-CN" altLang="en-US" smtClean="0"/>
-              <a:t>2024/4/21</a:t>
+              <a:t>2024/4/22</a:t>
             </a:fld>
             <a:endParaRPr lang="zh-CN" altLang="en-US"/>
           </a:p>
@@ -858,17 +858,13 @@
               <a:defRPr/>
             </a:pPr>
             <a:r>
-              <a:rPr lang="en-US" altLang="zh-CN" dirty="0"/>
-              <a:t>We have defined the end time of the event. The end times for scheduling tasks, network tasks, and external events are represented as follows. </a:t>
-            </a:r>
-            <a:r>
               <a:rPr lang="en-US" altLang="zh-CN" sz="1800" kern="100" dirty="0">
                 <a:effectLst/>
                 <a:latin typeface="Calibri" panose="020F0502020204030204" pitchFamily="34" charset="0"/>
                 <a:ea typeface="宋体" panose="02010600030101010101" pitchFamily="2" charset="-122"/>
                 <a:cs typeface="Times New Roman" panose="02020603050405020304" pitchFamily="18" charset="0"/>
               </a:rPr>
-              <a:t>We can obtain the reaction time of the task chain and express it as the end time as follows</a:t>
+              <a:t>We can obtain the data age of the task chain and express it as the end time as follows</a:t>
             </a:r>
           </a:p>
           <a:p>
@@ -1804,26 +1800,7 @@
           <a:bodyPr/>
           <a:lstStyle/>
           <a:p>
-            <a:pPr marL="0" marR="0" algn="just">
-              <a:spcBef>
-                <a:spcPts val="0"/>
-              </a:spcBef>
-              <a:spcAft>
-                <a:spcPts val="0"/>
-              </a:spcAft>
-            </a:pPr>
-            <a:r>
-              <a:rPr lang="en-US" altLang="zh-CN" sz="1800" kern="100" dirty="0">
-                <a:effectLst/>
-                <a:latin typeface="Calibri" panose="020F0502020204030204" pitchFamily="34" charset="0"/>
-                <a:ea typeface="宋体" panose="02010600030101010101" pitchFamily="2" charset="-122"/>
-                <a:cs typeface="Times New Roman" panose="02020603050405020304" pitchFamily="18" charset="0"/>
-              </a:rPr>
-              <a:t>We consider implicit communication as well as event triggering. The task chain is composed of scheduling tasks τ and network task m. All tasks have a buffer for data read and write. The first and last tasks in the task chain can only be scheduling tasks, they are on the ECU. External event z is valid when the CPU is idle. The first task is periodically released, capturing z. Tasks on two different ECUs require network task connection.</a:t>
-            </a:r>
-          </a:p>
-          <a:p>
-            <a:pPr marL="0" marR="0" lvl="0" indent="0" algn="l" defTabSz="914400" rtl="0" eaLnBrk="1" fontAlgn="auto" latinLnBrk="0" hangingPunct="1">
+            <a:pPr marL="0" marR="0" lvl="0" indent="0" algn="just" defTabSz="914400" rtl="0" eaLnBrk="1" fontAlgn="auto" latinLnBrk="0" hangingPunct="1">
               <a:lnSpc>
                 <a:spcPct val="100000"/>
               </a:lnSpc>
@@ -1847,7 +1824,7 @@
                 <a:ea typeface="宋体" panose="02010600030101010101" pitchFamily="2" charset="-122"/>
                 <a:cs typeface="Times New Roman" panose="02020603050405020304" pitchFamily="18" charset="0"/>
               </a:rPr>
-              <a:t>As shown in the figure. At time 4, the system generated an external event and wrote data to the input buffer B0 of task J02. At this time, the CPU is idle and z is valid. At time 10, the scheduling task J02 on ECU1 ends and the updated data is written to B1. After the end of J11, the output is transmitted to ECU2 through the network, queued at time 17, processed by ATS shaping algorithm, and ended by switch 1 at time 21. The final data result regarding the external event z is generated at time t=36.</a:t>
+              <a:t>We consider implicit communication as well as event triggering. The LET model leads to longer end-to-end delays in the Cause-Effect chain. So I consider implicit communication.</a:t>
             </a:r>
           </a:p>
           <a:p>
@@ -1997,7 +1974,7 @@
                 <a:ea typeface="宋体" panose="02010600030101010101" pitchFamily="2" charset="-122"/>
                 <a:cs typeface="Times New Roman" panose="02020603050405020304" pitchFamily="18" charset="0"/>
               </a:rPr>
-              <a:t>We consider implicit communication as well as event triggering. The task chain is composed of scheduling tasks τ and network task m. All tasks have a buffer for data read and write. The first and last tasks in the task chain can only be scheduling tasks, they are on the ECU. The first task is periodically released, capturing z. Tasks on two different ECUs require network task connection.</a:t>
+              <a:t>The task chain is composed of scheduling tasks τ and network task m. All tasks have a buffer for data read and write. The first and last tasks in the task chain can only be scheduling tasks, they are on the ECU. The first task is periodically released, capturing z. Tasks on two different ECUs require network task connection.</a:t>
             </a:r>
           </a:p>
           <a:p>
@@ -2284,10 +2261,6 @@
               <a:tabLst/>
               <a:defRPr/>
             </a:pPr>
-            <a:r>
-              <a:rPr lang="en-US" altLang="zh-CN" dirty="0"/>
-              <a:t>We have defined the end time of the event. The end times for scheduling tasks, network tasks, and external events are represented as follows. </a:t>
-            </a:r>
             <a:r>
               <a:rPr lang="en-US" altLang="zh-CN" sz="1800" kern="100" dirty="0">
                 <a:effectLst/>
@@ -2486,7 +2459,7 @@
           <a:p>
             <a:fld id="{47574B27-0941-438E-852F-CBC446AABACC}" type="datetimeFigureOut">
               <a:rPr lang="zh-CN" altLang="en-US" smtClean="0"/>
-              <a:t>2024/4/21</a:t>
+              <a:t>2024/4/22</a:t>
             </a:fld>
             <a:endParaRPr lang="zh-CN" altLang="en-US"/>
           </a:p>
@@ -2684,7 +2657,7 @@
           <a:p>
             <a:fld id="{47574B27-0941-438E-852F-CBC446AABACC}" type="datetimeFigureOut">
               <a:rPr lang="zh-CN" altLang="en-US" smtClean="0"/>
-              <a:t>2024/4/21</a:t>
+              <a:t>2024/4/22</a:t>
             </a:fld>
             <a:endParaRPr lang="zh-CN" altLang="en-US"/>
           </a:p>
@@ -2892,7 +2865,7 @@
           <a:p>
             <a:fld id="{47574B27-0941-438E-852F-CBC446AABACC}" type="datetimeFigureOut">
               <a:rPr lang="zh-CN" altLang="en-US" smtClean="0"/>
-              <a:t>2024/4/21</a:t>
+              <a:t>2024/4/22</a:t>
             </a:fld>
             <a:endParaRPr lang="zh-CN" altLang="en-US"/>
           </a:p>
@@ -3090,7 +3063,7 @@
           <a:p>
             <a:fld id="{47574B27-0941-438E-852F-CBC446AABACC}" type="datetimeFigureOut">
               <a:rPr lang="zh-CN" altLang="en-US" smtClean="0"/>
-              <a:t>2024/4/21</a:t>
+              <a:t>2024/4/22</a:t>
             </a:fld>
             <a:endParaRPr lang="zh-CN" altLang="en-US"/>
           </a:p>
@@ -3365,7 +3338,7 @@
           <a:p>
             <a:fld id="{47574B27-0941-438E-852F-CBC446AABACC}" type="datetimeFigureOut">
               <a:rPr lang="zh-CN" altLang="en-US" smtClean="0"/>
-              <a:t>2024/4/21</a:t>
+              <a:t>2024/4/22</a:t>
             </a:fld>
             <a:endParaRPr lang="zh-CN" altLang="en-US"/>
           </a:p>
@@ -3630,7 +3603,7 @@
           <a:p>
             <a:fld id="{47574B27-0941-438E-852F-CBC446AABACC}" type="datetimeFigureOut">
               <a:rPr lang="zh-CN" altLang="en-US" smtClean="0"/>
-              <a:t>2024/4/21</a:t>
+              <a:t>2024/4/22</a:t>
             </a:fld>
             <a:endParaRPr lang="zh-CN" altLang="en-US"/>
           </a:p>
@@ -4042,7 +4015,7 @@
           <a:p>
             <a:fld id="{47574B27-0941-438E-852F-CBC446AABACC}" type="datetimeFigureOut">
               <a:rPr lang="zh-CN" altLang="en-US" smtClean="0"/>
-              <a:t>2024/4/21</a:t>
+              <a:t>2024/4/22</a:t>
             </a:fld>
             <a:endParaRPr lang="zh-CN" altLang="en-US"/>
           </a:p>
@@ -4183,7 +4156,7 @@
           <a:p>
             <a:fld id="{47574B27-0941-438E-852F-CBC446AABACC}" type="datetimeFigureOut">
               <a:rPr lang="zh-CN" altLang="en-US" smtClean="0"/>
-              <a:t>2024/4/21</a:t>
+              <a:t>2024/4/22</a:t>
             </a:fld>
             <a:endParaRPr lang="zh-CN" altLang="en-US"/>
           </a:p>
@@ -4296,7 +4269,7 @@
           <a:p>
             <a:fld id="{47574B27-0941-438E-852F-CBC446AABACC}" type="datetimeFigureOut">
               <a:rPr lang="zh-CN" altLang="en-US" smtClean="0"/>
-              <a:t>2024/4/21</a:t>
+              <a:t>2024/4/22</a:t>
             </a:fld>
             <a:endParaRPr lang="zh-CN" altLang="en-US"/>
           </a:p>
@@ -4607,7 +4580,7 @@
           <a:p>
             <a:fld id="{47574B27-0941-438E-852F-CBC446AABACC}" type="datetimeFigureOut">
               <a:rPr lang="zh-CN" altLang="en-US" smtClean="0"/>
-              <a:t>2024/4/21</a:t>
+              <a:t>2024/4/22</a:t>
             </a:fld>
             <a:endParaRPr lang="zh-CN" altLang="en-US"/>
           </a:p>
@@ -4895,7 +4868,7 @@
           <a:p>
             <a:fld id="{47574B27-0941-438E-852F-CBC446AABACC}" type="datetimeFigureOut">
               <a:rPr lang="zh-CN" altLang="en-US" smtClean="0"/>
-              <a:t>2024/4/21</a:t>
+              <a:t>2024/4/22</a:t>
             </a:fld>
             <a:endParaRPr lang="zh-CN" altLang="en-US"/>
           </a:p>
@@ -5136,7 +5109,7 @@
           <a:p>
             <a:fld id="{47574B27-0941-438E-852F-CBC446AABACC}" type="datetimeFigureOut">
               <a:rPr lang="zh-CN" altLang="en-US" smtClean="0"/>
-              <a:t>2024/4/21</a:t>
+              <a:t>2024/4/22</a:t>
             </a:fld>
             <a:endParaRPr lang="zh-CN" altLang="en-US"/>
           </a:p>
@@ -5975,72 +5948,79 @@
                 <a:latin typeface="微软雅黑" panose="020B0503020204020204" pitchFamily="34" charset="-122"/>
                 <a:ea typeface="微软雅黑" panose="020B0503020204020204" pitchFamily="34" charset="-122"/>
               </a:rPr>
-              <a:t> I. </a:t>
-            </a:r>
-            <a:r>
-              <a:rPr lang="zh-CN" altLang="en-US" sz="1400" dirty="0">
+              <a:t> I</a:t>
+            </a:r>
+            <a:r>
+              <a:rPr lang="en-US" altLang="zh-CN" sz="1600" b="1" dirty="0">
+                <a:latin typeface="微软雅黑" panose="020B0503020204020204" pitchFamily="34" charset="-122"/>
+                <a:ea typeface="微软雅黑" panose="020B0503020204020204" pitchFamily="34" charset="-122"/>
+              </a:rPr>
+              <a:t>. </a:t>
+            </a:r>
+            <a:r>
+              <a:rPr lang="zh-CN" altLang="en-US" sz="1600" dirty="0">
                 <a:latin typeface="微软雅黑" panose="020B0503020204020204" pitchFamily="34" charset="-122"/>
                 <a:ea typeface="微软雅黑" panose="020B0503020204020204" pitchFamily="34" charset="-122"/>
               </a:rPr>
               <a:t>𝑓 </a:t>
             </a:r>
             <a:r>
-              <a:rPr lang="en-US" altLang="zh-CN" sz="1400" dirty="0">
+              <a:rPr lang="en-US" altLang="zh-CN" sz="1600" dirty="0">
                 <a:latin typeface="微软雅黑" panose="020B0503020204020204" pitchFamily="34" charset="-122"/>
                 <a:ea typeface="微软雅黑" panose="020B0503020204020204" pitchFamily="34" charset="-122"/>
               </a:rPr>
               <a:t>(</a:t>
             </a:r>
             <a:r>
-              <a:rPr lang="zh-CN" altLang="en-US" sz="1400" dirty="0">
+              <a:rPr lang="zh-CN" altLang="en-US" sz="1600" dirty="0">
                 <a:latin typeface="微软雅黑" panose="020B0503020204020204" pitchFamily="34" charset="-122"/>
                 <a:ea typeface="微软雅黑" panose="020B0503020204020204" pitchFamily="34" charset="-122"/>
               </a:rPr>
               <a:t>𝑐</a:t>
             </a:r>
             <a:r>
-              <a:rPr lang="en-US" altLang="zh-CN" sz="1400" dirty="0">
+              <a:rPr lang="en-US" altLang="zh-CN" sz="1600" dirty="0">
                 <a:latin typeface="微软雅黑" panose="020B0503020204020204" pitchFamily="34" charset="-122"/>
                 <a:ea typeface="微软雅黑" panose="020B0503020204020204" pitchFamily="34" charset="-122"/>
               </a:rPr>
               <a:t>0) − </a:t>
             </a:r>
             <a:r>
-              <a:rPr lang="zh-CN" altLang="en-US" sz="1400" dirty="0">
+              <a:rPr lang="zh-CN" altLang="en-US" sz="1600" dirty="0">
                 <a:latin typeface="微软雅黑" panose="020B0503020204020204" pitchFamily="34" charset="-122"/>
                 <a:ea typeface="微软雅黑" panose="020B0503020204020204" pitchFamily="34" charset="-122"/>
               </a:rPr>
               <a:t>𝑡 </a:t>
             </a:r>
             <a:r>
-              <a:rPr lang="en-US" altLang="zh-CN" sz="1400" dirty="0">
+              <a:rPr lang="en-US" altLang="zh-CN" sz="1600" dirty="0">
                 <a:latin typeface="微软雅黑" panose="020B0503020204020204" pitchFamily="34" charset="-122"/>
                 <a:ea typeface="微软雅黑" panose="020B0503020204020204" pitchFamily="34" charset="-122"/>
               </a:rPr>
               <a:t>(</a:t>
             </a:r>
             <a:r>
-              <a:rPr lang="zh-CN" altLang="en-US" sz="1400" dirty="0">
+              <a:rPr lang="zh-CN" altLang="en-US" sz="1600" dirty="0">
                 <a:latin typeface="微软雅黑" panose="020B0503020204020204" pitchFamily="34" charset="-122"/>
                 <a:ea typeface="微软雅黑" panose="020B0503020204020204" pitchFamily="34" charset="-122"/>
               </a:rPr>
               <a:t>𝑧</a:t>
             </a:r>
             <a:r>
-              <a:rPr lang="en-US" altLang="zh-CN" sz="1400" dirty="0">
+              <a:rPr lang="en-US" altLang="zh-CN" sz="1600" dirty="0">
                 <a:latin typeface="微软雅黑" panose="020B0503020204020204" pitchFamily="34" charset="-122"/>
                 <a:ea typeface="微软雅黑" panose="020B0503020204020204" pitchFamily="34" charset="-122"/>
               </a:rPr>
               <a:t>) ≤ </a:t>
             </a:r>
             <a:r>
-              <a:rPr lang="zh-CN" altLang="en-US" sz="1400" dirty="0">
+              <a:rPr lang="zh-CN" altLang="en-US" sz="1600" dirty="0">
                 <a:latin typeface="微软雅黑" panose="020B0503020204020204" pitchFamily="34" charset="-122"/>
                 <a:ea typeface="微软雅黑" panose="020B0503020204020204" pitchFamily="34" charset="-122"/>
               </a:rPr>
               <a:t>𝑇</a:t>
             </a:r>
-            <a:endParaRPr lang="en-US" altLang="zh-CN" sz="1400" dirty="0">
+            <a:endParaRPr lang="en-US" altLang="zh-CN" sz="1600" dirty="0">
               <a:latin typeface="微软雅黑" panose="020B0503020204020204" pitchFamily="34" charset="-122"/>
               <a:ea typeface="微软雅黑" panose="020B0503020204020204" pitchFamily="34" charset="-122"/>
             </a:endParaRPr>
@@ -6097,8 +6077,8 @@
         </p:blipFill>
         <p:spPr>
           <a:xfrm>
-            <a:off x="1192261" y="1965081"/>
-            <a:ext cx="4381408" cy="1588640"/>
+            <a:off x="1192260" y="1965081"/>
+            <a:ext cx="5342475" cy="1937110"/>
           </a:xfrm>
           <a:prstGeom prst="rect">
             <a:avLst/>
@@ -6120,7 +6100,7 @@
         <p:spPr>
           <a:xfrm>
             <a:off x="95250" y="3902191"/>
-            <a:ext cx="9299762" cy="1392689"/>
+            <a:ext cx="9299762" cy="1941237"/>
           </a:xfrm>
           <a:prstGeom prst="rect">
             <a:avLst/>
@@ -6139,41 +6119,41 @@
               </a:lnSpc>
             </a:pPr>
             <a:r>
-              <a:rPr lang="en-US" altLang="zh-CN" sz="1600" b="1" dirty="0">
+              <a:rPr lang="en-US" altLang="zh-CN" b="1" dirty="0">
                 <a:latin typeface="微软雅黑" panose="020B0503020204020204" pitchFamily="34" charset="-122"/>
                 <a:ea typeface="微软雅黑" panose="020B0503020204020204" pitchFamily="34" charset="-122"/>
               </a:rPr>
               <a:t>E</a:t>
             </a:r>
             <a:r>
-              <a:rPr lang="zh-CN" altLang="en-US" sz="1600" b="1" dirty="0">
+              <a:rPr lang="zh-CN" altLang="en-US" b="1" dirty="0">
                 <a:latin typeface="微软雅黑" panose="020B0503020204020204" pitchFamily="34" charset="-122"/>
                 <a:ea typeface="微软雅黑" panose="020B0503020204020204" pitchFamily="34" charset="-122"/>
               </a:rPr>
               <a:t>vent</a:t>
             </a:r>
             <a:r>
-              <a:rPr lang="zh-CN" altLang="en-US" sz="1400" dirty="0">
+              <a:rPr lang="zh-CN" altLang="en-US" sz="1600" dirty="0">
                 <a:latin typeface="微软雅黑" panose="020B0503020204020204" pitchFamily="34" charset="-122"/>
                 <a:ea typeface="微软雅黑" panose="020B0503020204020204" pitchFamily="34" charset="-122"/>
               </a:rPr>
               <a:t> </a:t>
             </a:r>
             <a:r>
-              <a:rPr lang="zh-CN" altLang="en-US" sz="1600" b="1" dirty="0">
+              <a:rPr lang="zh-CN" altLang="en-US" b="1" dirty="0">
                 <a:latin typeface="微软雅黑" panose="020B0503020204020204" pitchFamily="34" charset="-122"/>
                 <a:ea typeface="微软雅黑" panose="020B0503020204020204" pitchFamily="34" charset="-122"/>
               </a:rPr>
               <a:t>Status</a:t>
             </a:r>
             <a:r>
-              <a:rPr lang="zh-CN" altLang="en-US" sz="1400" dirty="0">
+              <a:rPr lang="zh-CN" altLang="en-US" sz="1600" dirty="0">
                 <a:latin typeface="微软雅黑" panose="020B0503020204020204" pitchFamily="34" charset="-122"/>
                 <a:ea typeface="微软雅黑" panose="020B0503020204020204" pitchFamily="34" charset="-122"/>
               </a:rPr>
               <a:t> </a:t>
             </a:r>
-            <a:endParaRPr lang="en-US" altLang="zh-CN" sz="1400" dirty="0">
+            <a:endParaRPr lang="en-US" altLang="zh-CN" sz="1600" dirty="0">
               <a:latin typeface="微软雅黑" panose="020B0503020204020204" pitchFamily="34" charset="-122"/>
               <a:ea typeface="微软雅黑" panose="020B0503020204020204" pitchFamily="34" charset="-122"/>
             </a:endParaRPr>
@@ -6185,27 +6165,27 @@
               </a:lnSpc>
             </a:pPr>
             <a:r>
-              <a:rPr lang="zh-CN" altLang="en-US" sz="1400" dirty="0">
+              <a:rPr lang="zh-CN" altLang="en-US" sz="1600" dirty="0">
                 <a:latin typeface="微软雅黑" panose="020B0503020204020204" pitchFamily="34" charset="-122"/>
                 <a:ea typeface="微软雅黑" panose="020B0503020204020204" pitchFamily="34" charset="-122"/>
               </a:rPr>
               <a:t>𝑠 (·) represent</a:t>
             </a:r>
             <a:r>
-              <a:rPr lang="en-US" altLang="zh-CN" sz="1400" dirty="0">
+              <a:rPr lang="en-US" altLang="zh-CN" sz="1600" dirty="0">
                 <a:latin typeface="微软雅黑" panose="020B0503020204020204" pitchFamily="34" charset="-122"/>
                 <a:ea typeface="微软雅黑" panose="020B0503020204020204" pitchFamily="34" charset="-122"/>
               </a:rPr>
               <a:t>s</a:t>
             </a:r>
             <a:r>
-              <a:rPr lang="zh-CN" altLang="en-US" sz="1400" dirty="0">
+              <a:rPr lang="zh-CN" altLang="en-US" sz="1600" dirty="0">
                 <a:latin typeface="微软雅黑" panose="020B0503020204020204" pitchFamily="34" charset="-122"/>
                 <a:ea typeface="微软雅黑" panose="020B0503020204020204" pitchFamily="34" charset="-122"/>
               </a:rPr>
               <a:t> the status of each event in the task chain 𝐶 = {𝑧, 𝑐0, 𝑐1, 𝑐2, ..., 𝑐𝑛 }, i.e., for any event 𝑐𝑖 </a:t>
             </a:r>
-            <a:endParaRPr lang="en-US" altLang="zh-CN" sz="1400" dirty="0">
+            <a:endParaRPr lang="en-US" altLang="zh-CN" sz="1600" dirty="0">
               <a:latin typeface="微软雅黑" panose="020B0503020204020204" pitchFamily="34" charset="-122"/>
               <a:ea typeface="微软雅黑" panose="020B0503020204020204" pitchFamily="34" charset="-122"/>
             </a:endParaRPr>
@@ -6217,13 +6197,13 @@
               </a:lnSpc>
             </a:pPr>
             <a:r>
-              <a:rPr lang="zh-CN" altLang="en-US" sz="1400" dirty="0">
+              <a:rPr lang="zh-CN" altLang="en-US" sz="1600" dirty="0">
                 <a:latin typeface="微软雅黑" panose="020B0503020204020204" pitchFamily="34" charset="-122"/>
                 <a:ea typeface="微软雅黑" panose="020B0503020204020204" pitchFamily="34" charset="-122"/>
               </a:rPr>
               <a:t>• If it is a scheduling task, then 𝑠 (𝑐𝑖 ) = 𝜏, </a:t>
             </a:r>
-            <a:endParaRPr lang="en-US" altLang="zh-CN" sz="1400" dirty="0">
+            <a:endParaRPr lang="en-US" altLang="zh-CN" sz="1600" dirty="0">
               <a:latin typeface="微软雅黑" panose="020B0503020204020204" pitchFamily="34" charset="-122"/>
               <a:ea typeface="微软雅黑" panose="020B0503020204020204" pitchFamily="34" charset="-122"/>
             </a:endParaRPr>
@@ -6235,7 +6215,7 @@
               </a:lnSpc>
             </a:pPr>
             <a:r>
-              <a:rPr lang="zh-CN" altLang="en-US" sz="1400" dirty="0">
+              <a:rPr lang="zh-CN" altLang="en-US" sz="1600" dirty="0">
                 <a:latin typeface="微软雅黑" panose="020B0503020204020204" pitchFamily="34" charset="-122"/>
                 <a:ea typeface="微软雅黑" panose="020B0503020204020204" pitchFamily="34" charset="-122"/>
               </a:rPr>
@@ -6513,12 +6493,139 @@
           </a:p>
         </p:txBody>
       </p:sp>
+      <p:sp>
+        <p:nvSpPr>
+          <p:cNvPr id="16" name="文本框 15">
+            <a:extLst>
+              <a:ext uri="{FF2B5EF4-FFF2-40B4-BE49-F238E27FC236}">
+                <a16:creationId xmlns:a16="http://schemas.microsoft.com/office/drawing/2014/main" id="{B692FF85-8852-4B26-1ED9-B0A24F6EB444}"/>
+              </a:ext>
+            </a:extLst>
+          </p:cNvPr>
+          <p:cNvSpPr txBox="1"/>
+          <p:nvPr/>
+        </p:nvSpPr>
+        <p:spPr>
+          <a:xfrm>
+            <a:off x="60512" y="4130145"/>
+            <a:ext cx="6127376" cy="377026"/>
+          </a:xfrm>
+          <a:prstGeom prst="rect">
+            <a:avLst/>
+          </a:prstGeom>
+          <a:noFill/>
+        </p:spPr>
+        <p:txBody>
+          <a:bodyPr wrap="square">
+            <a:spAutoFit/>
+          </a:bodyPr>
+          <a:lstStyle/>
+          <a:p>
+            <a:pPr>
+              <a:lnSpc>
+                <a:spcPct val="150000"/>
+              </a:lnSpc>
+            </a:pPr>
+            <a:r>
+              <a:rPr lang="en-US" altLang="zh-CN" sz="1400" b="1" dirty="0">
+                <a:latin typeface="微软雅黑" panose="020B0503020204020204" pitchFamily="34" charset="-122"/>
+                <a:ea typeface="微软雅黑" panose="020B0503020204020204" pitchFamily="34" charset="-122"/>
+              </a:rPr>
+              <a:t>Case 3: </a:t>
+            </a:r>
+            <a:r>
+              <a:rPr lang="zh-CN" altLang="en-US" sz="1400" b="1" dirty="0">
+                <a:latin typeface="微软雅黑" panose="020B0503020204020204" pitchFamily="34" charset="-122"/>
+                <a:ea typeface="微软雅黑" panose="020B0503020204020204" pitchFamily="34" charset="-122"/>
+              </a:rPr>
+              <a:t>𝒔 </a:t>
+            </a:r>
+            <a:r>
+              <a:rPr lang="en-US" altLang="zh-CN" sz="1400" b="1" dirty="0">
+                <a:latin typeface="微软雅黑" panose="020B0503020204020204" pitchFamily="34" charset="-122"/>
+                <a:ea typeface="微软雅黑" panose="020B0503020204020204" pitchFamily="34" charset="-122"/>
+              </a:rPr>
+              <a:t>(</a:t>
+            </a:r>
+            <a:r>
+              <a:rPr lang="zh-CN" altLang="en-US" sz="1400" b="1" dirty="0">
+                <a:latin typeface="微软雅黑" panose="020B0503020204020204" pitchFamily="34" charset="-122"/>
+                <a:ea typeface="微软雅黑" panose="020B0503020204020204" pitchFamily="34" charset="-122"/>
+              </a:rPr>
+              <a:t>𝒄𝒊</a:t>
+            </a:r>
+            <a:r>
+              <a:rPr lang="en-US" altLang="zh-CN" sz="1400" b="1" dirty="0">
+                <a:latin typeface="微软雅黑" panose="020B0503020204020204" pitchFamily="34" charset="-122"/>
+                <a:ea typeface="微软雅黑" panose="020B0503020204020204" pitchFamily="34" charset="-122"/>
+              </a:rPr>
+              <a:t>) = </a:t>
+            </a:r>
+            <a:r>
+              <a:rPr lang="zh-CN" altLang="en-US" sz="1400" b="1" dirty="0">
+                <a:latin typeface="微软雅黑" panose="020B0503020204020204" pitchFamily="34" charset="-122"/>
+                <a:ea typeface="微软雅黑" panose="020B0503020204020204" pitchFamily="34" charset="-122"/>
+              </a:rPr>
+              <a:t>𝝉</a:t>
+            </a:r>
+            <a:r>
+              <a:rPr lang="en-US" altLang="zh-CN" sz="1400" b="1" dirty="0">
+                <a:latin typeface="微软雅黑" panose="020B0503020204020204" pitchFamily="34" charset="-122"/>
+                <a:ea typeface="微软雅黑" panose="020B0503020204020204" pitchFamily="34" charset="-122"/>
+              </a:rPr>
+              <a:t>, </a:t>
+            </a:r>
+            <a:r>
+              <a:rPr lang="zh-CN" altLang="en-US" sz="1400" b="1" dirty="0">
+                <a:latin typeface="微软雅黑" panose="020B0503020204020204" pitchFamily="34" charset="-122"/>
+                <a:ea typeface="微软雅黑" panose="020B0503020204020204" pitchFamily="34" charset="-122"/>
+              </a:rPr>
+              <a:t>𝒔 </a:t>
+            </a:r>
+            <a:r>
+              <a:rPr lang="en-US" altLang="zh-CN" sz="1400" b="1" dirty="0">
+                <a:latin typeface="微软雅黑" panose="020B0503020204020204" pitchFamily="34" charset="-122"/>
+                <a:ea typeface="微软雅黑" panose="020B0503020204020204" pitchFamily="34" charset="-122"/>
+              </a:rPr>
+              <a:t>(</a:t>
+            </a:r>
+            <a:r>
+              <a:rPr lang="zh-CN" altLang="en-US" sz="1400" b="1" dirty="0">
+                <a:latin typeface="微软雅黑" panose="020B0503020204020204" pitchFamily="34" charset="-122"/>
+                <a:ea typeface="微软雅黑" panose="020B0503020204020204" pitchFamily="34" charset="-122"/>
+              </a:rPr>
+              <a:t>𝒄𝒊−</a:t>
+            </a:r>
+            <a:r>
+              <a:rPr lang="en-US" altLang="zh-CN" sz="1400" b="1" dirty="0">
+                <a:latin typeface="微软雅黑" panose="020B0503020204020204" pitchFamily="34" charset="-122"/>
+                <a:ea typeface="微软雅黑" panose="020B0503020204020204" pitchFamily="34" charset="-122"/>
+              </a:rPr>
+              <a:t>1) = </a:t>
+            </a:r>
+            <a:r>
+              <a:rPr lang="zh-CN" altLang="en-US" sz="1400" b="1" dirty="0">
+                <a:latin typeface="微软雅黑" panose="020B0503020204020204" pitchFamily="34" charset="-122"/>
+                <a:ea typeface="微软雅黑" panose="020B0503020204020204" pitchFamily="34" charset="-122"/>
+              </a:rPr>
+              <a:t>𝒎</a:t>
+            </a:r>
+            <a:r>
+              <a:rPr lang="en-US" altLang="zh-CN" sz="1400" b="1" dirty="0">
+                <a:latin typeface="微软雅黑" panose="020B0503020204020204" pitchFamily="34" charset="-122"/>
+                <a:ea typeface="微软雅黑" panose="020B0503020204020204" pitchFamily="34" charset="-122"/>
+              </a:rPr>
+              <a:t>. </a:t>
+            </a:r>
+          </a:p>
+        </p:txBody>
+      </p:sp>
       <p:pic>
         <p:nvPicPr>
-          <p:cNvPr id="8" name="图片 7">
-            <a:extLst>
-              <a:ext uri="{FF2B5EF4-FFF2-40B4-BE49-F238E27FC236}">
-                <a16:creationId xmlns:a16="http://schemas.microsoft.com/office/drawing/2014/main" id="{C005A1A4-C919-C4EE-22BB-036DB857DC92}"/>
+          <p:cNvPr id="20" name="图片 19">
+            <a:extLst>
+              <a:ext uri="{FF2B5EF4-FFF2-40B4-BE49-F238E27FC236}">
+                <a16:creationId xmlns:a16="http://schemas.microsoft.com/office/drawing/2014/main" id="{7642F1B9-0448-C093-DA7F-C0A3D011D9E5}"/>
               </a:ext>
             </a:extLst>
           </p:cNvPr>
@@ -6535,165 +6642,8 @@
         </p:blipFill>
         <p:spPr>
           <a:xfrm>
-            <a:off x="755557" y="3249814"/>
-            <a:ext cx="2400000" cy="761905"/>
-          </a:xfrm>
-          <a:prstGeom prst="rect">
-            <a:avLst/>
-          </a:prstGeom>
-        </p:spPr>
-      </p:pic>
-      <p:sp>
-        <p:nvSpPr>
-          <p:cNvPr id="16" name="文本框 15">
-            <a:extLst>
-              <a:ext uri="{FF2B5EF4-FFF2-40B4-BE49-F238E27FC236}">
-                <a16:creationId xmlns:a16="http://schemas.microsoft.com/office/drawing/2014/main" id="{B692FF85-8852-4B26-1ED9-B0A24F6EB444}"/>
-              </a:ext>
-            </a:extLst>
-          </p:cNvPr>
-          <p:cNvSpPr txBox="1"/>
-          <p:nvPr/>
-        </p:nvSpPr>
-        <p:spPr>
-          <a:xfrm>
-            <a:off x="60512" y="4130145"/>
-            <a:ext cx="6127376" cy="377026"/>
-          </a:xfrm>
-          <a:prstGeom prst="rect">
-            <a:avLst/>
-          </a:prstGeom>
-          <a:noFill/>
-        </p:spPr>
-        <p:txBody>
-          <a:bodyPr wrap="square">
-            <a:spAutoFit/>
-          </a:bodyPr>
-          <a:lstStyle/>
-          <a:p>
-            <a:pPr>
-              <a:lnSpc>
-                <a:spcPct val="150000"/>
-              </a:lnSpc>
-            </a:pPr>
-            <a:r>
-              <a:rPr lang="en-US" altLang="zh-CN" sz="1400" b="1" dirty="0">
-                <a:latin typeface="微软雅黑" panose="020B0503020204020204" pitchFamily="34" charset="-122"/>
-                <a:ea typeface="微软雅黑" panose="020B0503020204020204" pitchFamily="34" charset="-122"/>
-              </a:rPr>
-              <a:t>Case 3: </a:t>
-            </a:r>
-            <a:r>
-              <a:rPr lang="zh-CN" altLang="en-US" sz="1400" b="1" dirty="0">
-                <a:latin typeface="微软雅黑" panose="020B0503020204020204" pitchFamily="34" charset="-122"/>
-                <a:ea typeface="微软雅黑" panose="020B0503020204020204" pitchFamily="34" charset="-122"/>
-              </a:rPr>
-              <a:t>𝒔 </a:t>
-            </a:r>
-            <a:r>
-              <a:rPr lang="en-US" altLang="zh-CN" sz="1400" b="1" dirty="0">
-                <a:latin typeface="微软雅黑" panose="020B0503020204020204" pitchFamily="34" charset="-122"/>
-                <a:ea typeface="微软雅黑" panose="020B0503020204020204" pitchFamily="34" charset="-122"/>
-              </a:rPr>
-              <a:t>(</a:t>
-            </a:r>
-            <a:r>
-              <a:rPr lang="zh-CN" altLang="en-US" sz="1400" b="1" dirty="0">
-                <a:latin typeface="微软雅黑" panose="020B0503020204020204" pitchFamily="34" charset="-122"/>
-                <a:ea typeface="微软雅黑" panose="020B0503020204020204" pitchFamily="34" charset="-122"/>
-              </a:rPr>
-              <a:t>𝒄𝒊</a:t>
-            </a:r>
-            <a:r>
-              <a:rPr lang="en-US" altLang="zh-CN" sz="1400" b="1" dirty="0">
-                <a:latin typeface="微软雅黑" panose="020B0503020204020204" pitchFamily="34" charset="-122"/>
-                <a:ea typeface="微软雅黑" panose="020B0503020204020204" pitchFamily="34" charset="-122"/>
-              </a:rPr>
-              <a:t>) = </a:t>
-            </a:r>
-            <a:r>
-              <a:rPr lang="zh-CN" altLang="en-US" sz="1400" b="1" dirty="0">
-                <a:latin typeface="微软雅黑" panose="020B0503020204020204" pitchFamily="34" charset="-122"/>
-                <a:ea typeface="微软雅黑" panose="020B0503020204020204" pitchFamily="34" charset="-122"/>
-              </a:rPr>
-              <a:t>𝝉</a:t>
-            </a:r>
-            <a:r>
-              <a:rPr lang="en-US" altLang="zh-CN" sz="1400" b="1" dirty="0">
-                <a:latin typeface="微软雅黑" panose="020B0503020204020204" pitchFamily="34" charset="-122"/>
-                <a:ea typeface="微软雅黑" panose="020B0503020204020204" pitchFamily="34" charset="-122"/>
-              </a:rPr>
-              <a:t>, </a:t>
-            </a:r>
-            <a:r>
-              <a:rPr lang="zh-CN" altLang="en-US" sz="1400" b="1" dirty="0">
-                <a:latin typeface="微软雅黑" panose="020B0503020204020204" pitchFamily="34" charset="-122"/>
-                <a:ea typeface="微软雅黑" panose="020B0503020204020204" pitchFamily="34" charset="-122"/>
-              </a:rPr>
-              <a:t>𝒔 </a:t>
-            </a:r>
-            <a:r>
-              <a:rPr lang="en-US" altLang="zh-CN" sz="1400" b="1" dirty="0">
-                <a:latin typeface="微软雅黑" panose="020B0503020204020204" pitchFamily="34" charset="-122"/>
-                <a:ea typeface="微软雅黑" panose="020B0503020204020204" pitchFamily="34" charset="-122"/>
-              </a:rPr>
-              <a:t>(</a:t>
-            </a:r>
-            <a:r>
-              <a:rPr lang="zh-CN" altLang="en-US" sz="1400" b="1" dirty="0">
-                <a:latin typeface="微软雅黑" panose="020B0503020204020204" pitchFamily="34" charset="-122"/>
-                <a:ea typeface="微软雅黑" panose="020B0503020204020204" pitchFamily="34" charset="-122"/>
-              </a:rPr>
-              <a:t>𝒄𝒊−</a:t>
-            </a:r>
-            <a:r>
-              <a:rPr lang="en-US" altLang="zh-CN" sz="1400" b="1" dirty="0">
-                <a:latin typeface="微软雅黑" panose="020B0503020204020204" pitchFamily="34" charset="-122"/>
-                <a:ea typeface="微软雅黑" panose="020B0503020204020204" pitchFamily="34" charset="-122"/>
-              </a:rPr>
-              <a:t>1) = </a:t>
-            </a:r>
-            <a:r>
-              <a:rPr lang="zh-CN" altLang="en-US" sz="1400" b="1" dirty="0">
-                <a:latin typeface="微软雅黑" panose="020B0503020204020204" pitchFamily="34" charset="-122"/>
-                <a:ea typeface="微软雅黑" panose="020B0503020204020204" pitchFamily="34" charset="-122"/>
-              </a:rPr>
-              <a:t>𝒎</a:t>
-            </a:r>
-            <a:r>
-              <a:rPr lang="en-US" altLang="zh-CN" sz="1400" b="1" dirty="0">
-                <a:latin typeface="微软雅黑" panose="020B0503020204020204" pitchFamily="34" charset="-122"/>
-                <a:ea typeface="微软雅黑" panose="020B0503020204020204" pitchFamily="34" charset="-122"/>
-              </a:rPr>
-              <a:t>. </a:t>
-            </a:r>
-          </a:p>
-        </p:txBody>
-      </p:sp>
-      <p:pic>
-        <p:nvPicPr>
-          <p:cNvPr id="20" name="图片 19">
-            <a:extLst>
-              <a:ext uri="{FF2B5EF4-FFF2-40B4-BE49-F238E27FC236}">
-                <a16:creationId xmlns:a16="http://schemas.microsoft.com/office/drawing/2014/main" id="{7642F1B9-0448-C093-DA7F-C0A3D011D9E5}"/>
-              </a:ext>
-            </a:extLst>
-          </p:cNvPr>
-          <p:cNvPicPr>
-            <a:picLocks noChangeAspect="1"/>
-          </p:cNvPicPr>
-          <p:nvPr/>
-        </p:nvPicPr>
-        <p:blipFill>
-          <a:blip r:embed="rId4"/>
-          <a:stretch>
-            <a:fillRect/>
-          </a:stretch>
-        </p:blipFill>
-        <p:spPr>
-          <a:xfrm>
             <a:off x="932924" y="4751476"/>
-            <a:ext cx="3738651" cy="679755"/>
+            <a:ext cx="4073947" cy="740718"/>
           </a:xfrm>
           <a:prstGeom prst="rect">
             <a:avLst/>
@@ -6926,15 +6876,15 @@
           <p:nvPr/>
         </p:nvPicPr>
         <p:blipFill>
-          <a:blip r:embed="rId5"/>
+          <a:blip r:embed="rId4"/>
           <a:stretch>
             <a:fillRect/>
           </a:stretch>
         </p:blipFill>
         <p:spPr>
           <a:xfrm>
-            <a:off x="755557" y="2104013"/>
-            <a:ext cx="3916018" cy="345036"/>
+            <a:off x="727780" y="2079020"/>
+            <a:ext cx="4279091" cy="377026"/>
           </a:xfrm>
           <a:prstGeom prst="rect">
             <a:avLst/>
@@ -6990,6 +6940,36 @@
             <a:extLst>
               <a:ext uri="{FF2B5EF4-FFF2-40B4-BE49-F238E27FC236}">
                 <a16:creationId xmlns:a16="http://schemas.microsoft.com/office/drawing/2014/main" id="{FA31306F-4257-5558-33E9-EC63B50531E2}"/>
+              </a:ext>
+            </a:extLst>
+          </p:cNvPr>
+          <p:cNvPicPr>
+            <a:picLocks noChangeAspect="1"/>
+          </p:cNvPicPr>
+          <p:nvPr/>
+        </p:nvPicPr>
+        <p:blipFill>
+          <a:blip r:embed="rId5"/>
+          <a:stretch>
+            <a:fillRect/>
+          </a:stretch>
+        </p:blipFill>
+        <p:spPr>
+          <a:xfrm>
+            <a:off x="7055491" y="2878168"/>
+            <a:ext cx="4380952" cy="1761905"/>
+          </a:xfrm>
+          <a:prstGeom prst="rect">
+            <a:avLst/>
+          </a:prstGeom>
+        </p:spPr>
+      </p:pic>
+      <p:pic>
+        <p:nvPicPr>
+          <p:cNvPr id="5" name="图片 4">
+            <a:extLst>
+              <a:ext uri="{FF2B5EF4-FFF2-40B4-BE49-F238E27FC236}">
+                <a16:creationId xmlns:a16="http://schemas.microsoft.com/office/drawing/2014/main" id="{E9B4B538-9EC9-BDDE-BD9C-A18C968C4B5E}"/>
               </a:ext>
             </a:extLst>
           </p:cNvPr>
@@ -7006,8 +6986,8 @@
         </p:blipFill>
         <p:spPr>
           <a:xfrm>
-            <a:off x="7055491" y="2878168"/>
-            <a:ext cx="4380952" cy="1761905"/>
+            <a:off x="777807" y="3181118"/>
+            <a:ext cx="3314286" cy="876190"/>
           </a:xfrm>
           <a:prstGeom prst="rect">
             <a:avLst/>
@@ -10399,7 +10379,7 @@
         <p:spPr>
           <a:xfrm>
             <a:off x="301483" y="1335248"/>
-            <a:ext cx="11589034" cy="2316403"/>
+            <a:ext cx="11589034" cy="3003515"/>
           </a:xfrm>
           <a:prstGeom prst="rect">
             <a:avLst/>
@@ -10419,7 +10399,7 @@
               <a:buChar char="Ø"/>
             </a:pPr>
             <a:r>
-              <a:rPr lang="en-US" altLang="zh-CN" sz="1400" dirty="0">
+              <a:rPr lang="en-US" altLang="zh-CN" sz="1600" dirty="0">
                 <a:latin typeface="微软雅黑" panose="020B0503020204020204" pitchFamily="34" charset="-122"/>
                 <a:ea typeface="微软雅黑" panose="020B0503020204020204" pitchFamily="34" charset="-122"/>
                 <a:sym typeface="+mn-ea"/>
@@ -10427,7 +10407,7 @@
               <a:t>Distributed real-time systems usually have a number of control tasks on </a:t>
             </a:r>
             <a:r>
-              <a:rPr lang="en-US" altLang="zh-CN" sz="1400" b="1" dirty="0">
+              <a:rPr lang="en-US" altLang="zh-CN" sz="1600" b="1" dirty="0">
                 <a:latin typeface="微软雅黑" panose="020B0503020204020204" pitchFamily="34" charset="-122"/>
                 <a:ea typeface="微软雅黑" panose="020B0503020204020204" pitchFamily="34" charset="-122"/>
                 <a:sym typeface="+mn-ea"/>
@@ -10435,7 +10415,7 @@
               <a:t>multiple ECUs </a:t>
             </a:r>
             <a:r>
-              <a:rPr lang="en-US" altLang="zh-CN" sz="1400" dirty="0">
+              <a:rPr lang="en-US" altLang="zh-CN" sz="1600" dirty="0">
                 <a:latin typeface="微软雅黑" panose="020B0503020204020204" pitchFamily="34" charset="-122"/>
                 <a:ea typeface="微软雅黑" panose="020B0503020204020204" pitchFamily="34" charset="-122"/>
                 <a:sym typeface="+mn-ea"/>
@@ -10443,7 +10423,7 @@
               <a:t>(Electronic Control Units) forming </a:t>
             </a:r>
             <a:r>
-              <a:rPr lang="en-US" altLang="zh-CN" sz="1400" b="1" dirty="0">
+              <a:rPr lang="en-US" altLang="zh-CN" sz="1600" b="1" dirty="0">
                 <a:latin typeface="微软雅黑" panose="020B0503020204020204" pitchFamily="34" charset="-122"/>
                 <a:ea typeface="微软雅黑" panose="020B0503020204020204" pitchFamily="34" charset="-122"/>
                 <a:sym typeface="+mn-ea"/>
@@ -10451,7 +10431,7 @@
               <a:t>a chain of tasks with causal relationships</a:t>
             </a:r>
             <a:r>
-              <a:rPr lang="en-US" altLang="zh-CN" sz="1400" dirty="0">
+              <a:rPr lang="en-US" altLang="zh-CN" sz="1600" dirty="0">
                 <a:latin typeface="微软雅黑" panose="020B0503020204020204" pitchFamily="34" charset="-122"/>
                 <a:ea typeface="微软雅黑" panose="020B0503020204020204" pitchFamily="34" charset="-122"/>
                 <a:sym typeface="+mn-ea"/>
@@ -10468,7 +10448,7 @@
               <a:buChar char="Ø"/>
             </a:pPr>
             <a:r>
-              <a:rPr lang="en-US" altLang="zh-CN" sz="1400" dirty="0">
+              <a:rPr lang="en-US" altLang="zh-CN" sz="1600" dirty="0">
                 <a:latin typeface="微软雅黑" panose="020B0503020204020204" pitchFamily="34" charset="-122"/>
                 <a:ea typeface="微软雅黑" panose="020B0503020204020204" pitchFamily="34" charset="-122"/>
                 <a:sym typeface="+mn-ea"/>
@@ -10485,7 +10465,7 @@
               <a:buChar char="Ø"/>
             </a:pPr>
             <a:r>
-              <a:rPr lang="en-US" altLang="zh-CN" sz="1400" dirty="0">
+              <a:rPr lang="en-US" altLang="zh-CN" sz="1600" dirty="0">
                 <a:solidFill>
                   <a:srgbClr val="FF0000"/>
                 </a:solidFill>
@@ -10505,7 +10485,7 @@
               <a:buChar char="Ø"/>
             </a:pPr>
             <a:r>
-              <a:rPr lang="en-US" altLang="zh-CN" sz="1400" dirty="0">
+              <a:rPr lang="en-US" altLang="zh-CN" sz="1600" dirty="0">
                 <a:solidFill>
                   <a:srgbClr val="FF0000"/>
                 </a:solidFill>
@@ -10525,7 +10505,7 @@
               <a:buChar char="Ø"/>
             </a:pPr>
             <a:r>
-              <a:rPr lang="en-US" altLang="zh-CN" sz="1400" b="1" dirty="0">
+              <a:rPr lang="en-US" altLang="zh-CN" sz="1600" b="1" dirty="0">
                 <a:latin typeface="微软雅黑" panose="020B0503020204020204" pitchFamily="34" charset="-122"/>
                 <a:ea typeface="微软雅黑" panose="020B0503020204020204" pitchFamily="34" charset="-122"/>
                 <a:sym typeface="+mn-ea"/>
@@ -10533,7 +10513,7 @@
               <a:t>Existing analyses are mostly based on CAN buses </a:t>
             </a:r>
             <a:r>
-              <a:rPr lang="en-US" altLang="zh-CN" sz="1400" dirty="0">
+              <a:rPr lang="en-US" altLang="zh-CN" sz="1600" dirty="0">
                 <a:latin typeface="微软雅黑" panose="020B0503020204020204" pitchFamily="34" charset="-122"/>
                 <a:ea typeface="微软雅黑" panose="020B0503020204020204" pitchFamily="34" charset="-122"/>
                 <a:sym typeface="+mn-ea"/>
@@ -10601,8 +10581,8 @@
         </p:nvSpPr>
         <p:spPr>
           <a:xfrm>
-            <a:off x="301484" y="4349994"/>
-            <a:ext cx="11589033" cy="1023742"/>
+            <a:off x="301484" y="5037106"/>
+            <a:ext cx="11589033" cy="1526187"/>
           </a:xfrm>
           <a:prstGeom prst="rect">
             <a:avLst/>
@@ -10623,7 +10603,7 @@
               <a:buChar char="ü"/>
             </a:pPr>
             <a:r>
-              <a:rPr lang="en-US" altLang="zh-CN" sz="1400" dirty="0">
+              <a:rPr lang="en-US" altLang="zh-CN" sz="1600" dirty="0">
                 <a:solidFill>
                   <a:srgbClr val="0070C0"/>
                 </a:solidFill>
@@ -10644,7 +10624,7 @@
               <a:buChar char="ü"/>
             </a:pPr>
             <a:r>
-              <a:rPr lang="en-US" altLang="zh-CN" sz="1400" dirty="0">
+              <a:rPr lang="en-US" altLang="zh-CN" sz="1600" dirty="0">
                 <a:solidFill>
                   <a:srgbClr val="0070C0"/>
                 </a:solidFill>
@@ -10665,7 +10645,7 @@
               <a:buChar char="ü"/>
             </a:pPr>
             <a:r>
-              <a:rPr lang="en-US" altLang="zh-CN" sz="1400" dirty="0">
+              <a:rPr lang="en-US" altLang="zh-CN" sz="1600" dirty="0">
                 <a:solidFill>
                   <a:srgbClr val="0070C0"/>
                 </a:solidFill>
@@ -10676,7 +10656,7 @@
               </a:rPr>
               <a:t>Analyze the maximum reaction time and maximum data age.</a:t>
             </a:r>
-            <a:endParaRPr lang="zh-CN" altLang="en-US" sz="1400" dirty="0">
+            <a:endParaRPr lang="zh-CN" altLang="en-US" sz="1600" dirty="0">
               <a:solidFill>
                 <a:srgbClr val="0070C0"/>
               </a:solidFill>
@@ -10704,7 +10684,7 @@
         </p:nvSpPr>
         <p:spPr>
           <a:xfrm>
-            <a:off x="0" y="3852815"/>
+            <a:off x="0" y="4539927"/>
             <a:ext cx="2528047" cy="296015"/>
           </a:xfrm>
           <a:prstGeom prst="rect">
@@ -10838,8 +10818,8 @@
         </p:nvSpPr>
         <p:spPr>
           <a:xfrm>
-            <a:off x="-2" y="1287318"/>
-            <a:ext cx="7965145" cy="1508490"/>
+            <a:off x="-47811" y="1109654"/>
+            <a:ext cx="7965145" cy="1710853"/>
           </a:xfrm>
           <a:prstGeom prst="rect">
             <a:avLst/>
@@ -10862,27 +10842,27 @@
               <a:buChar char="Ø"/>
             </a:pPr>
             <a:r>
-              <a:rPr lang="en-US" altLang="zh-CN" sz="1400" b="1" dirty="0">
+              <a:rPr lang="en-US" altLang="zh-CN" sz="1600" b="1" dirty="0">
                 <a:latin typeface="微软雅黑" panose="020B0503020204020204" pitchFamily="34" charset="-122"/>
                 <a:ea typeface="微软雅黑" panose="020B0503020204020204" pitchFamily="34" charset="-122"/>
               </a:rPr>
               <a:t>Period Optimization for Hard Real-time Distributed Automotive Systems_</a:t>
             </a:r>
             <a:r>
-              <a:rPr lang="it-IT" altLang="zh-CN" sz="1400" b="1" dirty="0">
+              <a:rPr lang="it-IT" altLang="zh-CN" sz="1600" b="1" dirty="0">
                 <a:latin typeface="微软雅黑" panose="020B0503020204020204" pitchFamily="34" charset="-122"/>
                 <a:ea typeface="微软雅黑" panose="020B0503020204020204" pitchFamily="34" charset="-122"/>
               </a:rPr>
               <a:t>Davare_</a:t>
             </a:r>
             <a:r>
-              <a:rPr lang="en-US" altLang="zh-CN" sz="1400" b="1" dirty="0">
+              <a:rPr lang="en-US" altLang="zh-CN" sz="1600" b="1" dirty="0">
                 <a:latin typeface="微软雅黑" panose="020B0503020204020204" pitchFamily="34" charset="-122"/>
                 <a:ea typeface="微软雅黑" panose="020B0503020204020204" pitchFamily="34" charset="-122"/>
               </a:rPr>
               <a:t> DAC 2007</a:t>
             </a:r>
-            <a:endParaRPr lang="it-IT" altLang="zh-CN" sz="1400" b="1" dirty="0">
+            <a:endParaRPr lang="it-IT" altLang="zh-CN" sz="1600" b="1" dirty="0">
               <a:latin typeface="微软雅黑" panose="020B0503020204020204" pitchFamily="34" charset="-122"/>
               <a:ea typeface="微软雅黑" panose="020B0503020204020204" pitchFamily="34" charset="-122"/>
             </a:endParaRPr>
@@ -10899,14 +10879,14 @@
               <a:buChar char="•"/>
             </a:pPr>
             <a:r>
-              <a:rPr lang="en-US" altLang="zh-CN" sz="1400" dirty="0">
+              <a:rPr lang="en-US" altLang="zh-CN" sz="1600" dirty="0">
                 <a:latin typeface="微软雅黑" panose="020B0503020204020204" pitchFamily="34" charset="-122"/>
                 <a:ea typeface="微软雅黑" panose="020B0503020204020204" pitchFamily="34" charset="-122"/>
               </a:rPr>
               <a:t>Worst-case response time and period of all jobs in the path are summed. </a:t>
             </a:r>
             <a:r>
-              <a:rPr lang="en-US" altLang="zh-CN" sz="1400" dirty="0">
+              <a:rPr lang="en-US" altLang="zh-CN" sz="1600" dirty="0">
                 <a:solidFill>
                   <a:srgbClr val="00B0F0"/>
                 </a:solidFill>
@@ -11001,27 +10981,27 @@
               <a:buChar char="Ø"/>
             </a:pPr>
             <a:r>
-              <a:rPr lang="en-US" altLang="zh-CN" sz="1400" b="1" dirty="0">
+              <a:rPr lang="en-US" altLang="zh-CN" sz="1600" b="1" dirty="0">
                 <a:latin typeface="微软雅黑" panose="020B0503020204020204" pitchFamily="34" charset="-122"/>
                 <a:ea typeface="微软雅黑" panose="020B0503020204020204" pitchFamily="34" charset="-122"/>
               </a:rPr>
               <a:t>End-to-End Timing Analysis of Sporadic Cause-Effect Chains in Distributed Systems_</a:t>
             </a:r>
             <a:r>
-              <a:rPr lang="it-IT" altLang="zh-CN" sz="1400" b="1" dirty="0">
+              <a:rPr lang="it-IT" altLang="zh-CN" sz="1600" b="1" dirty="0">
                 <a:latin typeface="微软雅黑" panose="020B0503020204020204" pitchFamily="34" charset="-122"/>
                 <a:ea typeface="微软雅黑" panose="020B0503020204020204" pitchFamily="34" charset="-122"/>
               </a:rPr>
               <a:t>MARCO DÜRR_</a:t>
             </a:r>
             <a:r>
-              <a:rPr lang="en-US" altLang="zh-CN" sz="1400" b="1" dirty="0">
+              <a:rPr lang="en-US" altLang="zh-CN" sz="1600" b="1" dirty="0">
                 <a:latin typeface="微软雅黑" panose="020B0503020204020204" pitchFamily="34" charset="-122"/>
                 <a:ea typeface="微软雅黑" panose="020B0503020204020204" pitchFamily="34" charset="-122"/>
               </a:rPr>
               <a:t> ESWEEK-TECS 2019</a:t>
             </a:r>
-            <a:endParaRPr lang="it-IT" altLang="zh-CN" sz="1400" b="1" dirty="0">
+            <a:endParaRPr lang="it-IT" altLang="zh-CN" sz="1600" b="1" dirty="0">
               <a:latin typeface="微软雅黑" panose="020B0503020204020204" pitchFamily="34" charset="-122"/>
               <a:ea typeface="微软雅黑" panose="020B0503020204020204" pitchFamily="34" charset="-122"/>
             </a:endParaRPr>
@@ -11036,21 +11016,21 @@
               </a:spcBef>
             </a:pPr>
             <a:r>
-              <a:rPr lang="en-US" altLang="zh-CN" sz="1400" dirty="0" err="1">
+              <a:rPr lang="en-US" altLang="zh-CN" sz="1600" dirty="0" err="1">
                 <a:latin typeface="微软雅黑" panose="020B0503020204020204" pitchFamily="34" charset="-122"/>
                 <a:ea typeface="微软雅黑" panose="020B0503020204020204" pitchFamily="34" charset="-122"/>
               </a:rPr>
               <a:t>Analyse</a:t>
             </a:r>
             <a:r>
-              <a:rPr lang="en-US" altLang="zh-CN" sz="1400" dirty="0">
+              <a:rPr lang="en-US" altLang="zh-CN" sz="1600" dirty="0">
                 <a:latin typeface="微软雅黑" panose="020B0503020204020204" pitchFamily="34" charset="-122"/>
                 <a:ea typeface="微软雅黑" panose="020B0503020204020204" pitchFamily="34" charset="-122"/>
               </a:rPr>
               <a:t> maximum reaction time (data age) in the form of </a:t>
             </a:r>
             <a:r>
-              <a:rPr lang="en-US" altLang="zh-CN" sz="1400" dirty="0">
+              <a:rPr lang="en-US" altLang="zh-CN" sz="1600" dirty="0">
                 <a:solidFill>
                   <a:srgbClr val="00B0F0"/>
                 </a:solidFill>
@@ -11078,7 +11058,7 @@
         </p:nvSpPr>
         <p:spPr>
           <a:xfrm>
-            <a:off x="-2779" y="4185095"/>
+            <a:off x="-5554" y="4428248"/>
             <a:ext cx="7970698" cy="1971349"/>
           </a:xfrm>
           <a:prstGeom prst="rect">
@@ -11265,27 +11245,27 @@
               <a:buChar char="Ø"/>
             </a:pPr>
             <a:r>
-              <a:rPr lang="en-US" altLang="zh-CN" sz="1400" b="1" dirty="0">
+              <a:rPr lang="en-US" altLang="zh-CN" sz="1600" b="1" dirty="0">
                 <a:latin typeface="微软雅黑" panose="020B0503020204020204" pitchFamily="34" charset="-122"/>
                 <a:ea typeface="微软雅黑" panose="020B0503020204020204" pitchFamily="34" charset="-122"/>
               </a:rPr>
               <a:t>Timing Analysis of Asynchronized Distributed Cause-Effect Chains _</a:t>
             </a:r>
             <a:r>
-              <a:rPr lang="it-IT" altLang="zh-CN" sz="1400" b="1" dirty="0">
+              <a:rPr lang="it-IT" altLang="zh-CN" sz="1600" b="1" dirty="0">
                 <a:latin typeface="微软雅黑" panose="020B0503020204020204" pitchFamily="34" charset="-122"/>
                 <a:ea typeface="微软雅黑" panose="020B0503020204020204" pitchFamily="34" charset="-122"/>
               </a:rPr>
               <a:t>Günzel</a:t>
             </a:r>
             <a:r>
-              <a:rPr lang="en-US" altLang="zh-CN" sz="1400" b="1" dirty="0">
+              <a:rPr lang="en-US" altLang="zh-CN" sz="1600" b="1" dirty="0">
                 <a:latin typeface="微软雅黑" panose="020B0503020204020204" pitchFamily="34" charset="-122"/>
                 <a:ea typeface="微软雅黑" panose="020B0503020204020204" pitchFamily="34" charset="-122"/>
               </a:rPr>
               <a:t>_ RTAS 2021</a:t>
             </a:r>
-            <a:endParaRPr lang="it-IT" altLang="zh-CN" sz="1400" b="1" dirty="0">
+            <a:endParaRPr lang="it-IT" altLang="zh-CN" sz="1600" b="1" dirty="0">
               <a:latin typeface="微软雅黑" panose="020B0503020204020204" pitchFamily="34" charset="-122"/>
               <a:ea typeface="微软雅黑" panose="020B0503020204020204" pitchFamily="34" charset="-122"/>
             </a:endParaRPr>
@@ -11300,7 +11280,7 @@
               </a:spcBef>
             </a:pPr>
             <a:r>
-              <a:rPr lang="en-US" altLang="zh-CN" sz="1400" dirty="0">
+              <a:rPr lang="en-US" altLang="zh-CN" sz="1600" dirty="0">
                 <a:solidFill>
                   <a:srgbClr val="00B0F0"/>
                 </a:solidFill>
@@ -11310,7 +11290,7 @@
               <a:t>Cutting model</a:t>
             </a:r>
             <a:r>
-              <a:rPr lang="en-US" altLang="zh-CN" sz="1400" dirty="0">
+              <a:rPr lang="en-US" altLang="zh-CN" sz="1600" dirty="0">
                 <a:latin typeface="微软雅黑" panose="020B0503020204020204" pitchFamily="34" charset="-122"/>
                 <a:ea typeface="微软雅黑" panose="020B0503020204020204" pitchFamily="34" charset="-122"/>
               </a:rPr>
@@ -11370,7 +11350,7 @@
         </p:blipFill>
         <p:spPr>
           <a:xfrm>
-            <a:off x="236382" y="5715205"/>
+            <a:off x="8069906" y="5726691"/>
             <a:ext cx="3990476" cy="323810"/>
           </a:xfrm>
           <a:prstGeom prst="rect">
@@ -11400,7 +11380,7 @@
         </p:blipFill>
         <p:spPr>
           <a:xfrm>
-            <a:off x="7965144" y="5527846"/>
+            <a:off x="7965144" y="5258090"/>
             <a:ext cx="4200000" cy="228571"/>
           </a:xfrm>
           <a:prstGeom prst="rect">
@@ -11430,7 +11410,7 @@
         </p:blipFill>
         <p:spPr>
           <a:xfrm>
-            <a:off x="8023412" y="3429000"/>
+            <a:off x="7917334" y="3016910"/>
             <a:ext cx="4021245" cy="1964832"/>
           </a:xfrm>
           <a:prstGeom prst="rect">
@@ -11573,7 +11553,7 @@
         <p:spPr>
           <a:xfrm>
             <a:off x="-26335" y="1335134"/>
-            <a:ext cx="6678147" cy="1023742"/>
+            <a:ext cx="10658893" cy="1156855"/>
           </a:xfrm>
           <a:prstGeom prst="rect">
             <a:avLst/>
@@ -11594,42 +11574,52 @@
               </a:spcBef>
             </a:pPr>
             <a:r>
-              <a:rPr lang="en-US" altLang="zh-CN" sz="1400" b="1" dirty="0">
+              <a:rPr lang="en-US" altLang="zh-CN" sz="1600" b="1" dirty="0">
                 <a:latin typeface="微软雅黑" panose="020B0503020204020204" pitchFamily="34" charset="-122"/>
                 <a:ea typeface="微软雅黑" panose="020B0503020204020204" pitchFamily="34" charset="-122"/>
               </a:rPr>
               <a:t>Time-sensitive networking</a:t>
             </a:r>
             <a:r>
-              <a:rPr lang="zh-CN" altLang="en-US" sz="1400" b="1" dirty="0">
+              <a:rPr lang="zh-CN" altLang="en-US" sz="1600" b="1" dirty="0">
                 <a:latin typeface="微软雅黑" panose="020B0503020204020204" pitchFamily="34" charset="-122"/>
                 <a:ea typeface="微软雅黑" panose="020B0503020204020204" pitchFamily="34" charset="-122"/>
               </a:rPr>
               <a:t>（</a:t>
             </a:r>
             <a:r>
-              <a:rPr lang="en-US" altLang="zh-CN" sz="1400" b="1" dirty="0">
+              <a:rPr lang="en-US" altLang="zh-CN" sz="1600" b="1" dirty="0">
                 <a:latin typeface="微软雅黑" panose="020B0503020204020204" pitchFamily="34" charset="-122"/>
                 <a:ea typeface="微软雅黑" panose="020B0503020204020204" pitchFamily="34" charset="-122"/>
               </a:rPr>
               <a:t>TSN</a:t>
             </a:r>
             <a:r>
-              <a:rPr lang="zh-CN" altLang="en-US" sz="1400" b="1" dirty="0">
+              <a:rPr lang="zh-CN" altLang="en-US" sz="1600" b="1" dirty="0">
                 <a:latin typeface="微软雅黑" panose="020B0503020204020204" pitchFamily="34" charset="-122"/>
                 <a:ea typeface="微软雅黑" panose="020B0503020204020204" pitchFamily="34" charset="-122"/>
               </a:rPr>
               <a:t>）</a:t>
             </a:r>
             <a:r>
-              <a:rPr lang="en-US" altLang="zh-CN" sz="1400" b="1" dirty="0">
+              <a:rPr lang="en-US" altLang="zh-CN" sz="1600" b="1" dirty="0">
                 <a:latin typeface="微软雅黑" panose="020B0503020204020204" pitchFamily="34" charset="-122"/>
                 <a:ea typeface="微软雅黑" panose="020B0503020204020204" pitchFamily="34" charset="-122"/>
               </a:rPr>
               <a:t> </a:t>
             </a:r>
-            <a:r>
-              <a:rPr lang="en-US" altLang="zh-CN" sz="1400" dirty="0">
+          </a:p>
+          <a:p>
+            <a:pPr>
+              <a:lnSpc>
+                <a:spcPct val="150000"/>
+              </a:lnSpc>
+              <a:spcBef>
+                <a:spcPts val="0"/>
+              </a:spcBef>
+            </a:pPr>
+            <a:r>
+              <a:rPr lang="en-US" altLang="zh-CN" sz="1600" dirty="0">
                 <a:latin typeface="微软雅黑" panose="020B0503020204020204" pitchFamily="34" charset="-122"/>
                 <a:ea typeface="微软雅黑" panose="020B0503020204020204" pitchFamily="34" charset="-122"/>
               </a:rPr>
@@ -11697,7 +11687,7 @@
         <p:spPr>
           <a:xfrm>
             <a:off x="-26335" y="2690598"/>
-            <a:ext cx="6991911" cy="700576"/>
+            <a:ext cx="6991911" cy="787523"/>
           </a:xfrm>
           <a:prstGeom prst="rect">
             <a:avLst/>
@@ -11716,28 +11706,28 @@
               </a:lnSpc>
             </a:pPr>
             <a:r>
-              <a:rPr lang="en-US" altLang="zh-CN" sz="1400" b="1" dirty="0">
+              <a:rPr lang="en-US" altLang="zh-CN" sz="1600" b="1" dirty="0">
                 <a:latin typeface="微软雅黑" panose="020B0503020204020204" pitchFamily="34" charset="-122"/>
                 <a:ea typeface="微软雅黑" panose="020B0503020204020204" pitchFamily="34" charset="-122"/>
               </a:rPr>
               <a:t>IEEE 802.1Qcr Asynchronous Traffic Shaping (ATS) </a:t>
             </a:r>
             <a:r>
-              <a:rPr lang="en-US" altLang="zh-CN" sz="1400" dirty="0">
+              <a:rPr lang="en-US" altLang="zh-CN" sz="1600" dirty="0">
                 <a:latin typeface="微软雅黑" panose="020B0503020204020204" pitchFamily="34" charset="-122"/>
                 <a:ea typeface="微软雅黑" panose="020B0503020204020204" pitchFamily="34" charset="-122"/>
               </a:rPr>
               <a:t>standard avoids </a:t>
             </a:r>
             <a:r>
-              <a:rPr lang="en-US" altLang="zh-CN" sz="1400" dirty="0" err="1">
+              <a:rPr lang="en-US" altLang="zh-CN" sz="1600" dirty="0" err="1">
                 <a:latin typeface="微软雅黑" panose="020B0503020204020204" pitchFamily="34" charset="-122"/>
                 <a:ea typeface="微软雅黑" panose="020B0503020204020204" pitchFamily="34" charset="-122"/>
               </a:rPr>
               <a:t>synchronisation</a:t>
             </a:r>
             <a:r>
-              <a:rPr lang="en-US" altLang="zh-CN" sz="1400" dirty="0">
+              <a:rPr lang="en-US" altLang="zh-CN" sz="1600" dirty="0">
                 <a:latin typeface="微软雅黑" panose="020B0503020204020204" pitchFamily="34" charset="-122"/>
                 <a:ea typeface="微软雅黑" panose="020B0503020204020204" pitchFamily="34" charset="-122"/>
               </a:rPr>
@@ -11760,8 +11750,8 @@
         </p:nvSpPr>
         <p:spPr>
           <a:xfrm>
-            <a:off x="1980314" y="3768540"/>
-            <a:ext cx="6129668" cy="1754326"/>
+            <a:off x="0" y="3676730"/>
+            <a:ext cx="10658893" cy="2264851"/>
           </a:xfrm>
           <a:prstGeom prst="rect">
             <a:avLst/>
@@ -11774,10 +11764,84 @@
           </a:bodyPr>
           <a:lstStyle/>
           <a:p>
-            <a:r>
-              <a:rPr lang="zh-CN" altLang="en-US" dirty="0"/>
-              <a:t>Urgency-Based Scheduler（UBS），并使用了Length-Rate Quotient (LRQ) and Token Bucket Emulation (TBE)两种算法。LRQ和TBE虽然都是适用于TSN的异步整形算法，但LRQ主要是通过传输/泄露速率整形，可以将突然流量整形为稳定的输出；TBE则通过平均速率控制数据流，桶中令牌数量满足即可传输。</a:t>
-            </a:r>
+            <a:pPr>
+              <a:lnSpc>
+                <a:spcPct val="150000"/>
+              </a:lnSpc>
+            </a:pPr>
+            <a:r>
+              <a:rPr lang="en-US" altLang="zh-CN" sz="1600" b="1" dirty="0">
+                <a:latin typeface="微软雅黑" panose="020B0503020204020204" pitchFamily="34" charset="-122"/>
+                <a:ea typeface="微软雅黑" panose="020B0503020204020204" pitchFamily="34" charset="-122"/>
+              </a:rPr>
+              <a:t>ATS is derived from Urgency-Based Scheduler (UBS) </a:t>
+            </a:r>
+          </a:p>
+          <a:p>
+            <a:pPr>
+              <a:lnSpc>
+                <a:spcPct val="150000"/>
+              </a:lnSpc>
+            </a:pPr>
+            <a:r>
+              <a:rPr lang="en-US" altLang="zh-CN" sz="1600" dirty="0">
+                <a:latin typeface="微软雅黑" panose="020B0503020204020204" pitchFamily="34" charset="-122"/>
+                <a:ea typeface="微软雅黑" panose="020B0503020204020204" pitchFamily="34" charset="-122"/>
+              </a:rPr>
+              <a:t>uses two algorithms: Length-Rate Quotient (LRQ) and Token Bucket Emulation (TBE). </a:t>
+            </a:r>
+          </a:p>
+          <a:p>
+            <a:pPr marL="285750" indent="-285750">
+              <a:lnSpc>
+                <a:spcPct val="150000"/>
+              </a:lnSpc>
+              <a:buFont typeface="Arial" panose="020B0604020202020204" pitchFamily="34" charset="0"/>
+              <a:buChar char="•"/>
+            </a:pPr>
+            <a:r>
+              <a:rPr lang="en-US" altLang="zh-CN" sz="1600" dirty="0">
+                <a:latin typeface="微软雅黑" panose="020B0503020204020204" pitchFamily="34" charset="-122"/>
+                <a:ea typeface="微软雅黑" panose="020B0503020204020204" pitchFamily="34" charset="-122"/>
+              </a:rPr>
+              <a:t>Although LRQ and TBE are both asynchronous shaping algorithms suitable for TSN, </a:t>
+            </a:r>
+          </a:p>
+          <a:p>
+            <a:pPr marL="285750" indent="-285750">
+              <a:lnSpc>
+                <a:spcPct val="150000"/>
+              </a:lnSpc>
+              <a:buFont typeface="Arial" panose="020B0604020202020204" pitchFamily="34" charset="0"/>
+              <a:buChar char="•"/>
+            </a:pPr>
+            <a:r>
+              <a:rPr lang="en-US" altLang="zh-CN" sz="1600" dirty="0">
+                <a:latin typeface="微软雅黑" panose="020B0503020204020204" pitchFamily="34" charset="-122"/>
+                <a:ea typeface="微软雅黑" panose="020B0503020204020204" pitchFamily="34" charset="-122"/>
+              </a:rPr>
+              <a:t>LRQ mainly shapes sudden traffic into stable output through transmission/leakage rate shaping; </a:t>
+            </a:r>
+          </a:p>
+          <a:p>
+            <a:pPr marL="285750" indent="-285750">
+              <a:lnSpc>
+                <a:spcPct val="150000"/>
+              </a:lnSpc>
+              <a:buFont typeface="Arial" panose="020B0604020202020204" pitchFamily="34" charset="0"/>
+              <a:buChar char="•"/>
+            </a:pPr>
+            <a:r>
+              <a:rPr lang="en-US" altLang="zh-CN" sz="1600" dirty="0">
+                <a:latin typeface="微软雅黑" panose="020B0503020204020204" pitchFamily="34" charset="-122"/>
+                <a:ea typeface="微软雅黑" panose="020B0503020204020204" pitchFamily="34" charset="-122"/>
+              </a:rPr>
+              <a:t>TBE controls the data flow through the average rate, and the number of tokens in the bucket meets Ready to transfer.</a:t>
+            </a:r>
+            <a:endParaRPr lang="zh-CN" altLang="en-US" sz="1600" dirty="0">
+              <a:latin typeface="微软雅黑" panose="020B0503020204020204" pitchFamily="34" charset="-122"/>
+              <a:ea typeface="微软雅黑" panose="020B0503020204020204" pitchFamily="34" charset="-122"/>
+            </a:endParaRPr>
           </a:p>
         </p:txBody>
       </p:sp>
@@ -11920,7 +11984,7 @@
         </p:blipFill>
         <p:spPr>
           <a:xfrm>
-            <a:off x="7073145" y="1855314"/>
+            <a:off x="7070537" y="2298457"/>
             <a:ext cx="5063242" cy="2510698"/>
           </a:xfrm>
           <a:prstGeom prst="rect">
@@ -11942,7 +12006,7 @@
         </p:nvSpPr>
         <p:spPr>
           <a:xfrm>
-            <a:off x="8335352" y="4366012"/>
+            <a:off x="8303455" y="4809155"/>
             <a:ext cx="3186953" cy="276999"/>
           </a:xfrm>
           <a:prstGeom prst="rect">
@@ -11981,7 +12045,7 @@
         <p:spPr>
           <a:xfrm>
             <a:off x="-26335" y="1408816"/>
-            <a:ext cx="6991911" cy="700576"/>
+            <a:ext cx="6991911" cy="787523"/>
           </a:xfrm>
           <a:prstGeom prst="rect">
             <a:avLst/>
@@ -12000,28 +12064,28 @@
               </a:lnSpc>
             </a:pPr>
             <a:r>
-              <a:rPr lang="en-US" altLang="zh-CN" sz="1400" b="1" dirty="0">
+              <a:rPr lang="en-US" altLang="zh-CN" sz="1600" b="1" dirty="0">
                 <a:latin typeface="微软雅黑" panose="020B0503020204020204" pitchFamily="34" charset="-122"/>
                 <a:ea typeface="微软雅黑" panose="020B0503020204020204" pitchFamily="34" charset="-122"/>
               </a:rPr>
               <a:t>IEEE 802.1Qcr Asynchronous Traffic Shaping (ATS) </a:t>
             </a:r>
             <a:r>
-              <a:rPr lang="en-US" altLang="zh-CN" sz="1400" dirty="0">
+              <a:rPr lang="en-US" altLang="zh-CN" sz="1600" dirty="0">
                 <a:latin typeface="微软雅黑" panose="020B0503020204020204" pitchFamily="34" charset="-122"/>
                 <a:ea typeface="微软雅黑" panose="020B0503020204020204" pitchFamily="34" charset="-122"/>
               </a:rPr>
               <a:t>standard avoids </a:t>
             </a:r>
             <a:r>
-              <a:rPr lang="en-US" altLang="zh-CN" sz="1400" dirty="0" err="1">
+              <a:rPr lang="en-US" altLang="zh-CN" sz="1600" dirty="0" err="1">
                 <a:latin typeface="微软雅黑" panose="020B0503020204020204" pitchFamily="34" charset="-122"/>
                 <a:ea typeface="微软雅黑" panose="020B0503020204020204" pitchFamily="34" charset="-122"/>
               </a:rPr>
               <a:t>synchronisation</a:t>
             </a:r>
             <a:r>
-              <a:rPr lang="en-US" altLang="zh-CN" sz="1400" dirty="0">
+              <a:rPr lang="en-US" altLang="zh-CN" sz="1600" dirty="0">
                 <a:latin typeface="微软雅黑" panose="020B0503020204020204" pitchFamily="34" charset="-122"/>
                 <a:ea typeface="微软雅黑" panose="020B0503020204020204" pitchFamily="34" charset="-122"/>
               </a:rPr>
@@ -12045,7 +12109,7 @@
         <p:spPr>
           <a:xfrm>
             <a:off x="-26335" y="3676730"/>
-            <a:ext cx="6844552" cy="1993238"/>
+            <a:ext cx="6844552" cy="2264851"/>
           </a:xfrm>
           <a:prstGeom prst="rect">
             <a:avLst/>
@@ -12064,7 +12128,7 @@
               </a:lnSpc>
             </a:pPr>
             <a:r>
-              <a:rPr lang="en-US" altLang="zh-CN" sz="1400" dirty="0">
+              <a:rPr lang="en-US" altLang="zh-CN" sz="1600" dirty="0">
                 <a:latin typeface="微软雅黑" panose="020B0503020204020204" pitchFamily="34" charset="-122"/>
                 <a:ea typeface="微软雅黑" panose="020B0503020204020204" pitchFamily="34" charset="-122"/>
               </a:rPr>
@@ -12080,7 +12144,7 @@
               <a:buChar char="•"/>
             </a:pPr>
             <a:r>
-              <a:rPr lang="en-US" altLang="zh-CN" sz="1400" dirty="0">
+              <a:rPr lang="en-US" altLang="zh-CN" sz="1600" dirty="0">
                 <a:latin typeface="微软雅黑" panose="020B0503020204020204" pitchFamily="34" charset="-122"/>
                 <a:ea typeface="微软雅黑" panose="020B0503020204020204" pitchFamily="34" charset="-122"/>
               </a:rPr>
@@ -12096,13 +12160,13 @@
               <a:buChar char="•"/>
             </a:pPr>
             <a:r>
-              <a:rPr lang="en-US" altLang="zh-CN" sz="1400" dirty="0">
+              <a:rPr lang="en-US" altLang="zh-CN" sz="1600" dirty="0">
                 <a:latin typeface="微软雅黑" panose="020B0503020204020204" pitchFamily="34" charset="-122"/>
                 <a:ea typeface="微软雅黑" panose="020B0503020204020204" pitchFamily="34" charset="-122"/>
               </a:rPr>
               <a:t>Data frames reaching the head of the queue are output together with other non-shaped data flows after evaluating their eligibility time and priority selection.</a:t>
             </a:r>
-            <a:endParaRPr lang="zh-CN" altLang="en-US" sz="1400" dirty="0">
+            <a:endParaRPr lang="zh-CN" altLang="en-US" sz="1600" dirty="0">
               <a:latin typeface="微软雅黑" panose="020B0503020204020204" pitchFamily="34" charset="-122"/>
               <a:ea typeface="微软雅黑" panose="020B0503020204020204" pitchFamily="34" charset="-122"/>
             </a:endParaRPr>
@@ -12123,8 +12187,8 @@
         </p:nvSpPr>
         <p:spPr>
           <a:xfrm>
-            <a:off x="183412" y="2523729"/>
-            <a:ext cx="6129668" cy="369332"/>
+            <a:off x="58221" y="2579604"/>
+            <a:ext cx="6129668" cy="584775"/>
           </a:xfrm>
           <a:prstGeom prst="rect">
             <a:avLst/>
@@ -12138,9 +12202,30 @@
           <a:lstStyle/>
           <a:p>
             <a:r>
-              <a:rPr lang="zh-CN" altLang="en-US" dirty="0"/>
-              <a:t>最后在IEEE 802.1 Qcr协议中使用基于令牌桶的ATS算法，</a:t>
-            </a:r>
+              <a:rPr lang="en-US" altLang="zh-CN" sz="1600" dirty="0">
+                <a:latin typeface="微软雅黑" panose="020B0503020204020204" pitchFamily="34" charset="-122"/>
+                <a:ea typeface="微软雅黑" panose="020B0503020204020204" pitchFamily="34" charset="-122"/>
+              </a:rPr>
+              <a:t>Finally, the ATS algorithm based on token bucket is used in the IEEE 802.1 </a:t>
+            </a:r>
+            <a:r>
+              <a:rPr lang="en-US" altLang="zh-CN" sz="1600" dirty="0" err="1">
+                <a:latin typeface="微软雅黑" panose="020B0503020204020204" pitchFamily="34" charset="-122"/>
+                <a:ea typeface="微软雅黑" panose="020B0503020204020204" pitchFamily="34" charset="-122"/>
+              </a:rPr>
+              <a:t>Qcr</a:t>
+            </a:r>
+            <a:r>
+              <a:rPr lang="en-US" altLang="zh-CN" sz="1600" dirty="0">
+                <a:latin typeface="微软雅黑" panose="020B0503020204020204" pitchFamily="34" charset="-122"/>
+                <a:ea typeface="微软雅黑" panose="020B0503020204020204" pitchFamily="34" charset="-122"/>
+              </a:rPr>
+              <a:t> protocol. </a:t>
+            </a:r>
+            <a:endParaRPr lang="zh-CN" altLang="en-US" sz="1600" dirty="0">
+              <a:latin typeface="微软雅黑" panose="020B0503020204020204" pitchFamily="34" charset="-122"/>
+              <a:ea typeface="微软雅黑" panose="020B0503020204020204" pitchFamily="34" charset="-122"/>
+            </a:endParaRPr>
           </a:p>
         </p:txBody>
       </p:sp>
@@ -12584,231 +12669,403 @@
           </a:p>
         </p:txBody>
       </p:sp>
-      <p:sp>
-        <p:nvSpPr>
-          <p:cNvPr id="6" name="文本框 5">
-            <a:extLst>
-              <a:ext uri="{FF2B5EF4-FFF2-40B4-BE49-F238E27FC236}">
-                <a16:creationId xmlns:a16="http://schemas.microsoft.com/office/drawing/2014/main" id="{289FD9E6-431C-A2AE-1F16-A2CB3762A3F7}"/>
-              </a:ext>
-            </a:extLst>
-          </p:cNvPr>
-          <p:cNvSpPr txBox="1"/>
-          <p:nvPr/>
-        </p:nvSpPr>
-        <p:spPr>
-          <a:xfrm>
-            <a:off x="60512" y="1787917"/>
-            <a:ext cx="7127097" cy="4578561"/>
-          </a:xfrm>
-          <a:prstGeom prst="rect">
-            <a:avLst/>
-          </a:prstGeom>
-          <a:noFill/>
-        </p:spPr>
-        <p:txBody>
-          <a:bodyPr wrap="square">
-            <a:spAutoFit/>
-          </a:bodyPr>
-          <a:lstStyle/>
-          <a:p>
-            <a:pPr>
-              <a:lnSpc>
-                <a:spcPct val="150000"/>
-              </a:lnSpc>
-            </a:pPr>
-            <a:r>
-              <a:rPr lang="en-US" altLang="zh-CN" sz="1400" dirty="0">
-                <a:latin typeface="微软雅黑" panose="020B0503020204020204" pitchFamily="34" charset="-122"/>
-                <a:ea typeface="微软雅黑" panose="020B0503020204020204" pitchFamily="34" charset="-122"/>
-              </a:rPr>
-              <a:t>Task Chain: </a:t>
-            </a:r>
-          </a:p>
-          <a:p>
-            <a:pPr>
-              <a:lnSpc>
-                <a:spcPct val="150000"/>
-              </a:lnSpc>
-            </a:pPr>
-            <a:r>
-              <a:rPr lang="en-US" altLang="zh-CN" sz="1400" dirty="0">
-                <a:latin typeface="微软雅黑" panose="020B0503020204020204" pitchFamily="34" charset="-122"/>
-                <a:ea typeface="微软雅黑" panose="020B0503020204020204" pitchFamily="34" charset="-122"/>
-              </a:rPr>
-              <a:t>a task chain C = {z, c1, c2, c3, ... , </a:t>
-            </a:r>
-            <a:r>
-              <a:rPr lang="en-US" altLang="zh-CN" sz="1400" dirty="0" err="1">
-                <a:latin typeface="微软雅黑" panose="020B0503020204020204" pitchFamily="34" charset="-122"/>
-                <a:ea typeface="微软雅黑" panose="020B0503020204020204" pitchFamily="34" charset="-122"/>
-              </a:rPr>
-              <a:t>cn</a:t>
-            </a:r>
-            <a:r>
-              <a:rPr lang="en-US" altLang="zh-CN" sz="1400" dirty="0">
-                <a:latin typeface="微软雅黑" panose="020B0503020204020204" pitchFamily="34" charset="-122"/>
-                <a:ea typeface="微软雅黑" panose="020B0503020204020204" pitchFamily="34" charset="-122"/>
-              </a:rPr>
-              <a:t>} are satisfied:</a:t>
-            </a:r>
-          </a:p>
-          <a:p>
-            <a:pPr marL="285750" indent="-285750">
-              <a:lnSpc>
-                <a:spcPct val="150000"/>
-              </a:lnSpc>
-              <a:buFont typeface="Arial" panose="020B0604020202020204" pitchFamily="34" charset="0"/>
-              <a:buChar char="•"/>
-            </a:pPr>
-            <a:r>
-              <a:rPr lang="en-US" altLang="zh-CN" sz="1400" dirty="0">
-                <a:latin typeface="微软雅黑" panose="020B0503020204020204" pitchFamily="34" charset="-122"/>
-                <a:ea typeface="微软雅黑" panose="020B0503020204020204" pitchFamily="34" charset="-122"/>
-              </a:rPr>
-              <a:t>The events c0 and </a:t>
-            </a:r>
-            <a:r>
-              <a:rPr lang="en-US" altLang="zh-CN" sz="1400" dirty="0" err="1">
-                <a:latin typeface="微软雅黑" panose="020B0503020204020204" pitchFamily="34" charset="-122"/>
-                <a:ea typeface="微软雅黑" panose="020B0503020204020204" pitchFamily="34" charset="-122"/>
-              </a:rPr>
-              <a:t>cn</a:t>
-            </a:r>
-            <a:r>
-              <a:rPr lang="en-US" altLang="zh-CN" sz="1400" dirty="0">
-                <a:latin typeface="微软雅黑" panose="020B0503020204020204" pitchFamily="34" charset="-122"/>
-                <a:ea typeface="微软雅黑" panose="020B0503020204020204" pitchFamily="34" charset="-122"/>
-              </a:rPr>
-              <a:t> in the task chain C can only be scheduling tasks $\tau_0$ and $\</a:t>
-            </a:r>
-            <a:r>
-              <a:rPr lang="en-US" altLang="zh-CN" sz="1400" dirty="0" err="1">
-                <a:latin typeface="微软雅黑" panose="020B0503020204020204" pitchFamily="34" charset="-122"/>
-                <a:ea typeface="微软雅黑" panose="020B0503020204020204" pitchFamily="34" charset="-122"/>
-              </a:rPr>
-              <a:t>tau_n</a:t>
-            </a:r>
-            <a:r>
-              <a:rPr lang="en-US" altLang="zh-CN" sz="1400" dirty="0">
-                <a:latin typeface="微软雅黑" panose="020B0503020204020204" pitchFamily="34" charset="-122"/>
-                <a:ea typeface="微软雅黑" panose="020B0503020204020204" pitchFamily="34" charset="-122"/>
-              </a:rPr>
-              <a:t>$, i.e., c0 and </a:t>
-            </a:r>
-            <a:r>
-              <a:rPr lang="en-US" altLang="zh-CN" sz="1400" dirty="0" err="1">
-                <a:latin typeface="微软雅黑" panose="020B0503020204020204" pitchFamily="34" charset="-122"/>
-                <a:ea typeface="微软雅黑" panose="020B0503020204020204" pitchFamily="34" charset="-122"/>
-              </a:rPr>
-              <a:t>cn</a:t>
-            </a:r>
-            <a:r>
-              <a:rPr lang="en-US" altLang="zh-CN" sz="1400" dirty="0">
-                <a:latin typeface="微软雅黑" panose="020B0503020204020204" pitchFamily="34" charset="-122"/>
-                <a:ea typeface="微软雅黑" panose="020B0503020204020204" pitchFamily="34" charset="-122"/>
-              </a:rPr>
-              <a:t> can only exist on the ECU.</a:t>
-            </a:r>
-          </a:p>
-          <a:p>
-            <a:pPr marL="285750" indent="-285750">
-              <a:lnSpc>
-                <a:spcPct val="150000"/>
-              </a:lnSpc>
-              <a:buFont typeface="Arial" panose="020B0604020202020204" pitchFamily="34" charset="0"/>
-              <a:buChar char="•"/>
-            </a:pPr>
-            <a:r>
-              <a:rPr lang="en-US" altLang="zh-CN" sz="1400" dirty="0">
-                <a:latin typeface="微软雅黑" panose="020B0503020204020204" pitchFamily="34" charset="-122"/>
-                <a:ea typeface="微软雅黑" panose="020B0503020204020204" pitchFamily="34" charset="-122"/>
-              </a:rPr>
-              <a:t>c0 is a periodic scheduling task $\tau_0$ on an ECU with period T that is used to periodically capture external events z.</a:t>
-            </a:r>
-          </a:p>
-          <a:p>
-            <a:pPr marL="285750" indent="-285750">
-              <a:lnSpc>
-                <a:spcPct val="150000"/>
-              </a:lnSpc>
-              <a:buFont typeface="Arial" panose="020B0604020202020204" pitchFamily="34" charset="0"/>
-              <a:buChar char="•"/>
-            </a:pPr>
-            <a:r>
-              <a:rPr lang="en-US" altLang="zh-CN" sz="1400" dirty="0">
-                <a:latin typeface="微软雅黑" panose="020B0503020204020204" pitchFamily="34" charset="-122"/>
-                <a:ea typeface="微软雅黑" panose="020B0503020204020204" pitchFamily="34" charset="-122"/>
-              </a:rPr>
-              <a:t>For the external event z, it can be considered as the 0th event of the task chain, that is, the external event z is c0.</a:t>
-            </a:r>
-          </a:p>
-          <a:p>
-            <a:pPr marL="285750" indent="-285750">
-              <a:lnSpc>
-                <a:spcPct val="150000"/>
-              </a:lnSpc>
-              <a:buFont typeface="Arial" panose="020B0604020202020204" pitchFamily="34" charset="0"/>
-              <a:buChar char="•"/>
-            </a:pPr>
-            <a:r>
-              <a:rPr lang="en-US" altLang="zh-CN" sz="1400" dirty="0">
-                <a:latin typeface="微软雅黑" panose="020B0503020204020204" pitchFamily="34" charset="-122"/>
-                <a:ea typeface="微软雅黑" panose="020B0503020204020204" pitchFamily="34" charset="-122"/>
-              </a:rPr>
-              <a:t>For any event ci (1&lt;</a:t>
-            </a:r>
-            <a:r>
-              <a:rPr lang="en-US" altLang="zh-CN" sz="1400" dirty="0" err="1">
-                <a:latin typeface="微软雅黑" panose="020B0503020204020204" pitchFamily="34" charset="-122"/>
-                <a:ea typeface="微软雅黑" panose="020B0503020204020204" pitchFamily="34" charset="-122"/>
-              </a:rPr>
-              <a:t>i</a:t>
-            </a:r>
-            <a:r>
-              <a:rPr lang="en-US" altLang="zh-CN" sz="1400" dirty="0">
-                <a:latin typeface="微软雅黑" panose="020B0503020204020204" pitchFamily="34" charset="-122"/>
-                <a:ea typeface="微软雅黑" panose="020B0503020204020204" pitchFamily="34" charset="-122"/>
-              </a:rPr>
-              <a:t>&lt;n-1), it can be either a scheduling task or a network task.</a:t>
-            </a:r>
-          </a:p>
-          <a:p>
-            <a:pPr marL="285750" indent="-285750">
-              <a:lnSpc>
-                <a:spcPct val="150000"/>
-              </a:lnSpc>
-              <a:buFont typeface="Arial" panose="020B0604020202020204" pitchFamily="34" charset="0"/>
-              <a:buChar char="•"/>
-            </a:pPr>
-            <a:r>
-              <a:rPr lang="en-US" altLang="zh-CN" sz="1400" dirty="0">
-                <a:latin typeface="微软雅黑" panose="020B0503020204020204" pitchFamily="34" charset="-122"/>
-                <a:ea typeface="微软雅黑" panose="020B0503020204020204" pitchFamily="34" charset="-122"/>
-              </a:rPr>
-              <a:t>There is no case where two consecutive events ci and ci-1 (1&lt;</a:t>
-            </a:r>
-            <a:r>
-              <a:rPr lang="en-US" altLang="zh-CN" sz="1400" dirty="0" err="1">
-                <a:latin typeface="微软雅黑" panose="020B0503020204020204" pitchFamily="34" charset="-122"/>
-                <a:ea typeface="微软雅黑" panose="020B0503020204020204" pitchFamily="34" charset="-122"/>
-              </a:rPr>
-              <a:t>i</a:t>
-            </a:r>
-            <a:r>
-              <a:rPr lang="en-US" altLang="zh-CN" sz="1400" dirty="0">
-                <a:latin typeface="微软雅黑" panose="020B0503020204020204" pitchFamily="34" charset="-122"/>
-                <a:ea typeface="微软雅黑" panose="020B0503020204020204" pitchFamily="34" charset="-122"/>
-              </a:rPr>
-              <a:t>&lt;n-1) are scheduling tasks executed on separate ECUs. In the task chain, there is at least one network task as a connection between two scheduling tasks executed on different ECUs. For example, if ci-1 and ci+1 are scheduling tasks on different ECUs, then ci is a network task.</a:t>
-            </a:r>
-            <a:endParaRPr lang="zh-CN" altLang="en-US" sz="1400" dirty="0">
-              <a:latin typeface="微软雅黑" panose="020B0503020204020204" pitchFamily="34" charset="-122"/>
-              <a:ea typeface="微软雅黑" panose="020B0503020204020204" pitchFamily="34" charset="-122"/>
-            </a:endParaRPr>
-          </a:p>
-        </p:txBody>
-      </p:sp>
+      <mc:AlternateContent xmlns:mc="http://schemas.openxmlformats.org/markup-compatibility/2006">
+        <mc:Choice xmlns:a14="http://schemas.microsoft.com/office/drawing/2010/main" Requires="a14">
+          <p:sp>
+            <p:nvSpPr>
+              <p:cNvPr id="6" name="文本框 5">
+                <a:extLst>
+                  <a:ext uri="{FF2B5EF4-FFF2-40B4-BE49-F238E27FC236}">
+                    <a16:creationId xmlns:a16="http://schemas.microsoft.com/office/drawing/2014/main" id="{289FD9E6-431C-A2AE-1F16-A2CB3762A3F7}"/>
+                  </a:ext>
+                </a:extLst>
+              </p:cNvPr>
+              <p:cNvSpPr txBox="1"/>
+              <p:nvPr/>
+            </p:nvSpPr>
+            <p:spPr>
+              <a:xfrm>
+                <a:off x="60512" y="1787917"/>
+                <a:ext cx="7127097" cy="4578561"/>
+              </a:xfrm>
+              <a:prstGeom prst="rect">
+                <a:avLst/>
+              </a:prstGeom>
+              <a:noFill/>
+            </p:spPr>
+            <p:txBody>
+              <a:bodyPr wrap="square">
+                <a:spAutoFit/>
+              </a:bodyPr>
+              <a:lstStyle/>
+              <a:p>
+                <a:pPr>
+                  <a:lnSpc>
+                    <a:spcPct val="150000"/>
+                  </a:lnSpc>
+                </a:pPr>
+                <a:r>
+                  <a:rPr lang="en-US" altLang="zh-CN" sz="1400" dirty="0">
+                    <a:latin typeface="微软雅黑" panose="020B0503020204020204" pitchFamily="34" charset="-122"/>
+                    <a:ea typeface="微软雅黑" panose="020B0503020204020204" pitchFamily="34" charset="-122"/>
+                  </a:rPr>
+                  <a:t>Task Chain: </a:t>
+                </a:r>
+              </a:p>
+              <a:p>
+                <a:pPr>
+                  <a:lnSpc>
+                    <a:spcPct val="150000"/>
+                  </a:lnSpc>
+                </a:pPr>
+                <a:r>
+                  <a:rPr lang="en-US" altLang="zh-CN" sz="1400" dirty="0">
+                    <a:latin typeface="微软雅黑" panose="020B0503020204020204" pitchFamily="34" charset="-122"/>
+                    <a:ea typeface="微软雅黑" panose="020B0503020204020204" pitchFamily="34" charset="-122"/>
+                  </a:rPr>
+                  <a:t>a task chain C = {z, c1, c2, c3, ... , </a:t>
+                </a:r>
+                <a:r>
+                  <a:rPr lang="en-US" altLang="zh-CN" sz="1400" dirty="0" err="1">
+                    <a:latin typeface="微软雅黑" panose="020B0503020204020204" pitchFamily="34" charset="-122"/>
+                    <a:ea typeface="微软雅黑" panose="020B0503020204020204" pitchFamily="34" charset="-122"/>
+                  </a:rPr>
+                  <a:t>cn</a:t>
+                </a:r>
+                <a:r>
+                  <a:rPr lang="en-US" altLang="zh-CN" sz="1400" dirty="0">
+                    <a:latin typeface="微软雅黑" panose="020B0503020204020204" pitchFamily="34" charset="-122"/>
+                    <a:ea typeface="微软雅黑" panose="020B0503020204020204" pitchFamily="34" charset="-122"/>
+                  </a:rPr>
+                  <a:t>} are satisfied:</a:t>
+                </a:r>
+              </a:p>
+              <a:p>
+                <a:pPr marL="285750" indent="-285750">
+                  <a:lnSpc>
+                    <a:spcPct val="150000"/>
+                  </a:lnSpc>
+                  <a:buFont typeface="Arial" panose="020B0604020202020204" pitchFamily="34" charset="0"/>
+                  <a:buChar char="•"/>
+                </a:pPr>
+                <a:r>
+                  <a:rPr lang="en-US" altLang="zh-CN" sz="1400" dirty="0">
+                    <a:latin typeface="微软雅黑" panose="020B0503020204020204" pitchFamily="34" charset="-122"/>
+                    <a:ea typeface="微软雅黑" panose="020B0503020204020204" pitchFamily="34" charset="-122"/>
+                  </a:rPr>
+                  <a:t>The events c0 and </a:t>
+                </a:r>
+                <a:r>
+                  <a:rPr lang="en-US" altLang="zh-CN" sz="1400" dirty="0" err="1">
+                    <a:latin typeface="微软雅黑" panose="020B0503020204020204" pitchFamily="34" charset="-122"/>
+                    <a:ea typeface="微软雅黑" panose="020B0503020204020204" pitchFamily="34" charset="-122"/>
+                  </a:rPr>
+                  <a:t>cn</a:t>
+                </a:r>
+                <a:r>
+                  <a:rPr lang="en-US" altLang="zh-CN" sz="1400" dirty="0">
+                    <a:latin typeface="微软雅黑" panose="020B0503020204020204" pitchFamily="34" charset="-122"/>
+                    <a:ea typeface="微软雅黑" panose="020B0503020204020204" pitchFamily="34" charset="-122"/>
+                  </a:rPr>
+                  <a:t> in the task chain C can only be scheduling tasks </a:t>
+                </a:r>
+                <a14:m>
+                  <m:oMath xmlns:m="http://schemas.openxmlformats.org/officeDocument/2006/math">
+                    <m:sSub>
+                      <m:sSubPr>
+                        <m:ctrlPr>
+                          <a:rPr lang="en-US" altLang="zh-CN" sz="1400" i="1" smtClean="0">
+                            <a:latin typeface="Cambria Math" panose="02040503050406030204" pitchFamily="18" charset="0"/>
+                            <a:ea typeface="微软雅黑" panose="020B0503020204020204" pitchFamily="34" charset="-122"/>
+                          </a:rPr>
+                        </m:ctrlPr>
+                      </m:sSubPr>
+                      <m:e>
+                        <m:r>
+                          <a:rPr lang="zh-CN" altLang="en-US" sz="1400" i="1" smtClean="0">
+                            <a:latin typeface="Cambria Math" panose="02040503050406030204" pitchFamily="18" charset="0"/>
+                            <a:ea typeface="微软雅黑" panose="020B0503020204020204" pitchFamily="34" charset="-122"/>
+                          </a:rPr>
+                          <m:t>𝜏</m:t>
+                        </m:r>
+                      </m:e>
+                      <m:sub>
+                        <m:r>
+                          <a:rPr lang="en-US" altLang="zh-CN" sz="1400" b="0" i="1" smtClean="0">
+                            <a:latin typeface="Cambria Math" panose="02040503050406030204" pitchFamily="18" charset="0"/>
+                            <a:ea typeface="微软雅黑" panose="020B0503020204020204" pitchFamily="34" charset="-122"/>
+                          </a:rPr>
+                          <m:t>0</m:t>
+                        </m:r>
+                      </m:sub>
+                    </m:sSub>
+                  </m:oMath>
+                </a14:m>
+                <a:r>
+                  <a:rPr lang="en-US" altLang="zh-CN" sz="1400" dirty="0">
+                    <a:latin typeface="微软雅黑" panose="020B0503020204020204" pitchFamily="34" charset="-122"/>
+                    <a:ea typeface="微软雅黑" panose="020B0503020204020204" pitchFamily="34" charset="-122"/>
+                  </a:rPr>
+                  <a:t>and </a:t>
+                </a:r>
+                <a14:m>
+                  <m:oMath xmlns:m="http://schemas.openxmlformats.org/officeDocument/2006/math">
+                    <m:sSub>
+                      <m:sSubPr>
+                        <m:ctrlPr>
+                          <a:rPr lang="en-US" altLang="zh-CN" sz="1400" i="1" smtClean="0">
+                            <a:latin typeface="Cambria Math" panose="02040503050406030204" pitchFamily="18" charset="0"/>
+                            <a:ea typeface="微软雅黑" panose="020B0503020204020204" pitchFamily="34" charset="-122"/>
+                          </a:rPr>
+                        </m:ctrlPr>
+                      </m:sSubPr>
+                      <m:e>
+                        <m:r>
+                          <a:rPr lang="zh-CN" altLang="en-US" sz="1400" i="1">
+                            <a:latin typeface="Cambria Math" panose="02040503050406030204" pitchFamily="18" charset="0"/>
+                            <a:ea typeface="微软雅黑" panose="020B0503020204020204" pitchFamily="34" charset="-122"/>
+                          </a:rPr>
+                          <m:t>𝜏</m:t>
+                        </m:r>
+                      </m:e>
+                      <m:sub>
+                        <m:r>
+                          <a:rPr lang="en-US" altLang="zh-CN" sz="1400" b="0" i="1" smtClean="0">
+                            <a:latin typeface="Cambria Math" panose="02040503050406030204" pitchFamily="18" charset="0"/>
+                            <a:ea typeface="微软雅黑" panose="020B0503020204020204" pitchFamily="34" charset="-122"/>
+                          </a:rPr>
+                          <m:t>𝑛</m:t>
+                        </m:r>
+                      </m:sub>
+                    </m:sSub>
+                    <m:r>
+                      <a:rPr lang="en-US" altLang="zh-CN" sz="1400" i="1">
+                        <a:latin typeface="Cambria Math" panose="02040503050406030204" pitchFamily="18" charset="0"/>
+                        <a:ea typeface="微软雅黑" panose="020B0503020204020204" pitchFamily="34" charset="-122"/>
+                      </a:rPr>
+                      <m:t> </m:t>
+                    </m:r>
+                  </m:oMath>
+                </a14:m>
+                <a:r>
+                  <a:rPr lang="zh-CN" altLang="en-US" sz="1400" dirty="0">
+                    <a:latin typeface="微软雅黑" panose="020B0503020204020204" pitchFamily="34" charset="-122"/>
+                    <a:ea typeface="微软雅黑" panose="020B0503020204020204" pitchFamily="34" charset="-122"/>
+                  </a:rPr>
+                  <a:t>，</a:t>
+                </a:r>
+                <a:r>
+                  <a:rPr lang="en-US" altLang="zh-CN" sz="1400" dirty="0">
+                    <a:latin typeface="微软雅黑" panose="020B0503020204020204" pitchFamily="34" charset="-122"/>
+                    <a:ea typeface="微软雅黑" panose="020B0503020204020204" pitchFamily="34" charset="-122"/>
+                  </a:rPr>
+                  <a:t>i.e., c0 and </a:t>
+                </a:r>
+                <a:r>
+                  <a:rPr lang="en-US" altLang="zh-CN" sz="1400" dirty="0" err="1">
+                    <a:latin typeface="微软雅黑" panose="020B0503020204020204" pitchFamily="34" charset="-122"/>
+                    <a:ea typeface="微软雅黑" panose="020B0503020204020204" pitchFamily="34" charset="-122"/>
+                  </a:rPr>
+                  <a:t>cn</a:t>
+                </a:r>
+                <a:r>
+                  <a:rPr lang="en-US" altLang="zh-CN" sz="1400" dirty="0">
+                    <a:latin typeface="微软雅黑" panose="020B0503020204020204" pitchFamily="34" charset="-122"/>
+                    <a:ea typeface="微软雅黑" panose="020B0503020204020204" pitchFamily="34" charset="-122"/>
+                  </a:rPr>
+                  <a:t> can only exist on the ECU.</a:t>
+                </a:r>
+              </a:p>
+              <a:p>
+                <a:pPr marL="285750" indent="-285750">
+                  <a:lnSpc>
+                    <a:spcPct val="150000"/>
+                  </a:lnSpc>
+                  <a:buFont typeface="Arial" panose="020B0604020202020204" pitchFamily="34" charset="0"/>
+                  <a:buChar char="•"/>
+                </a:pPr>
+                <a:r>
+                  <a:rPr lang="en-US" altLang="zh-CN" sz="1400" dirty="0">
+                    <a:latin typeface="微软雅黑" panose="020B0503020204020204" pitchFamily="34" charset="-122"/>
+                    <a:ea typeface="微软雅黑" panose="020B0503020204020204" pitchFamily="34" charset="-122"/>
+                  </a:rPr>
+                  <a:t>c0 is a periodic scheduling task </a:t>
+                </a:r>
+                <a14:m>
+                  <m:oMath xmlns:m="http://schemas.openxmlformats.org/officeDocument/2006/math">
+                    <m:sSub>
+                      <m:sSubPr>
+                        <m:ctrlPr>
+                          <a:rPr lang="en-US" altLang="zh-CN" sz="1400" i="1" smtClean="0">
+                            <a:latin typeface="Cambria Math" panose="02040503050406030204" pitchFamily="18" charset="0"/>
+                            <a:ea typeface="微软雅黑" panose="020B0503020204020204" pitchFamily="34" charset="-122"/>
+                          </a:rPr>
+                        </m:ctrlPr>
+                      </m:sSubPr>
+                      <m:e>
+                        <m:r>
+                          <a:rPr lang="zh-CN" altLang="en-US" sz="1400" i="1" smtClean="0">
+                            <a:latin typeface="Cambria Math" panose="02040503050406030204" pitchFamily="18" charset="0"/>
+                            <a:ea typeface="微软雅黑" panose="020B0503020204020204" pitchFamily="34" charset="-122"/>
+                          </a:rPr>
+                          <m:t>𝜏</m:t>
+                        </m:r>
+                      </m:e>
+                      <m:sub>
+                        <m:r>
+                          <a:rPr lang="en-US" altLang="zh-CN" sz="1400" b="0" i="1" smtClean="0">
+                            <a:latin typeface="Cambria Math" panose="02040503050406030204" pitchFamily="18" charset="0"/>
+                            <a:ea typeface="微软雅黑" panose="020B0503020204020204" pitchFamily="34" charset="-122"/>
+                          </a:rPr>
+                          <m:t>0</m:t>
+                        </m:r>
+                      </m:sub>
+                    </m:sSub>
+                    <m:r>
+                      <a:rPr lang="en-US" altLang="zh-CN" sz="1400" b="0" i="1" smtClean="0">
+                        <a:latin typeface="Cambria Math" panose="02040503050406030204" pitchFamily="18" charset="0"/>
+                        <a:ea typeface="微软雅黑" panose="020B0503020204020204" pitchFamily="34" charset="-122"/>
+                      </a:rPr>
+                      <m:t> </m:t>
+                    </m:r>
+                  </m:oMath>
+                </a14:m>
+                <a:r>
+                  <a:rPr lang="en-US" altLang="zh-CN" sz="1400" dirty="0">
+                    <a:latin typeface="微软雅黑" panose="020B0503020204020204" pitchFamily="34" charset="-122"/>
+                    <a:ea typeface="微软雅黑" panose="020B0503020204020204" pitchFamily="34" charset="-122"/>
+                  </a:rPr>
+                  <a:t>on an ECU with period T that is used to periodically capture external events z.</a:t>
+                </a:r>
+              </a:p>
+              <a:p>
+                <a:pPr marL="285750" indent="-285750">
+                  <a:lnSpc>
+                    <a:spcPct val="150000"/>
+                  </a:lnSpc>
+                  <a:buFont typeface="Arial" panose="020B0604020202020204" pitchFamily="34" charset="0"/>
+                  <a:buChar char="•"/>
+                </a:pPr>
+                <a:r>
+                  <a:rPr lang="en-US" altLang="zh-CN" sz="1400" dirty="0">
+                    <a:latin typeface="微软雅黑" panose="020B0503020204020204" pitchFamily="34" charset="-122"/>
+                    <a:ea typeface="微软雅黑" panose="020B0503020204020204" pitchFamily="34" charset="-122"/>
+                  </a:rPr>
+                  <a:t>For the external event z, it can be considered as the 0th event of the task chain, that is, the external event z is c0.</a:t>
+                </a:r>
+              </a:p>
+              <a:p>
+                <a:pPr marL="285750" indent="-285750">
+                  <a:lnSpc>
+                    <a:spcPct val="150000"/>
+                  </a:lnSpc>
+                  <a:buFont typeface="Arial" panose="020B0604020202020204" pitchFamily="34" charset="0"/>
+                  <a:buChar char="•"/>
+                </a:pPr>
+                <a:r>
+                  <a:rPr lang="en-US" altLang="zh-CN" sz="1400" dirty="0">
+                    <a:latin typeface="微软雅黑" panose="020B0503020204020204" pitchFamily="34" charset="-122"/>
+                    <a:ea typeface="微软雅黑" panose="020B0503020204020204" pitchFamily="34" charset="-122"/>
+                  </a:rPr>
+                  <a:t>For any event ci (1&lt;</a:t>
+                </a:r>
+                <a:r>
+                  <a:rPr lang="en-US" altLang="zh-CN" sz="1400" dirty="0" err="1">
+                    <a:latin typeface="微软雅黑" panose="020B0503020204020204" pitchFamily="34" charset="-122"/>
+                    <a:ea typeface="微软雅黑" panose="020B0503020204020204" pitchFamily="34" charset="-122"/>
+                  </a:rPr>
+                  <a:t>i</a:t>
+                </a:r>
+                <a:r>
+                  <a:rPr lang="en-US" altLang="zh-CN" sz="1400" dirty="0">
+                    <a:latin typeface="微软雅黑" panose="020B0503020204020204" pitchFamily="34" charset="-122"/>
+                    <a:ea typeface="微软雅黑" panose="020B0503020204020204" pitchFamily="34" charset="-122"/>
+                  </a:rPr>
+                  <a:t>&lt;n-1), it can be either a scheduling task or a network task.</a:t>
+                </a:r>
+              </a:p>
+              <a:p>
+                <a:pPr marL="285750" indent="-285750">
+                  <a:lnSpc>
+                    <a:spcPct val="150000"/>
+                  </a:lnSpc>
+                  <a:buFont typeface="Arial" panose="020B0604020202020204" pitchFamily="34" charset="0"/>
+                  <a:buChar char="•"/>
+                </a:pPr>
+                <a:r>
+                  <a:rPr lang="en-US" altLang="zh-CN" sz="1400" dirty="0">
+                    <a:latin typeface="微软雅黑" panose="020B0503020204020204" pitchFamily="34" charset="-122"/>
+                    <a:ea typeface="微软雅黑" panose="020B0503020204020204" pitchFamily="34" charset="-122"/>
+                  </a:rPr>
+                  <a:t>There is no case where two consecutive events ci and ci-1 (1&lt;</a:t>
+                </a:r>
+                <a:r>
+                  <a:rPr lang="en-US" altLang="zh-CN" sz="1400" dirty="0" err="1">
+                    <a:latin typeface="微软雅黑" panose="020B0503020204020204" pitchFamily="34" charset="-122"/>
+                    <a:ea typeface="微软雅黑" panose="020B0503020204020204" pitchFamily="34" charset="-122"/>
+                  </a:rPr>
+                  <a:t>i</a:t>
+                </a:r>
+                <a:r>
+                  <a:rPr lang="en-US" altLang="zh-CN" sz="1400" dirty="0">
+                    <a:latin typeface="微软雅黑" panose="020B0503020204020204" pitchFamily="34" charset="-122"/>
+                    <a:ea typeface="微软雅黑" panose="020B0503020204020204" pitchFamily="34" charset="-122"/>
+                  </a:rPr>
+                  <a:t>&lt;n-1) are scheduling tasks executed on separate ECUs. In the task chain, there is at least one network task as a connection between two scheduling tasks executed on different ECUs. For example, if ci-1 and ci+1 are scheduling tasks on different ECUs, then ci is a network task.</a:t>
+                </a:r>
+                <a:endParaRPr lang="zh-CN" altLang="en-US" sz="1400" dirty="0">
+                  <a:latin typeface="微软雅黑" panose="020B0503020204020204" pitchFamily="34" charset="-122"/>
+                  <a:ea typeface="微软雅黑" panose="020B0503020204020204" pitchFamily="34" charset="-122"/>
+                </a:endParaRPr>
+              </a:p>
+            </p:txBody>
+          </p:sp>
+        </mc:Choice>
+        <mc:Fallback>
+          <p:sp>
+            <p:nvSpPr>
+              <p:cNvPr id="6" name="文本框 5">
+                <a:extLst>
+                  <a:ext uri="{FF2B5EF4-FFF2-40B4-BE49-F238E27FC236}">
+                    <a16:creationId xmlns:a16="http://schemas.microsoft.com/office/drawing/2014/main" id="{289FD9E6-431C-A2AE-1F16-A2CB3762A3F7}"/>
+                  </a:ext>
+                </a:extLst>
+              </p:cNvPr>
+              <p:cNvSpPr txBox="1">
+                <a:spLocks noRot="1" noChangeAspect="1" noMove="1" noResize="1" noEditPoints="1" noAdjustHandles="1" noChangeArrowheads="1" noChangeShapeType="1" noTextEdit="1"/>
+              </p:cNvSpPr>
+              <p:nvPr/>
+            </p:nvSpPr>
+            <p:spPr>
+              <a:xfrm>
+                <a:off x="60512" y="1787917"/>
+                <a:ext cx="7127097" cy="4578561"/>
+              </a:xfrm>
+              <a:prstGeom prst="rect">
+                <a:avLst/>
+              </a:prstGeom>
+              <a:blipFill>
+                <a:blip r:embed="rId3"/>
+                <a:stretch>
+                  <a:fillRect l="-257" r="-855" b="-533"/>
+                </a:stretch>
+              </a:blipFill>
+            </p:spPr>
+            <p:txBody>
+              <a:bodyPr/>
+              <a:lstStyle/>
+              <a:p>
+                <a:r>
+                  <a:rPr lang="zh-CN" altLang="en-US">
+                    <a:noFill/>
+                  </a:rPr>
+                  <a:t> </a:t>
+                </a:r>
+              </a:p>
+            </p:txBody>
+          </p:sp>
+        </mc:Fallback>
+      </mc:AlternateContent>
       <p:pic>
         <p:nvPicPr>
           <p:cNvPr id="7" name="图片 6">
@@ -12824,7 +13081,7 @@
           <p:nvPr/>
         </p:nvPicPr>
         <p:blipFill>
-          <a:blip r:embed="rId3"/>
+          <a:blip r:embed="rId4"/>
           <a:stretch>
             <a:fillRect/>
           </a:stretch>
@@ -12956,224 +13213,268 @@
           </a:p>
         </p:txBody>
       </p:sp>
-      <p:sp>
-        <p:nvSpPr>
-          <p:cNvPr id="6" name="文本框 5">
-            <a:extLst>
-              <a:ext uri="{FF2B5EF4-FFF2-40B4-BE49-F238E27FC236}">
-                <a16:creationId xmlns:a16="http://schemas.microsoft.com/office/drawing/2014/main" id="{289FD9E6-431C-A2AE-1F16-A2CB3762A3F7}"/>
-              </a:ext>
-            </a:extLst>
-          </p:cNvPr>
-          <p:cNvSpPr txBox="1"/>
-          <p:nvPr/>
-        </p:nvSpPr>
-        <p:spPr>
-          <a:xfrm>
-            <a:off x="105335" y="1348647"/>
-            <a:ext cx="6797487" cy="3655231"/>
-          </a:xfrm>
-          <a:prstGeom prst="rect">
-            <a:avLst/>
-          </a:prstGeom>
-          <a:noFill/>
-        </p:spPr>
-        <p:txBody>
-          <a:bodyPr wrap="square">
-            <a:spAutoFit/>
-          </a:bodyPr>
-          <a:lstStyle/>
-          <a:p>
-            <a:pPr>
-              <a:lnSpc>
-                <a:spcPct val="150000"/>
-              </a:lnSpc>
-            </a:pPr>
-            <a:r>
-              <a:rPr lang="en-US" altLang="zh-CN" sz="1600" b="1" dirty="0">
-                <a:latin typeface="微软雅黑" panose="020B0503020204020204" pitchFamily="34" charset="-122"/>
-                <a:ea typeface="微软雅黑" panose="020B0503020204020204" pitchFamily="34" charset="-122"/>
-              </a:rPr>
-              <a:t>End Time </a:t>
-            </a:r>
-            <a:endParaRPr lang="en-US" altLang="zh-CN" sz="1400" dirty="0">
-              <a:latin typeface="微软雅黑" panose="020B0503020204020204" pitchFamily="34" charset="-122"/>
-              <a:ea typeface="微软雅黑" panose="020B0503020204020204" pitchFamily="34" charset="-122"/>
-            </a:endParaRPr>
-          </a:p>
-          <a:p>
-            <a:pPr>
-              <a:lnSpc>
-                <a:spcPct val="150000"/>
-              </a:lnSpc>
-            </a:pPr>
-            <a:r>
-              <a:rPr lang="zh-CN" altLang="en-US" sz="1400" dirty="0">
-                <a:latin typeface="微软雅黑" panose="020B0503020204020204" pitchFamily="34" charset="-122"/>
-                <a:ea typeface="微软雅黑" panose="020B0503020204020204" pitchFamily="34" charset="-122"/>
-              </a:rPr>
-              <a:t>𝑡 </a:t>
-            </a:r>
-            <a:r>
-              <a:rPr lang="en-US" altLang="zh-CN" sz="1400" dirty="0">
-                <a:latin typeface="微软雅黑" panose="020B0503020204020204" pitchFamily="34" charset="-122"/>
-                <a:ea typeface="微软雅黑" panose="020B0503020204020204" pitchFamily="34" charset="-122"/>
-              </a:rPr>
-              <a:t>(·) represents the end time of the event: </a:t>
-            </a:r>
-          </a:p>
-          <a:p>
-            <a:pPr marL="285750" indent="-285750">
-              <a:lnSpc>
-                <a:spcPct val="150000"/>
-              </a:lnSpc>
-              <a:buFont typeface="Arial" panose="020B0604020202020204" pitchFamily="34" charset="0"/>
-              <a:buChar char="•"/>
-            </a:pPr>
-            <a:r>
-              <a:rPr lang="en-US" altLang="zh-CN" sz="1400" dirty="0">
-                <a:latin typeface="微软雅黑" panose="020B0503020204020204" pitchFamily="34" charset="-122"/>
-                <a:ea typeface="微软雅黑" panose="020B0503020204020204" pitchFamily="34" charset="-122"/>
-              </a:rPr>
-              <a:t>For the external event z, $t(z)$ denotes the time at which the external event occurs, and $t(c_0​)$ is the end time of the external event. According to Definition 1, the external event z is also the event c0 of the task chain. The end time of the external event is the release time of the periodic scheduling task τ0 that is next poised to capture this external event z after it has been triggered.</a:t>
-            </a:r>
-          </a:p>
-          <a:p>
-            <a:pPr marL="285750" indent="-285750">
-              <a:lnSpc>
-                <a:spcPct val="150000"/>
-              </a:lnSpc>
-              <a:buFont typeface="Arial" panose="020B0604020202020204" pitchFamily="34" charset="0"/>
-              <a:buChar char="•"/>
-            </a:pPr>
-            <a:r>
-              <a:rPr lang="en-US" altLang="zh-CN" sz="1400" dirty="0">
-                <a:latin typeface="微软雅黑" panose="020B0503020204020204" pitchFamily="34" charset="-122"/>
-                <a:ea typeface="微软雅黑" panose="020B0503020204020204" pitchFamily="34" charset="-122"/>
-              </a:rPr>
-              <a:t> For a scheduling task $\</a:t>
-            </a:r>
-            <a:r>
-              <a:rPr lang="en-US" altLang="zh-CN" sz="1400" dirty="0" err="1">
-                <a:latin typeface="微软雅黑" panose="020B0503020204020204" pitchFamily="34" charset="-122"/>
-                <a:ea typeface="微软雅黑" panose="020B0503020204020204" pitchFamily="34" charset="-122"/>
-              </a:rPr>
-              <a:t>tau_i</a:t>
-            </a:r>
-            <a:r>
-              <a:rPr lang="en-US" altLang="zh-CN" sz="1400" dirty="0">
-                <a:latin typeface="微软雅黑" panose="020B0503020204020204" pitchFamily="34" charset="-122"/>
-                <a:ea typeface="微软雅黑" panose="020B0503020204020204" pitchFamily="34" charset="-122"/>
-              </a:rPr>
-              <a:t>$ on the ECU, $t(</a:t>
-            </a:r>
-            <a:r>
-              <a:rPr lang="en-US" altLang="zh-CN" sz="1400" dirty="0" err="1">
-                <a:latin typeface="微软雅黑" panose="020B0503020204020204" pitchFamily="34" charset="-122"/>
-                <a:ea typeface="微软雅黑" panose="020B0503020204020204" pitchFamily="34" charset="-122"/>
-              </a:rPr>
-              <a:t>c_i</a:t>
-            </a:r>
-            <a:r>
-              <a:rPr lang="en-US" altLang="zh-CN" sz="1400" dirty="0">
-                <a:latin typeface="微软雅黑" panose="020B0503020204020204" pitchFamily="34" charset="-122"/>
-                <a:ea typeface="微软雅黑" panose="020B0503020204020204" pitchFamily="34" charset="-122"/>
-              </a:rPr>
-              <a:t>)$ is the end time $f(</a:t>
-            </a:r>
-            <a:r>
-              <a:rPr lang="en-US" altLang="zh-CN" sz="1400" dirty="0" err="1">
-                <a:latin typeface="微软雅黑" panose="020B0503020204020204" pitchFamily="34" charset="-122"/>
-                <a:ea typeface="微软雅黑" panose="020B0503020204020204" pitchFamily="34" charset="-122"/>
-              </a:rPr>
-              <a:t>c_i</a:t>
-            </a:r>
-            <a:r>
-              <a:rPr lang="en-US" altLang="zh-CN" sz="1400" dirty="0">
-                <a:latin typeface="微软雅黑" panose="020B0503020204020204" pitchFamily="34" charset="-122"/>
-                <a:ea typeface="微软雅黑" panose="020B0503020204020204" pitchFamily="34" charset="-122"/>
-              </a:rPr>
-              <a:t>)$ of the scheduling task $\</a:t>
-            </a:r>
-            <a:r>
-              <a:rPr lang="en-US" altLang="zh-CN" sz="1400" dirty="0" err="1">
-                <a:latin typeface="微软雅黑" panose="020B0503020204020204" pitchFamily="34" charset="-122"/>
-                <a:ea typeface="微软雅黑" panose="020B0503020204020204" pitchFamily="34" charset="-122"/>
-              </a:rPr>
-              <a:t>tau_i</a:t>
-            </a:r>
-            <a:r>
-              <a:rPr lang="en-US" altLang="zh-CN" sz="1400" dirty="0">
-                <a:latin typeface="微软雅黑" panose="020B0503020204020204" pitchFamily="34" charset="-122"/>
-                <a:ea typeface="微软雅黑" panose="020B0503020204020204" pitchFamily="34" charset="-122"/>
-              </a:rPr>
-              <a:t>$. </a:t>
-            </a:r>
-          </a:p>
-          <a:p>
-            <a:pPr marL="285750" indent="-285750">
-              <a:lnSpc>
-                <a:spcPct val="150000"/>
-              </a:lnSpc>
-              <a:buFont typeface="Arial" panose="020B0604020202020204" pitchFamily="34" charset="0"/>
-              <a:buChar char="•"/>
-            </a:pPr>
-            <a:r>
-              <a:rPr lang="en-US" altLang="zh-CN" sz="1400" dirty="0">
-                <a:latin typeface="微软雅黑" panose="020B0503020204020204" pitchFamily="34" charset="-122"/>
-                <a:ea typeface="微软雅黑" panose="020B0503020204020204" pitchFamily="34" charset="-122"/>
-              </a:rPr>
-              <a:t> For a network task $</a:t>
-            </a:r>
-            <a:r>
-              <a:rPr lang="en-US" altLang="zh-CN" sz="1400" dirty="0" err="1">
-                <a:latin typeface="微软雅黑" panose="020B0503020204020204" pitchFamily="34" charset="-122"/>
-                <a:ea typeface="微软雅黑" panose="020B0503020204020204" pitchFamily="34" charset="-122"/>
-              </a:rPr>
-              <a:t>m_i</a:t>
-            </a:r>
-            <a:r>
-              <a:rPr lang="en-US" altLang="zh-CN" sz="1400" dirty="0">
-                <a:latin typeface="微软雅黑" panose="020B0503020204020204" pitchFamily="34" charset="-122"/>
-                <a:ea typeface="微软雅黑" panose="020B0503020204020204" pitchFamily="34" charset="-122"/>
-              </a:rPr>
-              <a:t>$, $t(</a:t>
-            </a:r>
-            <a:r>
-              <a:rPr lang="en-US" altLang="zh-CN" sz="1400" dirty="0" err="1">
-                <a:latin typeface="微软雅黑" panose="020B0503020204020204" pitchFamily="34" charset="-122"/>
-                <a:ea typeface="微软雅黑" panose="020B0503020204020204" pitchFamily="34" charset="-122"/>
-              </a:rPr>
-              <a:t>c_i</a:t>
-            </a:r>
-            <a:r>
-              <a:rPr lang="en-US" altLang="zh-CN" sz="1400" dirty="0">
-                <a:latin typeface="微软雅黑" panose="020B0503020204020204" pitchFamily="34" charset="-122"/>
-                <a:ea typeface="微软雅黑" panose="020B0503020204020204" pitchFamily="34" charset="-122"/>
-              </a:rPr>
-              <a:t>)$ is the end time $d(</a:t>
-            </a:r>
-            <a:r>
-              <a:rPr lang="en-US" altLang="zh-CN" sz="1400" dirty="0" err="1">
-                <a:latin typeface="微软雅黑" panose="020B0503020204020204" pitchFamily="34" charset="-122"/>
-                <a:ea typeface="微软雅黑" panose="020B0503020204020204" pitchFamily="34" charset="-122"/>
-              </a:rPr>
-              <a:t>c_i</a:t>
-            </a:r>
-            <a:r>
-              <a:rPr lang="en-US" altLang="zh-CN" sz="1400" dirty="0">
-                <a:latin typeface="微软雅黑" panose="020B0503020204020204" pitchFamily="34" charset="-122"/>
-                <a:ea typeface="微软雅黑" panose="020B0503020204020204" pitchFamily="34" charset="-122"/>
-              </a:rPr>
-              <a:t>)$.</a:t>
-            </a:r>
-            <a:endParaRPr lang="zh-CN" altLang="en-US" sz="1400" dirty="0">
-              <a:latin typeface="微软雅黑" panose="020B0503020204020204" pitchFamily="34" charset="-122"/>
-              <a:ea typeface="微软雅黑" panose="020B0503020204020204" pitchFamily="34" charset="-122"/>
-            </a:endParaRPr>
-          </a:p>
-        </p:txBody>
-      </p:sp>
+      <mc:AlternateContent xmlns:mc="http://schemas.openxmlformats.org/markup-compatibility/2006">
+        <mc:Choice xmlns:a14="http://schemas.microsoft.com/office/drawing/2010/main" Requires="a14">
+          <p:sp>
+            <p:nvSpPr>
+              <p:cNvPr id="6" name="文本框 5">
+                <a:extLst>
+                  <a:ext uri="{FF2B5EF4-FFF2-40B4-BE49-F238E27FC236}">
+                    <a16:creationId xmlns:a16="http://schemas.microsoft.com/office/drawing/2014/main" id="{289FD9E6-431C-A2AE-1F16-A2CB3762A3F7}"/>
+                  </a:ext>
+                </a:extLst>
+              </p:cNvPr>
+              <p:cNvSpPr txBox="1"/>
+              <p:nvPr/>
+            </p:nvSpPr>
+            <p:spPr>
+              <a:xfrm>
+                <a:off x="105335" y="1348647"/>
+                <a:ext cx="6797487" cy="4527009"/>
+              </a:xfrm>
+              <a:prstGeom prst="rect">
+                <a:avLst/>
+              </a:prstGeom>
+              <a:noFill/>
+            </p:spPr>
+            <p:txBody>
+              <a:bodyPr wrap="square">
+                <a:spAutoFit/>
+              </a:bodyPr>
+              <a:lstStyle/>
+              <a:p>
+                <a:pPr>
+                  <a:lnSpc>
+                    <a:spcPct val="150000"/>
+                  </a:lnSpc>
+                </a:pPr>
+                <a:r>
+                  <a:rPr lang="en-US" altLang="zh-CN" b="1" dirty="0">
+                    <a:latin typeface="微软雅黑" panose="020B0503020204020204" pitchFamily="34" charset="-122"/>
+                    <a:ea typeface="微软雅黑" panose="020B0503020204020204" pitchFamily="34" charset="-122"/>
+                  </a:rPr>
+                  <a:t>End Time </a:t>
+                </a:r>
+                <a:endParaRPr lang="en-US" altLang="zh-CN" sz="1600" dirty="0">
+                  <a:latin typeface="微软雅黑" panose="020B0503020204020204" pitchFamily="34" charset="-122"/>
+                  <a:ea typeface="微软雅黑" panose="020B0503020204020204" pitchFamily="34" charset="-122"/>
+                </a:endParaRPr>
+              </a:p>
+              <a:p>
+                <a:pPr>
+                  <a:lnSpc>
+                    <a:spcPct val="150000"/>
+                  </a:lnSpc>
+                </a:pPr>
+                <a:r>
+                  <a:rPr lang="zh-CN" altLang="en-US" sz="1600" dirty="0">
+                    <a:latin typeface="微软雅黑" panose="020B0503020204020204" pitchFamily="34" charset="-122"/>
+                    <a:ea typeface="微软雅黑" panose="020B0503020204020204" pitchFamily="34" charset="-122"/>
+                  </a:rPr>
+                  <a:t>𝑡 </a:t>
+                </a:r>
+                <a:r>
+                  <a:rPr lang="en-US" altLang="zh-CN" sz="1600" dirty="0">
+                    <a:latin typeface="微软雅黑" panose="020B0503020204020204" pitchFamily="34" charset="-122"/>
+                    <a:ea typeface="微软雅黑" panose="020B0503020204020204" pitchFamily="34" charset="-122"/>
+                  </a:rPr>
+                  <a:t>(·) represents the end time of the event: </a:t>
+                </a:r>
+              </a:p>
+              <a:p>
+                <a:pPr marL="285750" indent="-285750">
+                  <a:lnSpc>
+                    <a:spcPct val="150000"/>
+                  </a:lnSpc>
+                  <a:buFont typeface="Arial" panose="020B0604020202020204" pitchFamily="34" charset="0"/>
+                  <a:buChar char="•"/>
+                </a:pPr>
+                <a:r>
+                  <a:rPr lang="en-US" altLang="zh-CN" sz="1600" dirty="0">
+                    <a:latin typeface="微软雅黑" panose="020B0503020204020204" pitchFamily="34" charset="-122"/>
+                    <a:ea typeface="微软雅黑" panose="020B0503020204020204" pitchFamily="34" charset="-122"/>
+                  </a:rPr>
+                  <a:t>For the external event z, t(z) denotes the time at which the external event occurs, and t(c0​) is the end time of the external event. According to Definition 1, the external event z is also the event c0 of the task chain. The end time of the external event is the release time of the periodic scheduling task τ0 that is next poised to capture this external event z after it has been triggered.</a:t>
+                </a:r>
+              </a:p>
+              <a:p>
+                <a:pPr marL="285750" indent="-285750">
+                  <a:lnSpc>
+                    <a:spcPct val="150000"/>
+                  </a:lnSpc>
+                  <a:buFont typeface="Arial" panose="020B0604020202020204" pitchFamily="34" charset="0"/>
+                  <a:buChar char="•"/>
+                </a:pPr>
+                <a:r>
+                  <a:rPr lang="en-US" altLang="zh-CN" sz="1600" dirty="0">
+                    <a:latin typeface="微软雅黑" panose="020B0503020204020204" pitchFamily="34" charset="-122"/>
+                    <a:ea typeface="微软雅黑" panose="020B0503020204020204" pitchFamily="34" charset="-122"/>
+                  </a:rPr>
+                  <a:t> For a scheduling task </a:t>
+                </a:r>
+                <a:r>
+                  <a:rPr lang="en-US" altLang="zh-CN" sz="1600" dirty="0">
+                    <a:ea typeface="微软雅黑" panose="020B0503020204020204" pitchFamily="34" charset="-122"/>
+                  </a:rPr>
+                  <a:t> </a:t>
+                </a:r>
+                <a14:m>
+                  <m:oMath xmlns:m="http://schemas.openxmlformats.org/officeDocument/2006/math">
+                    <m:sSub>
+                      <m:sSubPr>
+                        <m:ctrlPr>
+                          <a:rPr lang="en-US" altLang="zh-CN" sz="1600" i="1" smtClean="0">
+                            <a:latin typeface="Cambria Math" panose="02040503050406030204" pitchFamily="18" charset="0"/>
+                            <a:ea typeface="微软雅黑" panose="020B0503020204020204" pitchFamily="34" charset="-122"/>
+                          </a:rPr>
+                        </m:ctrlPr>
+                      </m:sSubPr>
+                      <m:e>
+                        <m:r>
+                          <a:rPr lang="zh-CN" altLang="en-US" sz="1600" i="1" smtClean="0">
+                            <a:latin typeface="Cambria Math" panose="02040503050406030204" pitchFamily="18" charset="0"/>
+                            <a:ea typeface="微软雅黑" panose="020B0503020204020204" pitchFamily="34" charset="-122"/>
+                          </a:rPr>
+                          <m:t>𝜏</m:t>
+                        </m:r>
+                      </m:e>
+                      <m:sub>
+                        <m:r>
+                          <a:rPr lang="en-US" altLang="zh-CN" sz="1600" b="0" i="1" smtClean="0">
+                            <a:latin typeface="Cambria Math" panose="02040503050406030204" pitchFamily="18" charset="0"/>
+                            <a:ea typeface="微软雅黑" panose="020B0503020204020204" pitchFamily="34" charset="-122"/>
+                          </a:rPr>
+                          <m:t>𝑖</m:t>
+                        </m:r>
+                      </m:sub>
+                    </m:sSub>
+                    <m:r>
+                      <a:rPr lang="en-US" altLang="zh-CN" sz="1600" b="0" i="1" smtClean="0">
+                        <a:latin typeface="Cambria Math" panose="02040503050406030204" pitchFamily="18" charset="0"/>
+                        <a:ea typeface="微软雅黑" panose="020B0503020204020204" pitchFamily="34" charset="-122"/>
+                      </a:rPr>
+                      <m:t> </m:t>
+                    </m:r>
+                  </m:oMath>
+                </a14:m>
+                <a:r>
+                  <a:rPr lang="en-US" altLang="zh-CN" sz="1600" dirty="0">
+                    <a:latin typeface="微软雅黑" panose="020B0503020204020204" pitchFamily="34" charset="-122"/>
+                    <a:ea typeface="微软雅黑" panose="020B0503020204020204" pitchFamily="34" charset="-122"/>
+                  </a:rPr>
+                  <a:t>on the ECU, t(ci) is the end time f(ci) of the scheduling task </a:t>
+                </a:r>
+                <a:r>
+                  <a:rPr lang="en-US" altLang="zh-CN" sz="1600" dirty="0">
+                    <a:ea typeface="微软雅黑" panose="020B0503020204020204" pitchFamily="34" charset="-122"/>
+                  </a:rPr>
+                  <a:t> </a:t>
+                </a:r>
+                <a14:m>
+                  <m:oMath xmlns:m="http://schemas.openxmlformats.org/officeDocument/2006/math">
+                    <m:sSub>
+                      <m:sSubPr>
+                        <m:ctrlPr>
+                          <a:rPr lang="en-US" altLang="zh-CN" sz="1600" i="1">
+                            <a:latin typeface="Cambria Math" panose="02040503050406030204" pitchFamily="18" charset="0"/>
+                            <a:ea typeface="微软雅黑" panose="020B0503020204020204" pitchFamily="34" charset="-122"/>
+                          </a:rPr>
+                        </m:ctrlPr>
+                      </m:sSubPr>
+                      <m:e>
+                        <m:r>
+                          <a:rPr lang="zh-CN" altLang="en-US" sz="1600" i="1">
+                            <a:latin typeface="Cambria Math" panose="02040503050406030204" pitchFamily="18" charset="0"/>
+                            <a:ea typeface="微软雅黑" panose="020B0503020204020204" pitchFamily="34" charset="-122"/>
+                          </a:rPr>
+                          <m:t>𝜏</m:t>
+                        </m:r>
+                      </m:e>
+                      <m:sub>
+                        <m:r>
+                          <a:rPr lang="en-US" altLang="zh-CN" sz="1600" b="0" i="1" smtClean="0">
+                            <a:latin typeface="Cambria Math" panose="02040503050406030204" pitchFamily="18" charset="0"/>
+                            <a:ea typeface="微软雅黑" panose="020B0503020204020204" pitchFamily="34" charset="-122"/>
+                          </a:rPr>
+                          <m:t>𝑖</m:t>
+                        </m:r>
+                      </m:sub>
+                    </m:sSub>
+                  </m:oMath>
+                </a14:m>
+                <a:endParaRPr lang="en-US" altLang="zh-CN" sz="1600" dirty="0">
+                  <a:latin typeface="微软雅黑" panose="020B0503020204020204" pitchFamily="34" charset="-122"/>
+                  <a:ea typeface="微软雅黑" panose="020B0503020204020204" pitchFamily="34" charset="-122"/>
+                </a:endParaRPr>
+              </a:p>
+              <a:p>
+                <a:pPr marL="285750" indent="-285750">
+                  <a:lnSpc>
+                    <a:spcPct val="150000"/>
+                  </a:lnSpc>
+                  <a:buFont typeface="Arial" panose="020B0604020202020204" pitchFamily="34" charset="0"/>
+                  <a:buChar char="•"/>
+                </a:pPr>
+                <a:r>
+                  <a:rPr lang="en-US" altLang="zh-CN" sz="1600" dirty="0">
+                    <a:latin typeface="微软雅黑" panose="020B0503020204020204" pitchFamily="34" charset="-122"/>
+                    <a:ea typeface="微软雅黑" panose="020B0503020204020204" pitchFamily="34" charset="-122"/>
+                  </a:rPr>
+                  <a:t> For a network task mi, t(ci) is the end time d(ci).</a:t>
+                </a:r>
+                <a:endParaRPr lang="zh-CN" altLang="en-US" sz="1600" dirty="0">
+                  <a:latin typeface="微软雅黑" panose="020B0503020204020204" pitchFamily="34" charset="-122"/>
+                  <a:ea typeface="微软雅黑" panose="020B0503020204020204" pitchFamily="34" charset="-122"/>
+                </a:endParaRPr>
+              </a:p>
+            </p:txBody>
+          </p:sp>
+        </mc:Choice>
+        <mc:Fallback>
+          <p:sp>
+            <p:nvSpPr>
+              <p:cNvPr id="6" name="文本框 5">
+                <a:extLst>
+                  <a:ext uri="{FF2B5EF4-FFF2-40B4-BE49-F238E27FC236}">
+                    <a16:creationId xmlns:a16="http://schemas.microsoft.com/office/drawing/2014/main" id="{289FD9E6-431C-A2AE-1F16-A2CB3762A3F7}"/>
+                  </a:ext>
+                </a:extLst>
+              </p:cNvPr>
+              <p:cNvSpPr txBox="1">
+                <a:spLocks noRot="1" noChangeAspect="1" noMove="1" noResize="1" noEditPoints="1" noAdjustHandles="1" noChangeArrowheads="1" noChangeShapeType="1" noTextEdit="1"/>
+              </p:cNvSpPr>
+              <p:nvPr/>
+            </p:nvSpPr>
+            <p:spPr>
+              <a:xfrm>
+                <a:off x="105335" y="1348647"/>
+                <a:ext cx="6797487" cy="4527009"/>
+              </a:xfrm>
+              <a:prstGeom prst="rect">
+                <a:avLst/>
+              </a:prstGeom>
+              <a:blipFill>
+                <a:blip r:embed="rId3"/>
+                <a:stretch>
+                  <a:fillRect l="-717" b="-808"/>
+                </a:stretch>
+              </a:blipFill>
+            </p:spPr>
+            <p:txBody>
+              <a:bodyPr/>
+              <a:lstStyle/>
+              <a:p>
+                <a:r>
+                  <a:rPr lang="zh-CN" altLang="en-US">
+                    <a:noFill/>
+                  </a:rPr>
+                  <a:t> </a:t>
+                </a:r>
+              </a:p>
+            </p:txBody>
+          </p:sp>
+        </mc:Fallback>
+      </mc:AlternateContent>
       <p:pic>
         <p:nvPicPr>
           <p:cNvPr id="2" name="图片 1">
@@ -13189,7 +13490,7 @@
           <p:nvPr/>
         </p:nvPicPr>
         <p:blipFill>
-          <a:blip r:embed="rId3"/>
+          <a:blip r:embed="rId4"/>
           <a:stretch>
             <a:fillRect/>
           </a:stretch>

</xml_diff>

<commit_message>
vault backup: 2024-04-23 21:45:53
</commit_message>
<xml_diff>
--- a/06-ppt/RTS-Turin-Class/0423.pptx
+++ b/06-ppt/RTS-Turin-Class/0423.pptx
@@ -212,7 +212,7 @@
           <a:p>
             <a:fld id="{BFB3BCA0-073B-4AA3-93D1-1E422E4EF703}" type="datetimeFigureOut">
               <a:rPr lang="zh-CN" altLang="en-US" smtClean="0"/>
-              <a:t>2024/4/22</a:t>
+              <a:t>2024/4/23</a:t>
             </a:fld>
             <a:endParaRPr lang="zh-CN" altLang="en-US"/>
           </a:p>
@@ -868,6 +868,34 @@
             </a:r>
           </a:p>
           <a:p>
+            <a:pPr marL="0" marR="0" lvl="0" indent="0" algn="l" defTabSz="914400" rtl="0" eaLnBrk="1" fontAlgn="auto" latinLnBrk="0" hangingPunct="1">
+              <a:lnSpc>
+                <a:spcPct val="100000"/>
+              </a:lnSpc>
+              <a:spcBef>
+                <a:spcPts val="0"/>
+              </a:spcBef>
+              <a:spcAft>
+                <a:spcPts val="0"/>
+              </a:spcAft>
+              <a:buClrTx/>
+              <a:buSzTx/>
+              <a:buFontTx/>
+              <a:buNone/>
+              <a:tabLst/>
+              <a:defRPr/>
+            </a:pPr>
+            <a:r>
+              <a:rPr lang="en-US" altLang="zh-CN" sz="1200" kern="100" dirty="0">
+                <a:effectLst/>
+                <a:latin typeface="Calibri" panose="020F0502020204030204" pitchFamily="34" charset="0"/>
+                <a:ea typeface="宋体" panose="02010600030101010101" pitchFamily="2" charset="-122"/>
+                <a:cs typeface="Times New Roman" panose="02020603050405020304" pitchFamily="18" charset="0"/>
+              </a:rPr>
+              <a:t>The incentivized action resulting from external event z occurs after the final result of the task chain is produced, at the release time of the next data processing task following the last task in the chain. According to the task model of this paper, the time of the incentivized action is the release time of the next task after the last task in the task chain, which is also the end time of the last task in the chain, because we are using an event-triggered method. Therefore, by definition, the data age of the task chain is D(C) = 36 - 6 = 30.</a:t>
+            </a:r>
+          </a:p>
+          <a:p>
             <a:endParaRPr lang="zh-CN" altLang="en-US" dirty="0"/>
           </a:p>
         </p:txBody>
@@ -1308,7 +1336,7 @@
                 <a:ea typeface="宋体" panose="02010600030101010101" pitchFamily="2" charset="-122"/>
                 <a:cs typeface="Times New Roman" panose="02020603050405020304" pitchFamily="18" charset="0"/>
               </a:rPr>
-              <a:t>I conducted a work on reaction time analysis last year. Reaction Time Analysis of Task Chains for TSN-based Distributed Real-time Systems</a:t>
+              <a:t>For instance, during automatic vehicle cruising, if the reaction time of the control unit exceeds 50 milliseconds, although it may still complete the deceleration control within the deadline, the delay in the control signal could result in a sudden deceleration and loss of vehicle stability. Moreover, the recency of data is essential for its timeliness, and in the context of autonomous driving systems, more up-to-date data can facilitate more precise decision-making.</a:t>
             </a:r>
           </a:p>
           <a:p>
@@ -1326,87 +1354,6 @@
               <a:ea typeface="宋体" panose="02010600030101010101" pitchFamily="2" charset="-122"/>
               <a:cs typeface="Times New Roman" panose="02020603050405020304" pitchFamily="18" charset="0"/>
             </a:endParaRPr>
-          </a:p>
-          <a:p>
-            <a:pPr marL="0" marR="0" algn="just">
-              <a:spcBef>
-                <a:spcPts val="0"/>
-              </a:spcBef>
-              <a:spcAft>
-                <a:spcPts val="0"/>
-              </a:spcAft>
-            </a:pPr>
-            <a:r>
-              <a:rPr lang="en-US" altLang="zh-CN" sz="1800" kern="100" dirty="0">
-                <a:effectLst/>
-                <a:latin typeface="Calibri" panose="020F0502020204030204" pitchFamily="34" charset="0"/>
-                <a:ea typeface="宋体" panose="02010600030101010101" pitchFamily="2" charset="-122"/>
-                <a:cs typeface="Times New Roman" panose="02020603050405020304" pitchFamily="18" charset="0"/>
-              </a:rPr>
-              <a:t>For instance, during automatic vehicle cruising, if the reaction time of the control unit exceeds 50 milliseconds, although it may still complete the deceleration control within the deadline, the delay in the control signal could result in a sudden deceleration and loss of vehicle stability. Moreover, the recency of data is essential for its timeliness, and in the context of autonomous driving systems, more up-to-date data can facilitate more precise decision-making.</a:t>
-            </a:r>
-          </a:p>
-          <a:p>
-            <a:pPr marL="0" marR="0" algn="just">
-              <a:spcBef>
-                <a:spcPts val="0"/>
-              </a:spcBef>
-              <a:spcAft>
-                <a:spcPts val="0"/>
-              </a:spcAft>
-            </a:pPr>
-            <a:endParaRPr lang="en-US" altLang="zh-CN" sz="1800" kern="100" dirty="0">
-              <a:effectLst/>
-              <a:latin typeface="Calibri" panose="020F0502020204030204" pitchFamily="34" charset="0"/>
-              <a:ea typeface="宋体" panose="02010600030101010101" pitchFamily="2" charset="-122"/>
-              <a:cs typeface="Times New Roman" panose="02020603050405020304" pitchFamily="18" charset="0"/>
-            </a:endParaRPr>
-          </a:p>
-          <a:p>
-            <a:pPr marL="0" marR="0" lvl="0" indent="0" algn="just" defTabSz="914400" rtl="0" eaLnBrk="1" fontAlgn="auto" latinLnBrk="0" hangingPunct="1">
-              <a:lnSpc>
-                <a:spcPct val="100000"/>
-              </a:lnSpc>
-              <a:spcBef>
-                <a:spcPts val="0"/>
-              </a:spcBef>
-              <a:spcAft>
-                <a:spcPts val="0"/>
-              </a:spcAft>
-              <a:buClrTx/>
-              <a:buSzTx/>
-              <a:buFontTx/>
-              <a:buNone/>
-              <a:tabLst/>
-              <a:defRPr/>
-            </a:pPr>
-            <a:r>
-              <a:rPr lang="en-US" altLang="zh-CN" sz="1800" kern="100" dirty="0">
-                <a:effectLst/>
-                <a:latin typeface="Calibri" panose="020F0502020204030204" pitchFamily="34" charset="0"/>
-                <a:ea typeface="宋体" panose="02010600030101010101" pitchFamily="2" charset="-122"/>
-                <a:cs typeface="Times New Roman" panose="02020603050405020304" pitchFamily="18" charset="0"/>
-              </a:rPr>
-              <a:t>Then Model and Analyze reaction time of task chains of distributed real-time systems based on the IEEE 802.1 </a:t>
-            </a:r>
-            <a:r>
-              <a:rPr lang="en-US" altLang="zh-CN" sz="1800" kern="100" dirty="0" err="1">
-                <a:effectLst/>
-                <a:latin typeface="Calibri" panose="020F0502020204030204" pitchFamily="34" charset="0"/>
-                <a:ea typeface="宋体" panose="02010600030101010101" pitchFamily="2" charset="-122"/>
-                <a:cs typeface="Times New Roman" panose="02020603050405020304" pitchFamily="18" charset="0"/>
-              </a:rPr>
-              <a:t>Qcr</a:t>
-            </a:r>
-            <a:r>
-              <a:rPr lang="en-US" altLang="zh-CN" sz="1800" kern="100" dirty="0">
-                <a:effectLst/>
-                <a:latin typeface="Calibri" panose="020F0502020204030204" pitchFamily="34" charset="0"/>
-                <a:ea typeface="宋体" panose="02010600030101010101" pitchFamily="2" charset="-122"/>
-                <a:cs typeface="Times New Roman" panose="02020603050405020304" pitchFamily="18" charset="0"/>
-              </a:rPr>
-              <a:t> standard</a:t>
-            </a:r>
           </a:p>
           <a:p>
             <a:pPr marL="0" marR="0" algn="just">
@@ -2018,7 +1965,35 @@
                 <a:ea typeface="宋体" panose="02010600030101010101" pitchFamily="2" charset="-122"/>
                 <a:cs typeface="Times New Roman" panose="02020603050405020304" pitchFamily="18" charset="0"/>
               </a:rPr>
-              <a:t>As shown in the figure. At the system time $t=4$, an external event occurs and the relevant initial data is written into the input buffer $B_0$ of task $J_0^2$. At time $t=6$, the sampling task $J_0^2$ that was released captures the external event data updated in its input buffer $B_0$. At $t=10$, the scheduling task $J_0^2$ on ECU1 finishes processing the data and writes the updated data into the input buffer $B_1$ of task $J_1^1$. When task $J_1^1$ ends, the resulting output begins to be transmitted over the network to ECU2. The data frame is enqueued at time $t=17$, shaped by the ATS algorithm, and by time $t=21$, the entire data frame has finished processing at switch 1. As required by network topology or routing selection algorithms, the data frame is directed to switch 2, where it continues to undergo ATS-related processing. Similarly, at time $t=32$, the data frame is transmitted from switch 2 to ECU2. Finally, at time $t=36$, the final data result regarding the external event z is produced. As shown in the figure, according to the definition, the reaction time of the task chain processing external event z is $R(C) = 36 - 4 = 32$. The incentivized action resulting from external event z occurs after the final result of the task chain is produced, at the release time of the next data processing task following the last task in the chain. According to the task model of this paper, the time of the incentivized action is the release time of the next task after the last task in the task chain, which is also the end time of the last task in the chain, because we are using an event-triggered method. Therefore, by definition, the data age of the task chain is $D(C) = 36 - 6 = 30$.</a:t>
+              <a:t>As shown in the figure. At the time t=4, an event data is written into the input buffer B_0 of task J_0^2. At time t=6, the sampling task J_0^2 captures the event. At t=10, the scheduling task J_0^2 on ECU1 finishes processing the data and writes the updated data into the input buffer B_1. When task J_1^1 ends, the resulting output begins to be transmitted over the network to ECU2. </a:t>
+            </a:r>
+          </a:p>
+          <a:p>
+            <a:pPr marL="0" marR="0" lvl="0" indent="0" algn="l" defTabSz="914400" rtl="0" eaLnBrk="1" fontAlgn="auto" latinLnBrk="0" hangingPunct="1">
+              <a:lnSpc>
+                <a:spcPct val="100000"/>
+              </a:lnSpc>
+              <a:spcBef>
+                <a:spcPts val="0"/>
+              </a:spcBef>
+              <a:spcAft>
+                <a:spcPts val="0"/>
+              </a:spcAft>
+              <a:buClrTx/>
+              <a:buSzTx/>
+              <a:buFontTx/>
+              <a:buNone/>
+              <a:tabLst/>
+              <a:defRPr/>
+            </a:pPr>
+            <a:r>
+              <a:rPr lang="en-US" altLang="zh-CN" sz="1800" kern="100" dirty="0">
+                <a:effectLst/>
+                <a:latin typeface="Calibri" panose="020F0502020204030204" pitchFamily="34" charset="0"/>
+                <a:ea typeface="宋体" panose="02010600030101010101" pitchFamily="2" charset="-122"/>
+                <a:cs typeface="Times New Roman" panose="02020603050405020304" pitchFamily="18" charset="0"/>
+              </a:rPr>
+              <a:t>The data frame is enqueued at time t=17, shaped by the ATS algorithm, and by time t=21, the entire data frame has finished processing at switch 1. Similarly, at time t=32, the data frame is transmitted from switch 2 to ECU2. Finally, at time t=36, the final data result is produced. </a:t>
             </a:r>
           </a:p>
           <a:p>
@@ -2160,6 +2135,9 @@
             </a:r>
           </a:p>
           <a:p>
+            <a:endParaRPr lang="en-US" altLang="zh-CN" dirty="0"/>
+          </a:p>
+          <a:p>
             <a:endParaRPr lang="zh-CN" altLang="en-US" dirty="0"/>
           </a:p>
         </p:txBody>
@@ -2272,6 +2250,35 @@
             </a:r>
           </a:p>
           <a:p>
+            <a:endParaRPr lang="en-US" altLang="zh-CN" dirty="0"/>
+          </a:p>
+          <a:p>
+            <a:pPr marL="0" marR="0" lvl="0" indent="0" algn="l" defTabSz="914400" rtl="0" eaLnBrk="1" fontAlgn="auto" latinLnBrk="0" hangingPunct="1">
+              <a:lnSpc>
+                <a:spcPct val="100000"/>
+              </a:lnSpc>
+              <a:spcBef>
+                <a:spcPts val="0"/>
+              </a:spcBef>
+              <a:spcAft>
+                <a:spcPts val="0"/>
+              </a:spcAft>
+              <a:buClrTx/>
+              <a:buSzTx/>
+              <a:buFontTx/>
+              <a:buNone/>
+              <a:tabLst/>
+              <a:defRPr/>
+            </a:pPr>
+            <a:r>
+              <a:rPr lang="en-US" altLang="zh-CN" sz="1200" kern="100" dirty="0">
+                <a:effectLst/>
+                <a:latin typeface="Calibri" panose="020F0502020204030204" pitchFamily="34" charset="0"/>
+                <a:ea typeface="宋体" panose="02010600030101010101" pitchFamily="2" charset="-122"/>
+                <a:cs typeface="Times New Roman" panose="02020603050405020304" pitchFamily="18" charset="0"/>
+              </a:rPr>
+              <a:t>As shown in the figure, according to the definition, the reaction time is R(C) = 36 - 4 = 32. </a:t>
+            </a:r>
             <a:endParaRPr lang="zh-CN" altLang="en-US" dirty="0"/>
           </a:p>
         </p:txBody>
@@ -2459,7 +2466,7 @@
           <a:p>
             <a:fld id="{47574B27-0941-438E-852F-CBC446AABACC}" type="datetimeFigureOut">
               <a:rPr lang="zh-CN" altLang="en-US" smtClean="0"/>
-              <a:t>2024/4/22</a:t>
+              <a:t>2024/4/23</a:t>
             </a:fld>
             <a:endParaRPr lang="zh-CN" altLang="en-US"/>
           </a:p>
@@ -2657,7 +2664,7 @@
           <a:p>
             <a:fld id="{47574B27-0941-438E-852F-CBC446AABACC}" type="datetimeFigureOut">
               <a:rPr lang="zh-CN" altLang="en-US" smtClean="0"/>
-              <a:t>2024/4/22</a:t>
+              <a:t>2024/4/23</a:t>
             </a:fld>
             <a:endParaRPr lang="zh-CN" altLang="en-US"/>
           </a:p>
@@ -2865,7 +2872,7 @@
           <a:p>
             <a:fld id="{47574B27-0941-438E-852F-CBC446AABACC}" type="datetimeFigureOut">
               <a:rPr lang="zh-CN" altLang="en-US" smtClean="0"/>
-              <a:t>2024/4/22</a:t>
+              <a:t>2024/4/23</a:t>
             </a:fld>
             <a:endParaRPr lang="zh-CN" altLang="en-US"/>
           </a:p>
@@ -3063,7 +3070,7 @@
           <a:p>
             <a:fld id="{47574B27-0941-438E-852F-CBC446AABACC}" type="datetimeFigureOut">
               <a:rPr lang="zh-CN" altLang="en-US" smtClean="0"/>
-              <a:t>2024/4/22</a:t>
+              <a:t>2024/4/23</a:t>
             </a:fld>
             <a:endParaRPr lang="zh-CN" altLang="en-US"/>
           </a:p>
@@ -3338,7 +3345,7 @@
           <a:p>
             <a:fld id="{47574B27-0941-438E-852F-CBC446AABACC}" type="datetimeFigureOut">
               <a:rPr lang="zh-CN" altLang="en-US" smtClean="0"/>
-              <a:t>2024/4/22</a:t>
+              <a:t>2024/4/23</a:t>
             </a:fld>
             <a:endParaRPr lang="zh-CN" altLang="en-US"/>
           </a:p>
@@ -3603,7 +3610,7 @@
           <a:p>
             <a:fld id="{47574B27-0941-438E-852F-CBC446AABACC}" type="datetimeFigureOut">
               <a:rPr lang="zh-CN" altLang="en-US" smtClean="0"/>
-              <a:t>2024/4/22</a:t>
+              <a:t>2024/4/23</a:t>
             </a:fld>
             <a:endParaRPr lang="zh-CN" altLang="en-US"/>
           </a:p>
@@ -4015,7 +4022,7 @@
           <a:p>
             <a:fld id="{47574B27-0941-438E-852F-CBC446AABACC}" type="datetimeFigureOut">
               <a:rPr lang="zh-CN" altLang="en-US" smtClean="0"/>
-              <a:t>2024/4/22</a:t>
+              <a:t>2024/4/23</a:t>
             </a:fld>
             <a:endParaRPr lang="zh-CN" altLang="en-US"/>
           </a:p>
@@ -4156,7 +4163,7 @@
           <a:p>
             <a:fld id="{47574B27-0941-438E-852F-CBC446AABACC}" type="datetimeFigureOut">
               <a:rPr lang="zh-CN" altLang="en-US" smtClean="0"/>
-              <a:t>2024/4/22</a:t>
+              <a:t>2024/4/23</a:t>
             </a:fld>
             <a:endParaRPr lang="zh-CN" altLang="en-US"/>
           </a:p>
@@ -4269,7 +4276,7 @@
           <a:p>
             <a:fld id="{47574B27-0941-438E-852F-CBC446AABACC}" type="datetimeFigureOut">
               <a:rPr lang="zh-CN" altLang="en-US" smtClean="0"/>
-              <a:t>2024/4/22</a:t>
+              <a:t>2024/4/23</a:t>
             </a:fld>
             <a:endParaRPr lang="zh-CN" altLang="en-US"/>
           </a:p>
@@ -4580,7 +4587,7 @@
           <a:p>
             <a:fld id="{47574B27-0941-438E-852F-CBC446AABACC}" type="datetimeFigureOut">
               <a:rPr lang="zh-CN" altLang="en-US" smtClean="0"/>
-              <a:t>2024/4/22</a:t>
+              <a:t>2024/4/23</a:t>
             </a:fld>
             <a:endParaRPr lang="zh-CN" altLang="en-US"/>
           </a:p>
@@ -4868,7 +4875,7 @@
           <a:p>
             <a:fld id="{47574B27-0941-438E-852F-CBC446AABACC}" type="datetimeFigureOut">
               <a:rPr lang="zh-CN" altLang="en-US" smtClean="0"/>
-              <a:t>2024/4/22</a:t>
+              <a:t>2024/4/23</a:t>
             </a:fld>
             <a:endParaRPr lang="zh-CN" altLang="en-US"/>
           </a:p>
@@ -5109,7 +5116,7 @@
           <a:p>
             <a:fld id="{47574B27-0941-438E-852F-CBC446AABACC}" type="datetimeFigureOut">
               <a:rPr lang="zh-CN" altLang="en-US" smtClean="0"/>
-              <a:t>2024/4/22</a:t>
+              <a:t>2024/4/23</a:t>
             </a:fld>
             <a:endParaRPr lang="zh-CN" altLang="en-US"/>
           </a:p>
@@ -11664,6 +11671,14 @@
               </a:rPr>
               <a:t>Qcr</a:t>
             </a:r>
+            <a:r>
+              <a:rPr lang="en-US" altLang="zh-CN" sz="2000" b="1" dirty="0">
+                <a:latin typeface="微软雅黑" panose="020B0503020204020204" pitchFamily="34" charset="-122"/>
+                <a:ea typeface="微软雅黑" panose="020B0503020204020204" pitchFamily="34" charset="-122"/>
+                <a:cs typeface="Times New Roman" panose="02020603050405020304" pitchFamily="18" charset="0"/>
+              </a:rPr>
+              <a:t> background</a:t>
+            </a:r>
             <a:endParaRPr lang="zh-CN" altLang="en-US" sz="2000" b="1" dirty="0">
               <a:latin typeface="微软雅黑" panose="020B0503020204020204" pitchFamily="34" charset="-122"/>
               <a:ea typeface="微软雅黑" panose="020B0503020204020204" pitchFamily="34" charset="-122"/>
@@ -11918,50 +11933,6 @@
           </a:p>
         </p:txBody>
       </p:sp>
-      <p:sp>
-        <p:nvSpPr>
-          <p:cNvPr id="10" name="标题 1">
-            <a:extLst>
-              <a:ext uri="{FF2B5EF4-FFF2-40B4-BE49-F238E27FC236}">
-                <a16:creationId xmlns:a16="http://schemas.microsoft.com/office/drawing/2014/main" id="{53DBB45A-BA5E-F027-7627-467C8A423A3A}"/>
-              </a:ext>
-            </a:extLst>
-          </p:cNvPr>
-          <p:cNvSpPr>
-            <a:spLocks noGrp="1"/>
-          </p:cNvSpPr>
-          <p:nvPr>
-            <p:ph type="title"/>
-          </p:nvPr>
-        </p:nvSpPr>
-        <p:spPr>
-          <a:xfrm>
-            <a:off x="0" y="838069"/>
-            <a:ext cx="2528047" cy="296015"/>
-          </a:xfrm>
-        </p:spPr>
-        <p:txBody>
-          <a:bodyPr>
-            <a:noAutofit/>
-          </a:bodyPr>
-          <a:lstStyle/>
-          <a:p>
-            <a:r>
-              <a:rPr lang="en-US" altLang="zh-CN" sz="2000" b="1" dirty="0" err="1">
-                <a:latin typeface="微软雅黑" panose="020B0503020204020204" pitchFamily="34" charset="-122"/>
-                <a:ea typeface="微软雅黑" panose="020B0503020204020204" pitchFamily="34" charset="-122"/>
-                <a:cs typeface="Times New Roman" panose="02020603050405020304" pitchFamily="18" charset="0"/>
-              </a:rPr>
-              <a:t>Qcr</a:t>
-            </a:r>
-            <a:endParaRPr lang="zh-CN" altLang="en-US" sz="2000" b="1" dirty="0">
-              <a:latin typeface="微软雅黑" panose="020B0503020204020204" pitchFamily="34" charset="-122"/>
-              <a:ea typeface="微软雅黑" panose="020B0503020204020204" pitchFamily="34" charset="-122"/>
-              <a:cs typeface="Times New Roman" panose="02020603050405020304" pitchFamily="18" charset="0"/>
-            </a:endParaRPr>
-          </a:p>
-        </p:txBody>
-      </p:sp>
       <p:pic>
         <p:nvPicPr>
           <p:cNvPr id="12" name="图片 11">
@@ -12202,29 +12173,92 @@
           <a:lstStyle/>
           <a:p>
             <a:r>
-              <a:rPr lang="en-US" altLang="zh-CN" sz="1600" dirty="0">
+              <a:rPr lang="en-US" altLang="zh-CN" sz="1600" b="1" dirty="0">
                 <a:latin typeface="微软雅黑" panose="020B0503020204020204" pitchFamily="34" charset="-122"/>
                 <a:ea typeface="微软雅黑" panose="020B0503020204020204" pitchFamily="34" charset="-122"/>
               </a:rPr>
               <a:t>Finally, the ATS algorithm based on token bucket is used in the IEEE 802.1 </a:t>
             </a:r>
             <a:r>
-              <a:rPr lang="en-US" altLang="zh-CN" sz="1600" dirty="0" err="1">
+              <a:rPr lang="en-US" altLang="zh-CN" sz="1600" b="1" dirty="0" err="1">
                 <a:latin typeface="微软雅黑" panose="020B0503020204020204" pitchFamily="34" charset="-122"/>
                 <a:ea typeface="微软雅黑" panose="020B0503020204020204" pitchFamily="34" charset="-122"/>
               </a:rPr>
               <a:t>Qcr</a:t>
             </a:r>
             <a:r>
-              <a:rPr lang="en-US" altLang="zh-CN" sz="1600" dirty="0">
+              <a:rPr lang="en-US" altLang="zh-CN" sz="1600" b="1" dirty="0">
                 <a:latin typeface="微软雅黑" panose="020B0503020204020204" pitchFamily="34" charset="-122"/>
                 <a:ea typeface="微软雅黑" panose="020B0503020204020204" pitchFamily="34" charset="-122"/>
               </a:rPr>
               <a:t> protocol. </a:t>
             </a:r>
-            <a:endParaRPr lang="zh-CN" altLang="en-US" sz="1600" dirty="0">
+            <a:endParaRPr lang="zh-CN" altLang="en-US" sz="1600" b="1" dirty="0">
               <a:latin typeface="微软雅黑" panose="020B0503020204020204" pitchFamily="34" charset="-122"/>
               <a:ea typeface="微软雅黑" panose="020B0503020204020204" pitchFamily="34" charset="-122"/>
+            </a:endParaRPr>
+          </a:p>
+        </p:txBody>
+      </p:sp>
+      <p:sp>
+        <p:nvSpPr>
+          <p:cNvPr id="6" name="标题 1">
+            <a:extLst>
+              <a:ext uri="{FF2B5EF4-FFF2-40B4-BE49-F238E27FC236}">
+                <a16:creationId xmlns:a16="http://schemas.microsoft.com/office/drawing/2014/main" id="{5336837C-C61B-55D1-FDB3-C5C26E8C5DC8}"/>
+              </a:ext>
+            </a:extLst>
+          </p:cNvPr>
+          <p:cNvSpPr txBox="1">
+            <a:spLocks/>
+          </p:cNvSpPr>
+          <p:nvPr/>
+        </p:nvSpPr>
+        <p:spPr>
+          <a:xfrm>
+            <a:off x="0" y="838069"/>
+            <a:ext cx="2528047" cy="296015"/>
+          </a:xfrm>
+          <a:prstGeom prst="rect">
+            <a:avLst/>
+          </a:prstGeom>
+        </p:spPr>
+        <p:txBody>
+          <a:bodyPr vert="horz" lIns="91440" tIns="45720" rIns="91440" bIns="45720" rtlCol="0" anchor="ctr">
+            <a:noAutofit/>
+          </a:bodyPr>
+          <a:lstStyle>
+            <a:lvl1pPr algn="l" defTabSz="914400" rtl="0" eaLnBrk="1" latinLnBrk="0" hangingPunct="1">
+              <a:lnSpc>
+                <a:spcPct val="90000"/>
+              </a:lnSpc>
+              <a:spcBef>
+                <a:spcPct val="0"/>
+              </a:spcBef>
+              <a:buNone/>
+              <a:defRPr sz="4400" kern="1200">
+                <a:solidFill>
+                  <a:schemeClr val="tx1"/>
+                </a:solidFill>
+                <a:latin typeface="+mj-lt"/>
+                <a:ea typeface="+mj-ea"/>
+                <a:cs typeface="+mj-cs"/>
+              </a:defRPr>
+            </a:lvl1pPr>
+          </a:lstStyle>
+          <a:p>
+            <a:r>
+              <a:rPr lang="en-US" altLang="zh-CN" sz="2000" b="1">
+                <a:latin typeface="微软雅黑" panose="020B0503020204020204" pitchFamily="34" charset="-122"/>
+                <a:ea typeface="微软雅黑" panose="020B0503020204020204" pitchFamily="34" charset="-122"/>
+                <a:cs typeface="Times New Roman" panose="02020603050405020304" pitchFamily="18" charset="0"/>
+              </a:rPr>
+              <a:t>Qcr background</a:t>
+            </a:r>
+            <a:endParaRPr lang="zh-CN" altLang="en-US" sz="2000" b="1" dirty="0">
+              <a:latin typeface="微软雅黑" panose="020B0503020204020204" pitchFamily="34" charset="-122"/>
+              <a:ea typeface="微软雅黑" panose="020B0503020204020204" pitchFamily="34" charset="-122"/>
+              <a:cs typeface="Times New Roman" panose="02020603050405020304" pitchFamily="18" charset="0"/>
             </a:endParaRPr>
           </a:p>
         </p:txBody>
@@ -12753,7 +12787,7 @@
                     <a:latin typeface="微软雅黑" panose="020B0503020204020204" pitchFamily="34" charset="-122"/>
                     <a:ea typeface="微软雅黑" panose="020B0503020204020204" pitchFamily="34" charset="-122"/>
                   </a:rPr>
-                  <a:t>The events c0 and </a:t>
+                  <a:t>The events c1 and </a:t>
                 </a:r>
                 <a:r>
                   <a:rPr lang="en-US" altLang="zh-CN" sz="1400" dirty="0" err="1">
@@ -12859,7 +12893,7 @@
                     <a:latin typeface="微软雅黑" panose="020B0503020204020204" pitchFamily="34" charset="-122"/>
                     <a:ea typeface="微软雅黑" panose="020B0503020204020204" pitchFamily="34" charset="-122"/>
                   </a:rPr>
-                  <a:t>i.e., c0 and </a:t>
+                  <a:t>i.e., c1 and </a:t>
                 </a:r>
                 <a:r>
                   <a:rPr lang="en-US" altLang="zh-CN" sz="1400" dirty="0" err="1">
@@ -12889,7 +12923,7 @@
                     <a:latin typeface="微软雅黑" panose="020B0503020204020204" pitchFamily="34" charset="-122"/>
                     <a:ea typeface="微软雅黑" panose="020B0503020204020204" pitchFamily="34" charset="-122"/>
                   </a:rPr>
-                  <a:t>c0 is a periodic scheduling task </a:t>
+                  <a:t>c1 is a periodic scheduling task </a:t>
                 </a:r>
                 <a14:m>
                   <m:oMath xmlns:m="http://schemas.openxmlformats.org/officeDocument/2006/math">
@@ -13213,8 +13247,8 @@
           </a:p>
         </p:txBody>
       </p:sp>
-      <mc:AlternateContent xmlns:mc="http://schemas.openxmlformats.org/markup-compatibility/2006">
-        <mc:Choice xmlns:a14="http://schemas.microsoft.com/office/drawing/2010/main" Requires="a14">
+      <mc:AlternateContent xmlns:mc="http://schemas.openxmlformats.org/markup-compatibility/2006" xmlns:a14="http://schemas.microsoft.com/office/drawing/2010/main">
+        <mc:Choice Requires="a14">
           <p:sp>
             <p:nvSpPr>
               <p:cNvPr id="6" name="文本框 5">
@@ -13430,7 +13464,7 @@
             </p:txBody>
           </p:sp>
         </mc:Choice>
-        <mc:Fallback>
+        <mc:Fallback xmlns="">
           <p:sp>
             <p:nvSpPr>
               <p:cNvPr id="6" name="文本框 5">

</xml_diff>

<commit_message>
vault backup: 2024-04-24 19:55:22
</commit_message>
<xml_diff>
--- a/06-ppt/RTS-Turin-Class/0423.pptx
+++ b/06-ppt/RTS-Turin-Class/0423.pptx
@@ -212,7 +212,7 @@
           <a:p>
             <a:fld id="{BFB3BCA0-073B-4AA3-93D1-1E422E4EF703}" type="datetimeFigureOut">
               <a:rPr lang="zh-CN" altLang="en-US" smtClean="0"/>
-              <a:t>2024/4/23</a:t>
+              <a:t>2024/4/24</a:t>
             </a:fld>
             <a:endParaRPr lang="zh-CN" altLang="en-US"/>
           </a:p>
@@ -610,15 +610,19 @@
           <a:p>
             <a:r>
               <a:rPr lang="en-US" altLang="zh-CN" dirty="0"/>
-              <a:t>Now let's take the upper limit in two </a:t>
-            </a:r>
-            <a:r>
-              <a:rPr lang="en-US" altLang="zh-CN" dirty="0" err="1"/>
-              <a:t>parts.The</a:t>
-            </a:r>
+              <a:t>Now let's take the upper limit in two parts.</a:t>
+            </a:r>
+          </a:p>
+          <a:p>
             <a:r>
               <a:rPr lang="en-US" altLang="zh-CN" dirty="0"/>
-              <a:t> upper limit we can obtain from the first part is T. Event c0 captures external event z with a cycle of T, so it will be captured no later than one cycle T after the external event starts triggering at t (z).</a:t>
+              <a:t>The upper limit we can obtain from the first part is T. </a:t>
+            </a:r>
+          </a:p>
+          <a:p>
+            <a:r>
+              <a:rPr lang="en-US" altLang="zh-CN" dirty="0"/>
+              <a:t>Event c0 captures external event z with a cycle of T, so it will be captured no later than one cycle T after the external event starts triggering at t (z).</a:t>
             </a:r>
           </a:p>
           <a:p>
@@ -646,7 +650,35 @@
                 <a:ea typeface="宋体" panose="02010600030101010101" pitchFamily="2" charset="-122"/>
                 <a:cs typeface="Times New Roman" panose="02020603050405020304" pitchFamily="18" charset="0"/>
               </a:rPr>
-              <a:t>In the second part, we will calculate the upper bound for every two adjacent events. Firstly, we will use the symbol s to represent the state of the event, which is a scheduling task or network task.</a:t>
+              <a:t>In the second part, we will calculate the upper bound for every two adjacent events. </a:t>
+            </a:r>
+          </a:p>
+          <a:p>
+            <a:pPr marL="0" marR="0" lvl="0" indent="0" algn="l" defTabSz="914400" rtl="0" eaLnBrk="1" fontAlgn="auto" latinLnBrk="0" hangingPunct="1">
+              <a:lnSpc>
+                <a:spcPct val="100000"/>
+              </a:lnSpc>
+              <a:spcBef>
+                <a:spcPts val="0"/>
+              </a:spcBef>
+              <a:spcAft>
+                <a:spcPts val="0"/>
+              </a:spcAft>
+              <a:buClrTx/>
+              <a:buSzTx/>
+              <a:buFontTx/>
+              <a:buNone/>
+              <a:tabLst/>
+              <a:defRPr/>
+            </a:pPr>
+            <a:r>
+              <a:rPr lang="en-US" altLang="zh-CN" sz="1800" kern="100" dirty="0">
+                <a:effectLst/>
+                <a:latin typeface="Calibri" panose="020F0502020204030204" pitchFamily="34" charset="0"/>
+                <a:ea typeface="宋体" panose="02010600030101010101" pitchFamily="2" charset="-122"/>
+                <a:cs typeface="Times New Roman" panose="02020603050405020304" pitchFamily="18" charset="0"/>
+              </a:rPr>
+              <a:t>Firstly, we will use the symbol s to represent the state of the event, which is a scheduling task or network task.</a:t>
             </a:r>
           </a:p>
           <a:p>
@@ -742,7 +774,7 @@
           <a:p>
             <a:r>
               <a:rPr lang="en-US" altLang="zh-CN" dirty="0"/>
-              <a:t>Case 2, the second task is a network task. According to the token bucket algorithm, we can obtain the delay of data frames under ATS shaping. It has an impact on high priority H, low priority L, same priority j, and data frame length. Then we can obtain the upper bound D.</a:t>
+              <a:t>Case 2, the second task is a network task. we can obtain the delay of data frames under ATS shaping. It has an impact on high priority H, low priority L, same priority j, and data frame length li. Then we can obtain the upper bound D.</a:t>
             </a:r>
           </a:p>
           <a:p>
@@ -864,7 +896,7 @@
                 <a:ea typeface="宋体" panose="02010600030101010101" pitchFamily="2" charset="-122"/>
                 <a:cs typeface="Times New Roman" panose="02020603050405020304" pitchFamily="18" charset="0"/>
               </a:rPr>
-              <a:t>We can obtain the data age of the task chain and express it as the end time as follows</a:t>
+              <a:t>We can obtain the data age of the task chain</a:t>
             </a:r>
           </a:p>
           <a:p>
@@ -892,7 +924,35 @@
                 <a:ea typeface="宋体" panose="02010600030101010101" pitchFamily="2" charset="-122"/>
                 <a:cs typeface="Times New Roman" panose="02020603050405020304" pitchFamily="18" charset="0"/>
               </a:rPr>
-              <a:t>The incentivized action resulting from external event z occurs after the final result of the task chain is produced, at the release time of the next data processing task following the last task in the chain. According to the task model of this paper, the time of the incentivized action is the release time of the next task after the last task in the task chain, which is also the end time of the last task in the chain, because we are using an event-triggered method. Therefore, by definition, the data age of the task chain is D(C) = 36 - 6 = 30.</a:t>
+              <a:t>The incentivized action resulting from event z occurs after the final result of the task chain is produced, at the release time of the next data processing task following the last task in the chain. </a:t>
+            </a:r>
+          </a:p>
+          <a:p>
+            <a:pPr marL="0" marR="0" lvl="0" indent="0" algn="l" defTabSz="914400" rtl="0" eaLnBrk="1" fontAlgn="auto" latinLnBrk="0" hangingPunct="1">
+              <a:lnSpc>
+                <a:spcPct val="100000"/>
+              </a:lnSpc>
+              <a:spcBef>
+                <a:spcPts val="0"/>
+              </a:spcBef>
+              <a:spcAft>
+                <a:spcPts val="0"/>
+              </a:spcAft>
+              <a:buClrTx/>
+              <a:buSzTx/>
+              <a:buFontTx/>
+              <a:buNone/>
+              <a:tabLst/>
+              <a:defRPr/>
+            </a:pPr>
+            <a:r>
+              <a:rPr lang="en-US" altLang="zh-CN" sz="1200" kern="100" dirty="0">
+                <a:effectLst/>
+                <a:latin typeface="Calibri" panose="020F0502020204030204" pitchFamily="34" charset="0"/>
+                <a:ea typeface="宋体" panose="02010600030101010101" pitchFamily="2" charset="-122"/>
+                <a:cs typeface="Times New Roman" panose="02020603050405020304" pitchFamily="18" charset="0"/>
+              </a:rPr>
+              <a:t>According to the task model, the time of the incentivized action is the release time of the next task after the last task in the task chain, which is also the end time of the last task in the chain, because we are using an event-triggered method. Therefore, by definition, the data age of the task chain is D(C) = 36 - 6 = 30.</a:t>
             </a:r>
           </a:p>
           <a:p>
@@ -1336,7 +1396,7 @@
                 <a:ea typeface="宋体" panose="02010600030101010101" pitchFamily="2" charset="-122"/>
                 <a:cs typeface="Times New Roman" panose="02020603050405020304" pitchFamily="18" charset="0"/>
               </a:rPr>
-              <a:t>For instance, during automatic vehicle cruising, if the reaction time of the control unit exceeds 50 milliseconds, although it may still complete the deceleration control within the deadline, the delay in the control signal could result in a sudden deceleration and loss of vehicle stability. Moreover, the recency of data is essential for its timeliness, and in the context of autonomous driving systems, more up-to-date data can facilitate more precise decision-making.</a:t>
+              <a:t>For instance, during automatic vehicle, if the reaction time of the control unit exceeds 50 milliseconds, although it may still complete the control within the deadline, the delay in the control signal could result in a sudden deceleration. Moreover, the recency of data is essential, and in the context of autonomous driving systems, more up-to-date data can facilitate more precise decision-making.</a:t>
             </a:r>
           </a:p>
           <a:p>
@@ -1477,8 +1537,16 @@
           <a:p>
             <a:r>
               <a:rPr lang="en-US" altLang="zh-CN" dirty="0"/>
-              <a:t>There is a lot of classical work for the analysis of task chains. For example, summing each WCRT and cycle. </a:t>
-            </a:r>
+              <a:t>There is a lot of classical work for the analysis of task chains. </a:t>
+            </a:r>
+          </a:p>
+          <a:p>
+            <a:r>
+              <a:rPr lang="en-US" altLang="zh-CN" dirty="0"/>
+              <a:t>For example, summing each WCRT and cycle. </a:t>
+            </a:r>
+          </a:p>
+          <a:p>
             <a:r>
               <a:rPr lang="en-US" altLang="zh-CN" dirty="0" err="1"/>
               <a:t>Analyse</a:t>
@@ -1493,7 +1561,13 @@
             </a:r>
             <a:r>
               <a:rPr lang="en-US" altLang="zh-CN" dirty="0"/>
-              <a:t> joint task chains by cutting theorems. However, most of the existing analyses are based on the CAN bus connecting the ECUs. The amount of data transfer is proliferating and the CAN bus cannot better meet the requirements of some embedded real-time systems.</a:t>
+              <a:t> joint task chains by cutting model. However, most of the existing analyses are based on the CAN bus connecting the ECUs. </a:t>
+            </a:r>
+          </a:p>
+          <a:p>
+            <a:r>
+              <a:rPr lang="en-US" altLang="zh-CN" dirty="0"/>
+              <a:t>The amount of data transfer is proliferating and the CAN bus cannot better meet the requirements of some embedded real-time systems.</a:t>
             </a:r>
             <a:endParaRPr lang="zh-CN" altLang="en-US" dirty="0"/>
           </a:p>
@@ -1906,41 +1980,6 @@
           <a:bodyPr/>
           <a:lstStyle/>
           <a:p>
-            <a:pPr marL="0" marR="0" algn="just">
-              <a:spcBef>
-                <a:spcPts val="0"/>
-              </a:spcBef>
-              <a:spcAft>
-                <a:spcPts val="0"/>
-              </a:spcAft>
-            </a:pPr>
-            <a:r>
-              <a:rPr lang="en-US" altLang="zh-CN" sz="1800" kern="100" dirty="0">
-                <a:effectLst/>
-                <a:latin typeface="Calibri" panose="020F0502020204030204" pitchFamily="34" charset="0"/>
-                <a:ea typeface="宋体" panose="02010600030101010101" pitchFamily="2" charset="-122"/>
-                <a:cs typeface="Times New Roman" panose="02020603050405020304" pitchFamily="18" charset="0"/>
-              </a:rPr>
-              <a:t>The task chain is composed of scheduling tasks τ and network task m. All tasks have a buffer for data read and write. The first and last tasks in the task chain can only be scheduling tasks, they are on the ECU. The first task is periodically released, capturing z. Tasks on two different ECUs require network task connection.</a:t>
-            </a:r>
-          </a:p>
-          <a:p>
-            <a:pPr marL="0" marR="0" algn="just">
-              <a:spcBef>
-                <a:spcPts val="0"/>
-              </a:spcBef>
-              <a:spcAft>
-                <a:spcPts val="0"/>
-              </a:spcAft>
-            </a:pPr>
-            <a:endParaRPr lang="en-US" altLang="zh-CN" sz="1800" kern="100" dirty="0">
-              <a:effectLst/>
-              <a:latin typeface="Calibri" panose="020F0502020204030204" pitchFamily="34" charset="0"/>
-              <a:ea typeface="宋体" panose="02010600030101010101" pitchFamily="2" charset="-122"/>
-              <a:cs typeface="Times New Roman" panose="02020603050405020304" pitchFamily="18" charset="0"/>
-            </a:endParaRPr>
-          </a:p>
-          <a:p>
             <a:pPr marL="0" marR="0" lvl="0" indent="0" algn="l" defTabSz="914400" rtl="0" eaLnBrk="1" fontAlgn="auto" latinLnBrk="0" hangingPunct="1">
               <a:lnSpc>
                 <a:spcPct val="100000"/>
@@ -1965,7 +2004,7 @@
                 <a:ea typeface="宋体" panose="02010600030101010101" pitchFamily="2" charset="-122"/>
                 <a:cs typeface="Times New Roman" panose="02020603050405020304" pitchFamily="18" charset="0"/>
               </a:rPr>
-              <a:t>As shown in the figure. At the time t=4, an event data is written into the input buffer B_0 of task J_0^2. At time t=6, the sampling task J_0^2 captures the event. At t=10, the scheduling task J_0^2 on ECU1 finishes processing the data and writes the updated data into the input buffer B_1. When task J_1^1 ends, the resulting output begins to be transmitted over the network to ECU2. </a:t>
+              <a:t>As shown in the figure. At the time 4, an event data is written into the buffer B0. At time 6, the sampling task J02 captures the event. At 10, the scheduling task finish processing the data and writes the new data into buffer B1. When task J11 ends, the resulting output begins to be transmitted over the network to ECU2. </a:t>
             </a:r>
           </a:p>
           <a:p>
@@ -1993,7 +2032,35 @@
                 <a:ea typeface="宋体" panose="02010600030101010101" pitchFamily="2" charset="-122"/>
                 <a:cs typeface="Times New Roman" panose="02020603050405020304" pitchFamily="18" charset="0"/>
               </a:rPr>
-              <a:t>The data frame is enqueued at time t=17, shaped by the ATS algorithm, and by time t=21, the entire data frame has finished processing at switch 1. Similarly, at time t=32, the data frame is transmitted from switch 2 to ECU2. Finally, at time t=36, the final data result is produced. </a:t>
+              <a:t>The data frame is enqueued at time 17, shaped by the ATS algorithm, and time 21, the data frame has finished processing at switch 1. </a:t>
+            </a:r>
+          </a:p>
+          <a:p>
+            <a:pPr marL="0" marR="0" lvl="0" indent="0" algn="l" defTabSz="914400" rtl="0" eaLnBrk="1" fontAlgn="auto" latinLnBrk="0" hangingPunct="1">
+              <a:lnSpc>
+                <a:spcPct val="100000"/>
+              </a:lnSpc>
+              <a:spcBef>
+                <a:spcPts val="0"/>
+              </a:spcBef>
+              <a:spcAft>
+                <a:spcPts val="0"/>
+              </a:spcAft>
+              <a:buClrTx/>
+              <a:buSzTx/>
+              <a:buFontTx/>
+              <a:buNone/>
+              <a:tabLst/>
+              <a:defRPr/>
+            </a:pPr>
+            <a:r>
+              <a:rPr lang="en-US" altLang="zh-CN" sz="1800" kern="100" dirty="0">
+                <a:effectLst/>
+                <a:latin typeface="Calibri" panose="020F0502020204030204" pitchFamily="34" charset="0"/>
+                <a:ea typeface="宋体" panose="02010600030101010101" pitchFamily="2" charset="-122"/>
+                <a:cs typeface="Times New Roman" panose="02020603050405020304" pitchFamily="18" charset="0"/>
+              </a:rPr>
+              <a:t>at time 32, the data frame is transmitted from switch 2 to ECU2. Finally, at time 36, the final data result is produced. </a:t>
             </a:r>
           </a:p>
           <a:p>
@@ -2122,20 +2189,8 @@
             </a:pPr>
             <a:r>
               <a:rPr lang="en-US" altLang="zh-CN" dirty="0"/>
-              <a:t>We have defined the end time of the event. The end times for scheduling tasks, network tasks, and external events are represented as follows. </a:t>
-            </a:r>
-            <a:r>
-              <a:rPr lang="en-US" altLang="zh-CN" sz="1800" kern="100" dirty="0">
-                <a:effectLst/>
-                <a:latin typeface="Calibri" panose="020F0502020204030204" pitchFamily="34" charset="0"/>
-                <a:ea typeface="宋体" panose="02010600030101010101" pitchFamily="2" charset="-122"/>
-                <a:cs typeface="Times New Roman" panose="02020603050405020304" pitchFamily="18" charset="0"/>
-              </a:rPr>
-              <a:t>We can obtain the reaction time of the task chain and express it as the end time as follows</a:t>
-            </a:r>
-          </a:p>
-          <a:p>
-            <a:endParaRPr lang="en-US" altLang="zh-CN" dirty="0"/>
+              <a:t>We have defined the end time of the event. The end times for scheduling tasks, network tasks, and external events are represented as follows.</a:t>
+            </a:r>
           </a:p>
           <a:p>
             <a:endParaRPr lang="zh-CN" altLang="en-US" dirty="0"/>
@@ -2246,10 +2301,8 @@
                 <a:ea typeface="宋体" panose="02010600030101010101" pitchFamily="2" charset="-122"/>
                 <a:cs typeface="Times New Roman" panose="02020603050405020304" pitchFamily="18" charset="0"/>
               </a:rPr>
-              <a:t>We can obtain the reaction time of the task chain and express it as the end time as follows</a:t>
-            </a:r>
-          </a:p>
-          <a:p>
+              <a:t>We can obtain the reaction time of the task chain</a:t>
+            </a:r>
             <a:endParaRPr lang="en-US" altLang="zh-CN" dirty="0"/>
           </a:p>
           <a:p>
@@ -2466,7 +2519,7 @@
           <a:p>
             <a:fld id="{47574B27-0941-438E-852F-CBC446AABACC}" type="datetimeFigureOut">
               <a:rPr lang="zh-CN" altLang="en-US" smtClean="0"/>
-              <a:t>2024/4/23</a:t>
+              <a:t>2024/4/24</a:t>
             </a:fld>
             <a:endParaRPr lang="zh-CN" altLang="en-US"/>
           </a:p>
@@ -2664,7 +2717,7 @@
           <a:p>
             <a:fld id="{47574B27-0941-438E-852F-CBC446AABACC}" type="datetimeFigureOut">
               <a:rPr lang="zh-CN" altLang="en-US" smtClean="0"/>
-              <a:t>2024/4/23</a:t>
+              <a:t>2024/4/24</a:t>
             </a:fld>
             <a:endParaRPr lang="zh-CN" altLang="en-US"/>
           </a:p>
@@ -2872,7 +2925,7 @@
           <a:p>
             <a:fld id="{47574B27-0941-438E-852F-CBC446AABACC}" type="datetimeFigureOut">
               <a:rPr lang="zh-CN" altLang="en-US" smtClean="0"/>
-              <a:t>2024/4/23</a:t>
+              <a:t>2024/4/24</a:t>
             </a:fld>
             <a:endParaRPr lang="zh-CN" altLang="en-US"/>
           </a:p>
@@ -3070,7 +3123,7 @@
           <a:p>
             <a:fld id="{47574B27-0941-438E-852F-CBC446AABACC}" type="datetimeFigureOut">
               <a:rPr lang="zh-CN" altLang="en-US" smtClean="0"/>
-              <a:t>2024/4/23</a:t>
+              <a:t>2024/4/24</a:t>
             </a:fld>
             <a:endParaRPr lang="zh-CN" altLang="en-US"/>
           </a:p>
@@ -3345,7 +3398,7 @@
           <a:p>
             <a:fld id="{47574B27-0941-438E-852F-CBC446AABACC}" type="datetimeFigureOut">
               <a:rPr lang="zh-CN" altLang="en-US" smtClean="0"/>
-              <a:t>2024/4/23</a:t>
+              <a:t>2024/4/24</a:t>
             </a:fld>
             <a:endParaRPr lang="zh-CN" altLang="en-US"/>
           </a:p>
@@ -3610,7 +3663,7 @@
           <a:p>
             <a:fld id="{47574B27-0941-438E-852F-CBC446AABACC}" type="datetimeFigureOut">
               <a:rPr lang="zh-CN" altLang="en-US" smtClean="0"/>
-              <a:t>2024/4/23</a:t>
+              <a:t>2024/4/24</a:t>
             </a:fld>
             <a:endParaRPr lang="zh-CN" altLang="en-US"/>
           </a:p>
@@ -4022,7 +4075,7 @@
           <a:p>
             <a:fld id="{47574B27-0941-438E-852F-CBC446AABACC}" type="datetimeFigureOut">
               <a:rPr lang="zh-CN" altLang="en-US" smtClean="0"/>
-              <a:t>2024/4/23</a:t>
+              <a:t>2024/4/24</a:t>
             </a:fld>
             <a:endParaRPr lang="zh-CN" altLang="en-US"/>
           </a:p>
@@ -4163,7 +4216,7 @@
           <a:p>
             <a:fld id="{47574B27-0941-438E-852F-CBC446AABACC}" type="datetimeFigureOut">
               <a:rPr lang="zh-CN" altLang="en-US" smtClean="0"/>
-              <a:t>2024/4/23</a:t>
+              <a:t>2024/4/24</a:t>
             </a:fld>
             <a:endParaRPr lang="zh-CN" altLang="en-US"/>
           </a:p>
@@ -4276,7 +4329,7 @@
           <a:p>
             <a:fld id="{47574B27-0941-438E-852F-CBC446AABACC}" type="datetimeFigureOut">
               <a:rPr lang="zh-CN" altLang="en-US" smtClean="0"/>
-              <a:t>2024/4/23</a:t>
+              <a:t>2024/4/24</a:t>
             </a:fld>
             <a:endParaRPr lang="zh-CN" altLang="en-US"/>
           </a:p>
@@ -4587,7 +4640,7 @@
           <a:p>
             <a:fld id="{47574B27-0941-438E-852F-CBC446AABACC}" type="datetimeFigureOut">
               <a:rPr lang="zh-CN" altLang="en-US" smtClean="0"/>
-              <a:t>2024/4/23</a:t>
+              <a:t>2024/4/24</a:t>
             </a:fld>
             <a:endParaRPr lang="zh-CN" altLang="en-US"/>
           </a:p>
@@ -4875,7 +4928,7 @@
           <a:p>
             <a:fld id="{47574B27-0941-438E-852F-CBC446AABACC}" type="datetimeFigureOut">
               <a:rPr lang="zh-CN" altLang="en-US" smtClean="0"/>
-              <a:t>2024/4/23</a:t>
+              <a:t>2024/4/24</a:t>
             </a:fld>
             <a:endParaRPr lang="zh-CN" altLang="en-US"/>
           </a:p>
@@ -5116,7 +5169,7 @@
           <a:p>
             <a:fld id="{47574B27-0941-438E-852F-CBC446AABACC}" type="datetimeFigureOut">
               <a:rPr lang="zh-CN" altLang="en-US" smtClean="0"/>
-              <a:t>2024/4/23</a:t>
+              <a:t>2024/4/24</a:t>
             </a:fld>
             <a:endParaRPr lang="zh-CN" altLang="en-US"/>
           </a:p>
@@ -5969,14 +6022,14 @@
                 <a:latin typeface="微软雅黑" panose="020B0503020204020204" pitchFamily="34" charset="-122"/>
                 <a:ea typeface="微软雅黑" panose="020B0503020204020204" pitchFamily="34" charset="-122"/>
               </a:rPr>
-              <a:t>𝑓 </a:t>
+              <a:t> </a:t>
             </a:r>
             <a:r>
               <a:rPr lang="en-US" altLang="zh-CN" sz="1600" dirty="0">
                 <a:latin typeface="微软雅黑" panose="020B0503020204020204" pitchFamily="34" charset="-122"/>
                 <a:ea typeface="微软雅黑" panose="020B0503020204020204" pitchFamily="34" charset="-122"/>
               </a:rPr>
-              <a:t>(</a:t>
+              <a:t>t(</a:t>
             </a:r>
             <a:r>
               <a:rPr lang="zh-CN" altLang="en-US" sz="1600" dirty="0">
@@ -5990,14 +6043,14 @@
                 <a:latin typeface="微软雅黑" panose="020B0503020204020204" pitchFamily="34" charset="-122"/>
                 <a:ea typeface="微软雅黑" panose="020B0503020204020204" pitchFamily="34" charset="-122"/>
               </a:rPr>
-              <a:t>0) − </a:t>
+              <a:t>0) − t</a:t>
             </a:r>
             <a:r>
               <a:rPr lang="zh-CN" altLang="en-US" sz="1600" dirty="0">
                 <a:latin typeface="微软雅黑" panose="020B0503020204020204" pitchFamily="34" charset="-122"/>
                 <a:ea typeface="微软雅黑" panose="020B0503020204020204" pitchFamily="34" charset="-122"/>
               </a:rPr>
-              <a:t>𝑡 </a:t>
+              <a:t> </a:t>
             </a:r>
             <a:r>
               <a:rPr lang="en-US" altLang="zh-CN" sz="1600" dirty="0">
@@ -6190,7 +6243,49 @@
                 <a:latin typeface="微软雅黑" panose="020B0503020204020204" pitchFamily="34" charset="-122"/>
                 <a:ea typeface="微软雅黑" panose="020B0503020204020204" pitchFamily="34" charset="-122"/>
               </a:rPr>
-              <a:t> the status of each event in the task chain 𝐶 = {𝑧, 𝑐0, 𝑐1, 𝑐2, ..., 𝑐𝑛 }, i.e., for any event 𝑐𝑖 </a:t>
+              <a:t> the status of each event in the task chain 𝐶 = {𝑧, 𝑐</a:t>
+            </a:r>
+            <a:r>
+              <a:rPr lang="en-US" altLang="zh-CN" sz="1600" dirty="0">
+                <a:latin typeface="微软雅黑" panose="020B0503020204020204" pitchFamily="34" charset="-122"/>
+                <a:ea typeface="微软雅黑" panose="020B0503020204020204" pitchFamily="34" charset="-122"/>
+              </a:rPr>
+              <a:t>1</a:t>
+            </a:r>
+            <a:r>
+              <a:rPr lang="zh-CN" altLang="en-US" sz="1600" dirty="0">
+                <a:latin typeface="微软雅黑" panose="020B0503020204020204" pitchFamily="34" charset="-122"/>
+                <a:ea typeface="微软雅黑" panose="020B0503020204020204" pitchFamily="34" charset="-122"/>
+              </a:rPr>
+              <a:t>, 𝑐</a:t>
+            </a:r>
+            <a:r>
+              <a:rPr lang="en-US" altLang="zh-CN" sz="1600" dirty="0">
+                <a:latin typeface="微软雅黑" panose="020B0503020204020204" pitchFamily="34" charset="-122"/>
+                <a:ea typeface="微软雅黑" panose="020B0503020204020204" pitchFamily="34" charset="-122"/>
+              </a:rPr>
+              <a:t>2</a:t>
+            </a:r>
+            <a:r>
+              <a:rPr lang="zh-CN" altLang="en-US" sz="1600" dirty="0">
+                <a:latin typeface="微软雅黑" panose="020B0503020204020204" pitchFamily="34" charset="-122"/>
+                <a:ea typeface="微软雅黑" panose="020B0503020204020204" pitchFamily="34" charset="-122"/>
+              </a:rPr>
+              <a:t>, 𝑐</a:t>
+            </a:r>
+            <a:r>
+              <a:rPr lang="en-US" altLang="zh-CN" sz="1600" dirty="0">
+                <a:latin typeface="微软雅黑" panose="020B0503020204020204" pitchFamily="34" charset="-122"/>
+                <a:ea typeface="微软雅黑" panose="020B0503020204020204" pitchFamily="34" charset="-122"/>
+              </a:rPr>
+              <a:t>3</a:t>
+            </a:r>
+            <a:r>
+              <a:rPr lang="zh-CN" altLang="en-US" sz="1600" dirty="0">
+                <a:latin typeface="微软雅黑" panose="020B0503020204020204" pitchFamily="34" charset="-122"/>
+                <a:ea typeface="微软雅黑" panose="020B0503020204020204" pitchFamily="34" charset="-122"/>
+              </a:rPr>
+              <a:t>, ..., 𝑐𝑛 }, i.e., for any event 𝑐𝑖 </a:t>
             </a:r>
             <a:endParaRPr lang="en-US" altLang="zh-CN" sz="1600" dirty="0">
               <a:latin typeface="微软雅黑" panose="020B0503020204020204" pitchFamily="34" charset="-122"/>
@@ -10480,7 +10575,7 @@
                 <a:ea typeface="微软雅黑" panose="020B0503020204020204" pitchFamily="34" charset="-122"/>
                 <a:sym typeface="+mn-ea"/>
               </a:rPr>
-              <a:t>Not only do real-time constraints need to be met, end-to-end timing also needs to be limited to avoid affecting the results.</a:t>
+              <a:t>Not only real-time constraints need to be met, end-to-end timing also needs to be limited to avoid affecting the results.</a:t>
             </a:r>
           </a:p>
           <a:p>
@@ -11766,7 +11861,7 @@
         <p:spPr>
           <a:xfrm>
             <a:off x="0" y="3676730"/>
-            <a:ext cx="10658893" cy="2264851"/>
+            <a:ext cx="10658893" cy="1895519"/>
           </a:xfrm>
           <a:prstGeom prst="rect">
             <a:avLst/>
@@ -11819,7 +11914,7 @@
                 <a:latin typeface="微软雅黑" panose="020B0503020204020204" pitchFamily="34" charset="-122"/>
                 <a:ea typeface="微软雅黑" panose="020B0503020204020204" pitchFamily="34" charset="-122"/>
               </a:rPr>
-              <a:t>Although LRQ and TBE are both asynchronous shaping algorithms suitable for TSN, </a:t>
+              <a:t>LRQ mainly shapes sudden traffic into stable output through “transmission/leakage” rate shaping; </a:t>
             </a:r>
           </a:p>
           <a:p>
@@ -11835,23 +11930,7 @@
                 <a:latin typeface="微软雅黑" panose="020B0503020204020204" pitchFamily="34" charset="-122"/>
                 <a:ea typeface="微软雅黑" panose="020B0503020204020204" pitchFamily="34" charset="-122"/>
               </a:rPr>
-              <a:t>LRQ mainly shapes sudden traffic into stable output through transmission/leakage rate shaping; </a:t>
-            </a:r>
-          </a:p>
-          <a:p>
-            <a:pPr marL="285750" indent="-285750">
-              <a:lnSpc>
-                <a:spcPct val="150000"/>
-              </a:lnSpc>
-              <a:buFont typeface="Arial" panose="020B0604020202020204" pitchFamily="34" charset="0"/>
-              <a:buChar char="•"/>
-            </a:pPr>
-            <a:r>
-              <a:rPr lang="en-US" altLang="zh-CN" sz="1600" dirty="0">
-                <a:latin typeface="微软雅黑" panose="020B0503020204020204" pitchFamily="34" charset="-122"/>
-                <a:ea typeface="微软雅黑" panose="020B0503020204020204" pitchFamily="34" charset="-122"/>
-              </a:rPr>
-              <a:t>TBE controls the data flow through the average rate, and the number of tokens in the bucket meets Ready to transfer.</a:t>
+              <a:t>TBE controls the data flow through the average rate, and the number of tokens in the bucket meets ready to transfer.</a:t>
             </a:r>
             <a:endParaRPr lang="zh-CN" altLang="en-US" sz="1600" dirty="0">
               <a:latin typeface="微软雅黑" panose="020B0503020204020204" pitchFamily="34" charset="-122"/>
@@ -12376,19 +12455,8 @@
                 <a:latin typeface="微软雅黑" panose="020B0503020204020204" pitchFamily="34" charset="-122"/>
                 <a:ea typeface="微软雅黑" panose="020B0503020204020204" pitchFamily="34" charset="-122"/>
               </a:rPr>
-              <a:t>Implicit </a:t>
-            </a:r>
-            <a:r>
-              <a:rPr lang="en-US" altLang="zh-CN" sz="1600" dirty="0" err="1">
-                <a:latin typeface="微软雅黑" panose="020B0503020204020204" pitchFamily="34" charset="-122"/>
-                <a:ea typeface="微软雅黑" panose="020B0503020204020204" pitchFamily="34" charset="-122"/>
-              </a:rPr>
-              <a:t>communicatio</a:t>
-            </a:r>
-            <a:endParaRPr lang="en-US" altLang="zh-CN" sz="1600" dirty="0">
-              <a:latin typeface="微软雅黑" panose="020B0503020204020204" pitchFamily="34" charset="-122"/>
-              <a:ea typeface="微软雅黑" panose="020B0503020204020204" pitchFamily="34" charset="-122"/>
-            </a:endParaRPr>
+              <a:t>Implicit communication</a:t>
+            </a:r>
           </a:p>
         </p:txBody>
       </p:sp>
@@ -12720,7 +12788,7 @@
             <p:spPr>
               <a:xfrm>
                 <a:off x="60512" y="1787917"/>
-                <a:ext cx="7127097" cy="4578561"/>
+                <a:ext cx="7127097" cy="3660682"/>
               </a:xfrm>
               <a:prstGeom prst="rect">
                 <a:avLst/>
@@ -12739,7 +12807,7 @@
                   </a:lnSpc>
                 </a:pPr>
                 <a:r>
-                  <a:rPr lang="en-US" altLang="zh-CN" sz="1400" dirty="0">
+                  <a:rPr lang="en-US" altLang="zh-CN" sz="1200" dirty="0">
                     <a:latin typeface="微软雅黑" panose="020B0503020204020204" pitchFamily="34" charset="-122"/>
                     <a:ea typeface="微软雅黑" panose="020B0503020204020204" pitchFamily="34" charset="-122"/>
                   </a:rPr>
@@ -12753,21 +12821,21 @@
                   </a:lnSpc>
                 </a:pPr>
                 <a:r>
-                  <a:rPr lang="en-US" altLang="zh-CN" sz="1400" dirty="0">
+                  <a:rPr lang="en-US" altLang="zh-CN" sz="1200" dirty="0">
                     <a:latin typeface="微软雅黑" panose="020B0503020204020204" pitchFamily="34" charset="-122"/>
                     <a:ea typeface="微软雅黑" panose="020B0503020204020204" pitchFamily="34" charset="-122"/>
                   </a:rPr>
                   <a:t>a task chain C = {z, c1, c2, c3, ... , </a:t>
                 </a:r>
                 <a:r>
-                  <a:rPr lang="en-US" altLang="zh-CN" sz="1400" dirty="0" err="1">
+                  <a:rPr lang="en-US" altLang="zh-CN" sz="1200" dirty="0" err="1">
                     <a:latin typeface="微软雅黑" panose="020B0503020204020204" pitchFamily="34" charset="-122"/>
                     <a:ea typeface="微软雅黑" panose="020B0503020204020204" pitchFamily="34" charset="-122"/>
                   </a:rPr>
                   <a:t>cn</a:t>
                 </a:r>
                 <a:r>
-                  <a:rPr lang="en-US" altLang="zh-CN" sz="1400" dirty="0">
+                  <a:rPr lang="en-US" altLang="zh-CN" sz="1200" dirty="0">
                     <a:latin typeface="微软雅黑" panose="020B0503020204020204" pitchFamily="34" charset="-122"/>
                     <a:ea typeface="微软雅黑" panose="020B0503020204020204" pitchFamily="34" charset="-122"/>
                   </a:rPr>
@@ -12783,21 +12851,21 @@
                   <a:buChar char="•"/>
                 </a:pPr>
                 <a:r>
-                  <a:rPr lang="en-US" altLang="zh-CN" sz="1400" dirty="0">
+                  <a:rPr lang="en-US" altLang="zh-CN" sz="1200" dirty="0">
                     <a:latin typeface="微软雅黑" panose="020B0503020204020204" pitchFamily="34" charset="-122"/>
                     <a:ea typeface="微软雅黑" panose="020B0503020204020204" pitchFamily="34" charset="-122"/>
                   </a:rPr>
                   <a:t>The events c1 and </a:t>
                 </a:r>
                 <a:r>
-                  <a:rPr lang="en-US" altLang="zh-CN" sz="1400" dirty="0" err="1">
+                  <a:rPr lang="en-US" altLang="zh-CN" sz="1200" dirty="0" err="1">
                     <a:latin typeface="微软雅黑" panose="020B0503020204020204" pitchFamily="34" charset="-122"/>
                     <a:ea typeface="微软雅黑" panose="020B0503020204020204" pitchFamily="34" charset="-122"/>
                   </a:rPr>
                   <a:t>cn</a:t>
                 </a:r>
                 <a:r>
-                  <a:rPr lang="en-US" altLang="zh-CN" sz="1400" dirty="0">
+                  <a:rPr lang="en-US" altLang="zh-CN" sz="1200" dirty="0">
                     <a:latin typeface="微软雅黑" panose="020B0503020204020204" pitchFamily="34" charset="-122"/>
                     <a:ea typeface="微软雅黑" panose="020B0503020204020204" pitchFamily="34" charset="-122"/>
                   </a:rPr>
@@ -12808,7 +12876,7 @@
                     <m:sSub>
                       <m:sSubPr>
                         <m:ctrlPr>
-                          <a:rPr lang="en-US" altLang="zh-CN" sz="1400" i="1" smtClean="0">
+                          <a:rPr lang="en-US" altLang="zh-CN" sz="1200" i="1" smtClean="0">
                             <a:latin typeface="Cambria Math" panose="02040503050406030204" pitchFamily="18" charset="0"/>
                             <a:ea typeface="微软雅黑" panose="020B0503020204020204" pitchFamily="34" charset="-122"/>
                           </a:rPr>
@@ -12816,7 +12884,7 @@
                       </m:sSubPr>
                       <m:e>
                         <m:r>
-                          <a:rPr lang="zh-CN" altLang="en-US" sz="1400" i="1" smtClean="0">
+                          <a:rPr lang="zh-CN" altLang="en-US" sz="1200" i="1" smtClean="0">
                             <a:latin typeface="Cambria Math" panose="02040503050406030204" pitchFamily="18" charset="0"/>
                             <a:ea typeface="微软雅黑" panose="020B0503020204020204" pitchFamily="34" charset="-122"/>
                           </a:rPr>
@@ -12825,7 +12893,7 @@
                       </m:e>
                       <m:sub>
                         <m:r>
-                          <a:rPr lang="en-US" altLang="zh-CN" sz="1400" b="0" i="1" smtClean="0">
+                          <a:rPr lang="en-US" altLang="zh-CN" sz="1200" b="0" i="1" smtClean="0">
                             <a:latin typeface="Cambria Math" panose="02040503050406030204" pitchFamily="18" charset="0"/>
                             <a:ea typeface="微软雅黑" panose="020B0503020204020204" pitchFamily="34" charset="-122"/>
                           </a:rPr>
@@ -12836,7 +12904,7 @@
                   </m:oMath>
                 </a14:m>
                 <a:r>
-                  <a:rPr lang="en-US" altLang="zh-CN" sz="1400" dirty="0">
+                  <a:rPr lang="en-US" altLang="zh-CN" sz="1200" dirty="0">
                     <a:latin typeface="微软雅黑" panose="020B0503020204020204" pitchFamily="34" charset="-122"/>
                     <a:ea typeface="微软雅黑" panose="020B0503020204020204" pitchFamily="34" charset="-122"/>
                   </a:rPr>
@@ -12847,7 +12915,7 @@
                     <m:sSub>
                       <m:sSubPr>
                         <m:ctrlPr>
-                          <a:rPr lang="en-US" altLang="zh-CN" sz="1400" i="1" smtClean="0">
+                          <a:rPr lang="en-US" altLang="zh-CN" sz="1200" i="1" smtClean="0">
                             <a:latin typeface="Cambria Math" panose="02040503050406030204" pitchFamily="18" charset="0"/>
                             <a:ea typeface="微软雅黑" panose="020B0503020204020204" pitchFamily="34" charset="-122"/>
                           </a:rPr>
@@ -12855,7 +12923,7 @@
                       </m:sSubPr>
                       <m:e>
                         <m:r>
-                          <a:rPr lang="zh-CN" altLang="en-US" sz="1400" i="1">
+                          <a:rPr lang="zh-CN" altLang="en-US" sz="1200" i="1">
                             <a:latin typeface="Cambria Math" panose="02040503050406030204" pitchFamily="18" charset="0"/>
                             <a:ea typeface="微软雅黑" panose="020B0503020204020204" pitchFamily="34" charset="-122"/>
                           </a:rPr>
@@ -12864,7 +12932,7 @@
                       </m:e>
                       <m:sub>
                         <m:r>
-                          <a:rPr lang="en-US" altLang="zh-CN" sz="1400" b="0" i="1" smtClean="0">
+                          <a:rPr lang="en-US" altLang="zh-CN" sz="1200" b="0" i="1" smtClean="0">
                             <a:latin typeface="Cambria Math" panose="02040503050406030204" pitchFamily="18" charset="0"/>
                             <a:ea typeface="微软雅黑" panose="020B0503020204020204" pitchFamily="34" charset="-122"/>
                           </a:rPr>
@@ -12873,7 +12941,7 @@
                       </m:sub>
                     </m:sSub>
                     <m:r>
-                      <a:rPr lang="en-US" altLang="zh-CN" sz="1400" i="1">
+                      <a:rPr lang="en-US" altLang="zh-CN" sz="1200" i="1">
                         <a:latin typeface="Cambria Math" panose="02040503050406030204" pitchFamily="18" charset="0"/>
                         <a:ea typeface="微软雅黑" panose="020B0503020204020204" pitchFamily="34" charset="-122"/>
                       </a:rPr>
@@ -12882,28 +12950,28 @@
                   </m:oMath>
                 </a14:m>
                 <a:r>
-                  <a:rPr lang="zh-CN" altLang="en-US" sz="1400" dirty="0">
+                  <a:rPr lang="zh-CN" altLang="en-US" sz="1200" dirty="0">
                     <a:latin typeface="微软雅黑" panose="020B0503020204020204" pitchFamily="34" charset="-122"/>
                     <a:ea typeface="微软雅黑" panose="020B0503020204020204" pitchFamily="34" charset="-122"/>
                   </a:rPr>
                   <a:t>，</a:t>
                 </a:r>
                 <a:r>
-                  <a:rPr lang="en-US" altLang="zh-CN" sz="1400" dirty="0">
+                  <a:rPr lang="en-US" altLang="zh-CN" sz="1200" dirty="0">
                     <a:latin typeface="微软雅黑" panose="020B0503020204020204" pitchFamily="34" charset="-122"/>
                     <a:ea typeface="微软雅黑" panose="020B0503020204020204" pitchFamily="34" charset="-122"/>
                   </a:rPr>
                   <a:t>i.e., c1 and </a:t>
                 </a:r>
                 <a:r>
-                  <a:rPr lang="en-US" altLang="zh-CN" sz="1400" dirty="0" err="1">
+                  <a:rPr lang="en-US" altLang="zh-CN" sz="1200" dirty="0" err="1">
                     <a:latin typeface="微软雅黑" panose="020B0503020204020204" pitchFamily="34" charset="-122"/>
                     <a:ea typeface="微软雅黑" panose="020B0503020204020204" pitchFamily="34" charset="-122"/>
                   </a:rPr>
                   <a:t>cn</a:t>
                 </a:r>
                 <a:r>
-                  <a:rPr lang="en-US" altLang="zh-CN" sz="1400" dirty="0">
+                  <a:rPr lang="en-US" altLang="zh-CN" sz="1200" dirty="0">
                     <a:latin typeface="微软雅黑" panose="020B0503020204020204" pitchFamily="34" charset="-122"/>
                     <a:ea typeface="微软雅黑" panose="020B0503020204020204" pitchFamily="34" charset="-122"/>
                   </a:rPr>
@@ -12919,7 +12987,7 @@
                   <a:buChar char="•"/>
                 </a:pPr>
                 <a:r>
-                  <a:rPr lang="en-US" altLang="zh-CN" sz="1400" dirty="0">
+                  <a:rPr lang="en-US" altLang="zh-CN" sz="1200" dirty="0">
                     <a:latin typeface="微软雅黑" panose="020B0503020204020204" pitchFamily="34" charset="-122"/>
                     <a:ea typeface="微软雅黑" panose="020B0503020204020204" pitchFamily="34" charset="-122"/>
                   </a:rPr>
@@ -12930,7 +12998,7 @@
                     <m:sSub>
                       <m:sSubPr>
                         <m:ctrlPr>
-                          <a:rPr lang="en-US" altLang="zh-CN" sz="1400" i="1" smtClean="0">
+                          <a:rPr lang="en-US" altLang="zh-CN" sz="1200" i="1" smtClean="0">
                             <a:latin typeface="Cambria Math" panose="02040503050406030204" pitchFamily="18" charset="0"/>
                             <a:ea typeface="微软雅黑" panose="020B0503020204020204" pitchFamily="34" charset="-122"/>
                           </a:rPr>
@@ -12938,7 +13006,7 @@
                       </m:sSubPr>
                       <m:e>
                         <m:r>
-                          <a:rPr lang="zh-CN" altLang="en-US" sz="1400" i="1" smtClean="0">
+                          <a:rPr lang="zh-CN" altLang="en-US" sz="1200" i="1" smtClean="0">
                             <a:latin typeface="Cambria Math" panose="02040503050406030204" pitchFamily="18" charset="0"/>
                             <a:ea typeface="微软雅黑" panose="020B0503020204020204" pitchFamily="34" charset="-122"/>
                           </a:rPr>
@@ -12947,7 +13015,7 @@
                       </m:e>
                       <m:sub>
                         <m:r>
-                          <a:rPr lang="en-US" altLang="zh-CN" sz="1400" b="0" i="1" smtClean="0">
+                          <a:rPr lang="en-US" altLang="zh-CN" sz="1200" b="0" i="1" smtClean="0">
                             <a:latin typeface="Cambria Math" panose="02040503050406030204" pitchFamily="18" charset="0"/>
                             <a:ea typeface="微软雅黑" panose="020B0503020204020204" pitchFamily="34" charset="-122"/>
                           </a:rPr>
@@ -12956,7 +13024,7 @@
                       </m:sub>
                     </m:sSub>
                     <m:r>
-                      <a:rPr lang="en-US" altLang="zh-CN" sz="1400" b="0" i="1" smtClean="0">
+                      <a:rPr lang="en-US" altLang="zh-CN" sz="1200" b="0" i="1" smtClean="0">
                         <a:latin typeface="Cambria Math" panose="02040503050406030204" pitchFamily="18" charset="0"/>
                         <a:ea typeface="微软雅黑" panose="020B0503020204020204" pitchFamily="34" charset="-122"/>
                       </a:rPr>
@@ -12965,7 +13033,7 @@
                   </m:oMath>
                 </a14:m>
                 <a:r>
-                  <a:rPr lang="en-US" altLang="zh-CN" sz="1400" dirty="0">
+                  <a:rPr lang="en-US" altLang="zh-CN" sz="1200" dirty="0">
                     <a:latin typeface="微软雅黑" panose="020B0503020204020204" pitchFamily="34" charset="-122"/>
                     <a:ea typeface="微软雅黑" panose="020B0503020204020204" pitchFamily="34" charset="-122"/>
                   </a:rPr>
@@ -12981,7 +13049,7 @@
                   <a:buChar char="•"/>
                 </a:pPr>
                 <a:r>
-                  <a:rPr lang="en-US" altLang="zh-CN" sz="1400" dirty="0">
+                  <a:rPr lang="en-US" altLang="zh-CN" sz="1200" dirty="0">
                     <a:latin typeface="微软雅黑" panose="020B0503020204020204" pitchFamily="34" charset="-122"/>
                     <a:ea typeface="微软雅黑" panose="020B0503020204020204" pitchFamily="34" charset="-122"/>
                   </a:rPr>
@@ -12997,21 +13065,21 @@
                   <a:buChar char="•"/>
                 </a:pPr>
                 <a:r>
-                  <a:rPr lang="en-US" altLang="zh-CN" sz="1400" dirty="0">
+                  <a:rPr lang="en-US" altLang="zh-CN" sz="1200" dirty="0">
                     <a:latin typeface="微软雅黑" panose="020B0503020204020204" pitchFamily="34" charset="-122"/>
                     <a:ea typeface="微软雅黑" panose="020B0503020204020204" pitchFamily="34" charset="-122"/>
                   </a:rPr>
                   <a:t>For any event ci (1&lt;</a:t>
                 </a:r>
                 <a:r>
-                  <a:rPr lang="en-US" altLang="zh-CN" sz="1400" dirty="0" err="1">
+                  <a:rPr lang="en-US" altLang="zh-CN" sz="1200" dirty="0" err="1">
                     <a:latin typeface="微软雅黑" panose="020B0503020204020204" pitchFamily="34" charset="-122"/>
                     <a:ea typeface="微软雅黑" panose="020B0503020204020204" pitchFamily="34" charset="-122"/>
                   </a:rPr>
                   <a:t>i</a:t>
                 </a:r>
                 <a:r>
-                  <a:rPr lang="en-US" altLang="zh-CN" sz="1400" dirty="0">
+                  <a:rPr lang="en-US" altLang="zh-CN" sz="1200" dirty="0">
                     <a:latin typeface="微软雅黑" panose="020B0503020204020204" pitchFamily="34" charset="-122"/>
                     <a:ea typeface="微软雅黑" panose="020B0503020204020204" pitchFamily="34" charset="-122"/>
                   </a:rPr>
@@ -13027,27 +13095,27 @@
                   <a:buChar char="•"/>
                 </a:pPr>
                 <a:r>
-                  <a:rPr lang="en-US" altLang="zh-CN" sz="1400" dirty="0">
+                  <a:rPr lang="en-US" altLang="zh-CN" sz="1200" dirty="0">
                     <a:latin typeface="微软雅黑" panose="020B0503020204020204" pitchFamily="34" charset="-122"/>
                     <a:ea typeface="微软雅黑" panose="020B0503020204020204" pitchFamily="34" charset="-122"/>
                   </a:rPr>
                   <a:t>There is no case where two consecutive events ci and ci-1 (1&lt;</a:t>
                 </a:r>
                 <a:r>
-                  <a:rPr lang="en-US" altLang="zh-CN" sz="1400" dirty="0" err="1">
+                  <a:rPr lang="en-US" altLang="zh-CN" sz="1200" dirty="0" err="1">
                     <a:latin typeface="微软雅黑" panose="020B0503020204020204" pitchFamily="34" charset="-122"/>
                     <a:ea typeface="微软雅黑" panose="020B0503020204020204" pitchFamily="34" charset="-122"/>
                   </a:rPr>
                   <a:t>i</a:t>
                 </a:r>
                 <a:r>
-                  <a:rPr lang="en-US" altLang="zh-CN" sz="1400" dirty="0">
+                  <a:rPr lang="en-US" altLang="zh-CN" sz="1200" dirty="0">
                     <a:latin typeface="微软雅黑" panose="020B0503020204020204" pitchFamily="34" charset="-122"/>
                     <a:ea typeface="微软雅黑" panose="020B0503020204020204" pitchFamily="34" charset="-122"/>
                   </a:rPr>
                   <a:t>&lt;n-1) are scheduling tasks executed on separate ECUs. In the task chain, there is at least one network task as a connection between two scheduling tasks executed on different ECUs. For example, if ci-1 and ci+1 are scheduling tasks on different ECUs, then ci is a network task.</a:t>
                 </a:r>
-                <a:endParaRPr lang="zh-CN" altLang="en-US" sz="1400" dirty="0">
+                <a:endParaRPr lang="zh-CN" altLang="en-US" sz="1200" dirty="0">
                   <a:latin typeface="微软雅黑" panose="020B0503020204020204" pitchFamily="34" charset="-122"/>
                   <a:ea typeface="微软雅黑" panose="020B0503020204020204" pitchFamily="34" charset="-122"/>
                 </a:endParaRPr>
@@ -13073,7 +13141,7 @@
             <p:spPr>
               <a:xfrm>
                 <a:off x="60512" y="1787917"/>
-                <a:ext cx="7127097" cy="4578561"/>
+                <a:ext cx="7127097" cy="3660682"/>
               </a:xfrm>
               <a:prstGeom prst="rect">
                 <a:avLst/>
@@ -13081,7 +13149,7 @@
               <a:blipFill>
                 <a:blip r:embed="rId3"/>
                 <a:stretch>
-                  <a:fillRect l="-257" r="-855" b="-533"/>
+                  <a:fillRect l="-86" r="-257" b="-333"/>
                 </a:stretch>
               </a:blipFill>
             </p:spPr>
@@ -13130,6 +13198,86 @@
           </a:prstGeom>
         </p:spPr>
       </p:pic>
+      <p:sp>
+        <p:nvSpPr>
+          <p:cNvPr id="5" name="文本框 4">
+            <a:extLst>
+              <a:ext uri="{FF2B5EF4-FFF2-40B4-BE49-F238E27FC236}">
+                <a16:creationId xmlns:a16="http://schemas.microsoft.com/office/drawing/2014/main" id="{DE28BCFF-2FFE-8B48-0B8C-7C0CA548F8FB}"/>
+              </a:ext>
+            </a:extLst>
+          </p:cNvPr>
+          <p:cNvSpPr txBox="1"/>
+          <p:nvPr/>
+        </p:nvSpPr>
+        <p:spPr>
+          <a:xfrm>
+            <a:off x="202279" y="5923357"/>
+            <a:ext cx="11589488" cy="646331"/>
+          </a:xfrm>
+          <a:prstGeom prst="rect">
+            <a:avLst/>
+          </a:prstGeom>
+          <a:noFill/>
+        </p:spPr>
+        <p:txBody>
+          <a:bodyPr wrap="square">
+            <a:spAutoFit/>
+          </a:bodyPr>
+          <a:lstStyle/>
+          <a:p>
+            <a:pPr marL="0" marR="0" algn="just">
+              <a:spcBef>
+                <a:spcPts val="0"/>
+              </a:spcBef>
+              <a:spcAft>
+                <a:spcPts val="0"/>
+              </a:spcAft>
+            </a:pPr>
+            <a:r>
+              <a:rPr lang="en-US" altLang="zh-CN" sz="1800" kern="100" dirty="0">
+                <a:effectLst/>
+                <a:latin typeface="Calibri" panose="020F0502020204030204" pitchFamily="34" charset="0"/>
+                <a:ea typeface="宋体" panose="02010600030101010101" pitchFamily="2" charset="-122"/>
+                <a:cs typeface="Times New Roman" panose="02020603050405020304" pitchFamily="18" charset="0"/>
+              </a:rPr>
+              <a:t>The first and last tasks in the task chain can only be scheduling tasks (τ), they are on the ECU (or PC). The first task is periodically released, </a:t>
+            </a:r>
+            <a:r>
+              <a:rPr lang="en-US" altLang="zh-CN" kern="100" dirty="0">
+                <a:effectLst/>
+                <a:latin typeface="Calibri" panose="020F0502020204030204" pitchFamily="34" charset="0"/>
+                <a:ea typeface="宋体" panose="02010600030101010101" pitchFamily="2" charset="-122"/>
+                <a:cs typeface="Times New Roman" panose="02020603050405020304" pitchFamily="18" charset="0"/>
+              </a:rPr>
+              <a:t>capturing </a:t>
+            </a:r>
+            <a:r>
+              <a:rPr lang="en-US" altLang="zh-CN" sz="1600" dirty="0">
+                <a:latin typeface="微软雅黑" panose="020B0503020204020204" pitchFamily="34" charset="-122"/>
+                <a:ea typeface="微软雅黑" panose="020B0503020204020204" pitchFamily="34" charset="-122"/>
+              </a:rPr>
+              <a:t>event</a:t>
+            </a:r>
+            <a:r>
+              <a:rPr lang="en-US" altLang="zh-CN" dirty="0">
+                <a:latin typeface="微软雅黑" panose="020B0503020204020204" pitchFamily="34" charset="-122"/>
+                <a:ea typeface="微软雅黑" panose="020B0503020204020204" pitchFamily="34" charset="-122"/>
+              </a:rPr>
+              <a:t> </a:t>
+            </a:r>
+            <a:r>
+              <a:rPr lang="en-US" altLang="zh-CN" sz="1800" kern="100" dirty="0">
+                <a:effectLst/>
+                <a:latin typeface="Calibri" panose="020F0502020204030204" pitchFamily="34" charset="0"/>
+                <a:ea typeface="宋体" panose="02010600030101010101" pitchFamily="2" charset="-122"/>
+                <a:cs typeface="Times New Roman" panose="02020603050405020304" pitchFamily="18" charset="0"/>
+              </a:rPr>
+              <a:t>z. Tasks on two different ECUs require network task (m) connection.</a:t>
+            </a:r>
+          </a:p>
+        </p:txBody>
+      </p:sp>
     </p:spTree>
     <p:extLst>
       <p:ext uri="{BB962C8B-B14F-4D97-AF65-F5344CB8AC3E}">
@@ -13247,8 +13395,8 @@
           </a:p>
         </p:txBody>
       </p:sp>
-      <mc:AlternateContent xmlns:mc="http://schemas.openxmlformats.org/markup-compatibility/2006" xmlns:a14="http://schemas.microsoft.com/office/drawing/2010/main">
-        <mc:Choice Requires="a14">
+      <mc:AlternateContent xmlns:mc="http://schemas.openxmlformats.org/markup-compatibility/2006">
+        <mc:Choice xmlns:a14="http://schemas.microsoft.com/office/drawing/2010/main" Requires="a14">
           <p:sp>
             <p:nvSpPr>
               <p:cNvPr id="6" name="文本框 5">
@@ -13264,7 +13412,7 @@
             <p:spPr>
               <a:xfrm>
                 <a:off x="105335" y="1348647"/>
-                <a:ext cx="6797487" cy="4527009"/>
+                <a:ext cx="6797487" cy="3049681"/>
               </a:xfrm>
               <a:prstGeom prst="rect">
                 <a:avLst/>
@@ -13328,7 +13476,7 @@
                     <a:latin typeface="微软雅黑" panose="020B0503020204020204" pitchFamily="34" charset="-122"/>
                     <a:ea typeface="微软雅黑" panose="020B0503020204020204" pitchFamily="34" charset="-122"/>
                   </a:rPr>
-                  <a:t>For the external event z, t(z) denotes the time at which the external event occurs, and t(c0​) is the end time of the external event. According to Definition 1, the external event z is also the event c0 of the task chain. The end time of the external event is the release time of the periodic scheduling task τ0 that is next poised to capture this external event z after it has been triggered.</a:t>
+                  <a:t>For the external event z, t(z) denotes the time at which the external event occurs, and t(c0​) is the end time of the external event. </a:t>
                 </a:r>
               </a:p>
               <a:p>
@@ -13464,7 +13612,7 @@
             </p:txBody>
           </p:sp>
         </mc:Choice>
-        <mc:Fallback xmlns="">
+        <mc:Fallback>
           <p:sp>
             <p:nvSpPr>
               <p:cNvPr id="6" name="文本框 5">
@@ -13482,7 +13630,7 @@
             <p:spPr>
               <a:xfrm>
                 <a:off x="105335" y="1348647"/>
-                <a:ext cx="6797487" cy="4527009"/>
+                <a:ext cx="6797487" cy="3049681"/>
               </a:xfrm>
               <a:prstGeom prst="rect">
                 <a:avLst/>
@@ -13490,7 +13638,7 @@
               <a:blipFill>
                 <a:blip r:embed="rId3"/>
                 <a:stretch>
-                  <a:fillRect l="-717" b="-808"/>
+                  <a:fillRect l="-717" b="-1597"/>
                 </a:stretch>
               </a:blipFill>
             </p:spPr>
@@ -13764,8 +13912,8 @@
         </p:blipFill>
         <p:spPr>
           <a:xfrm>
-            <a:off x="7077481" y="1626173"/>
-            <a:ext cx="4714286" cy="3980952"/>
+            <a:off x="6515250" y="1732800"/>
+            <a:ext cx="4596505" cy="3881493"/>
           </a:xfrm>
           <a:prstGeom prst="rect">
             <a:avLst/>

</xml_diff>